<commit_message>
Deployed 0dcd63d with MkDocs version: 1.6.1
</commit_message>
<xml_diff>
--- a/04-UnrealEngine/Docs.pptx
+++ b/04-UnrealEngine/Docs.pptx
@@ -6,11 +6,13 @@
   </p:sldMasterIdLst>
   <p:sldIdLst>
     <p:sldId id="256" r:id="rId3"/>
+    <p:sldId id="257" r:id="rId4"/>
+    <p:sldId id="258" r:id="rId5"/>
   </p:sldIdLst>
   <p:sldSz cx="12192000" cy="6858000"/>
   <p:notesSz cx="6858000" cy="9144000"/>
   <p:custDataLst>
-    <p:tags r:id="rId7"/>
+    <p:tags r:id="rId9"/>
   </p:custDataLst>
   <p:defaultTextStyle>
     <a:defPPr>
@@ -4045,9 +4047,1928 @@
 </p:sld>
 </file>
 
+<file path=ppt/slides/slide2.xml><?xml version="1.0" encoding="utf-8"?>
+<p:sld xmlns:a="http://schemas.openxmlformats.org/drawingml/2006/main" xmlns:r="http://schemas.openxmlformats.org/officeDocument/2006/relationships" xmlns:p="http://schemas.openxmlformats.org/presentationml/2006/main">
+  <p:cSld>
+    <p:bg>
+      <p:bgPr>
+        <a:solidFill>
+          <a:srgbClr val="FFFFFF"/>
+        </a:solidFill>
+        <a:effectLst/>
+      </p:bgPr>
+    </p:bg>
+    <p:spTree>
+      <p:nvGrpSpPr>
+        <p:cNvPr id="1" name=""/>
+        <p:cNvGrpSpPr/>
+        <p:nvPr/>
+      </p:nvGrpSpPr>
+      <p:grpSpPr/>
+      <p:pic>
+        <p:nvPicPr>
+          <p:cNvPr id="13" name="图片 12" descr="screen-1"/>
+          <p:cNvPicPr>
+            <a:picLocks noChangeAspect="1"/>
+          </p:cNvPicPr>
+          <p:nvPr/>
+        </p:nvPicPr>
+        <p:blipFill>
+          <a:blip r:embed="rId1"/>
+          <a:stretch>
+            <a:fillRect/>
+          </a:stretch>
+        </p:blipFill>
+        <p:spPr>
+          <a:xfrm>
+            <a:off x="2954655" y="4133850"/>
+            <a:ext cx="1905000" cy="1905000"/>
+          </a:xfrm>
+          <a:prstGeom prst="rect">
+            <a:avLst/>
+          </a:prstGeom>
+        </p:spPr>
+      </p:pic>
+      <p:pic>
+        <p:nvPicPr>
+          <p:cNvPr id="5" name="图片 4" descr="screen-1"/>
+          <p:cNvPicPr>
+            <a:picLocks noChangeAspect="1"/>
+          </p:cNvPicPr>
+          <p:nvPr/>
+        </p:nvPicPr>
+        <p:blipFill>
+          <a:blip r:embed="rId1"/>
+          <a:stretch>
+            <a:fillRect/>
+          </a:stretch>
+        </p:blipFill>
+        <p:spPr>
+          <a:xfrm>
+            <a:off x="614045" y="4133850"/>
+            <a:ext cx="1905000" cy="1905000"/>
+          </a:xfrm>
+          <a:prstGeom prst="rect">
+            <a:avLst/>
+          </a:prstGeom>
+        </p:spPr>
+      </p:pic>
+      <p:pic>
+        <p:nvPicPr>
+          <p:cNvPr id="14" name="图片 13" descr="screen-1"/>
+          <p:cNvPicPr>
+            <a:picLocks noChangeAspect="1"/>
+          </p:cNvPicPr>
+          <p:nvPr/>
+        </p:nvPicPr>
+        <p:blipFill>
+          <a:blip r:embed="rId1"/>
+          <a:stretch>
+            <a:fillRect/>
+          </a:stretch>
+        </p:blipFill>
+        <p:spPr>
+          <a:xfrm>
+            <a:off x="5295265" y="4133850"/>
+            <a:ext cx="1905000" cy="1905000"/>
+          </a:xfrm>
+          <a:prstGeom prst="rect">
+            <a:avLst/>
+          </a:prstGeom>
+        </p:spPr>
+      </p:pic>
+      <p:pic>
+        <p:nvPicPr>
+          <p:cNvPr id="41" name="图片 40" descr="screen-1"/>
+          <p:cNvPicPr>
+            <a:picLocks noChangeAspect="1"/>
+          </p:cNvPicPr>
+          <p:nvPr/>
+        </p:nvPicPr>
+        <p:blipFill>
+          <a:blip r:embed="rId1"/>
+          <a:stretch>
+            <a:fillRect/>
+          </a:stretch>
+        </p:blipFill>
+        <p:spPr>
+          <a:xfrm>
+            <a:off x="7635875" y="4133850"/>
+            <a:ext cx="1905000" cy="1905000"/>
+          </a:xfrm>
+          <a:prstGeom prst="rect">
+            <a:avLst/>
+          </a:prstGeom>
+        </p:spPr>
+      </p:pic>
+      <p:pic>
+        <p:nvPicPr>
+          <p:cNvPr id="6" name="图片 5"/>
+          <p:cNvPicPr>
+            <a:picLocks noChangeAspect="1"/>
+          </p:cNvPicPr>
+          <p:nvPr/>
+        </p:nvPicPr>
+        <p:blipFill>
+          <a:blip r:embed="rId2"/>
+          <a:stretch>
+            <a:fillRect/>
+          </a:stretch>
+        </p:blipFill>
+        <p:spPr>
+          <a:xfrm>
+            <a:off x="-306705" y="1639570"/>
+            <a:ext cx="2982595" cy="1232535"/>
+          </a:xfrm>
+          <a:prstGeom prst="rect">
+            <a:avLst/>
+          </a:prstGeom>
+        </p:spPr>
+      </p:pic>
+      <p:cxnSp>
+        <p:nvCxnSpPr>
+          <p:cNvPr id="8" name="直接连接符 7"/>
+          <p:cNvCxnSpPr>
+            <a:endCxn id="22" idx="1"/>
+          </p:cNvCxnSpPr>
+          <p:nvPr/>
+        </p:nvCxnSpPr>
+        <p:spPr>
+          <a:xfrm flipV="1">
+            <a:off x="-26670" y="2912110"/>
+            <a:ext cx="11486515" cy="25400"/>
+          </a:xfrm>
+          <a:prstGeom prst="line">
+            <a:avLst/>
+          </a:prstGeom>
+          <a:ln>
+            <a:solidFill>
+              <a:schemeClr val="tx1">
+                <a:lumMod val="75000"/>
+                <a:lumOff val="25000"/>
+              </a:schemeClr>
+            </a:solidFill>
+          </a:ln>
+        </p:spPr>
+        <p:style>
+          <a:lnRef idx="2">
+            <a:schemeClr val="accent1"/>
+          </a:lnRef>
+          <a:fillRef idx="0">
+            <a:srgbClr val="FFFFFF"/>
+          </a:fillRef>
+          <a:effectRef idx="0">
+            <a:srgbClr val="FFFFFF"/>
+          </a:effectRef>
+          <a:fontRef idx="minor">
+            <a:schemeClr val="tx1"/>
+          </a:fontRef>
+        </p:style>
+      </p:cxnSp>
+      <p:sp>
+        <p:nvSpPr>
+          <p:cNvPr id="9" name="文本框 8"/>
+          <p:cNvSpPr txBox="1"/>
+          <p:nvPr/>
+        </p:nvSpPr>
+        <p:spPr>
+          <a:xfrm>
+            <a:off x="1068705" y="2956243"/>
+            <a:ext cx="825500" cy="368300"/>
+          </a:xfrm>
+          <a:prstGeom prst="rect">
+            <a:avLst/>
+          </a:prstGeom>
+          <a:noFill/>
+        </p:spPr>
+        <p:txBody>
+          <a:bodyPr wrap="square" rtlCol="0">
+            <a:spAutoFit/>
+          </a:bodyPr>
+          <a:p>
+            <a:pPr algn="ctr"/>
+            <a:r>
+              <a:rPr lang="en-US" altLang="zh-CN">
+                <a:solidFill>
+                  <a:schemeClr val="bg1">
+                    <a:lumMod val="65000"/>
+                  </a:schemeClr>
+                </a:solidFill>
+              </a:rPr>
+              <a:t>20m</a:t>
+            </a:r>
+            <a:endParaRPr lang="en-US" altLang="zh-CN">
+              <a:solidFill>
+                <a:schemeClr val="bg1">
+                  <a:lumMod val="65000"/>
+                </a:schemeClr>
+              </a:solidFill>
+            </a:endParaRPr>
+          </a:p>
+        </p:txBody>
+      </p:sp>
+      <p:cxnSp>
+        <p:nvCxnSpPr>
+          <p:cNvPr id="10" name="直接连接符 9"/>
+          <p:cNvCxnSpPr/>
+          <p:nvPr/>
+        </p:nvCxnSpPr>
+        <p:spPr>
+          <a:xfrm flipV="1">
+            <a:off x="355600" y="2931160"/>
+            <a:ext cx="0" cy="38100"/>
+          </a:xfrm>
+          <a:prstGeom prst="line">
+            <a:avLst/>
+          </a:prstGeom>
+          <a:ln>
+            <a:solidFill>
+              <a:schemeClr val="tx1">
+                <a:lumMod val="75000"/>
+                <a:lumOff val="25000"/>
+              </a:schemeClr>
+            </a:solidFill>
+          </a:ln>
+        </p:spPr>
+        <p:style>
+          <a:lnRef idx="2">
+            <a:schemeClr val="accent1"/>
+          </a:lnRef>
+          <a:fillRef idx="0">
+            <a:srgbClr val="FFFFFF"/>
+          </a:fillRef>
+          <a:effectRef idx="0">
+            <a:srgbClr val="FFFFFF"/>
+          </a:effectRef>
+          <a:fontRef idx="minor">
+            <a:schemeClr val="tx1"/>
+          </a:fontRef>
+        </p:style>
+      </p:cxnSp>
+      <p:sp>
+        <p:nvSpPr>
+          <p:cNvPr id="11" name="文本框 10"/>
+          <p:cNvSpPr txBox="1"/>
+          <p:nvPr/>
+        </p:nvSpPr>
+        <p:spPr>
+          <a:xfrm>
+            <a:off x="26035" y="2956560"/>
+            <a:ext cx="772160" cy="368300"/>
+          </a:xfrm>
+          <a:prstGeom prst="rect">
+            <a:avLst/>
+          </a:prstGeom>
+          <a:noFill/>
+        </p:spPr>
+        <p:txBody>
+          <a:bodyPr wrap="square" rtlCol="0">
+            <a:spAutoFit/>
+          </a:bodyPr>
+          <a:p>
+            <a:r>
+              <a:rPr lang="zh-CN" altLang="en-US">
+                <a:solidFill>
+                  <a:schemeClr val="tx1">
+                    <a:lumMod val="50000"/>
+                    <a:lumOff val="50000"/>
+                  </a:schemeClr>
+                </a:solidFill>
+              </a:rPr>
+              <a:t>origin</a:t>
+            </a:r>
+            <a:endParaRPr lang="zh-CN" altLang="en-US">
+              <a:solidFill>
+                <a:schemeClr val="tx1">
+                  <a:lumMod val="50000"/>
+                  <a:lumOff val="50000"/>
+                </a:schemeClr>
+              </a:solidFill>
+            </a:endParaRPr>
+          </a:p>
+        </p:txBody>
+      </p:sp>
+      <p:pic>
+        <p:nvPicPr>
+          <p:cNvPr id="17" name="图片 16"/>
+          <p:cNvPicPr>
+            <a:picLocks noChangeAspect="1"/>
+          </p:cNvPicPr>
+          <p:nvPr/>
+        </p:nvPicPr>
+        <p:blipFill>
+          <a:blip r:embed="rId3"/>
+          <a:stretch>
+            <a:fillRect/>
+          </a:stretch>
+        </p:blipFill>
+        <p:spPr>
+          <a:xfrm>
+            <a:off x="1074420" y="4607560"/>
+            <a:ext cx="941070" cy="864235"/>
+          </a:xfrm>
+          <a:prstGeom prst="rect">
+            <a:avLst/>
+          </a:prstGeom>
+        </p:spPr>
+      </p:pic>
+      <p:pic>
+        <p:nvPicPr>
+          <p:cNvPr id="18" name="图片 17"/>
+          <p:cNvPicPr>
+            <a:picLocks noChangeAspect="1"/>
+          </p:cNvPicPr>
+          <p:nvPr/>
+        </p:nvPicPr>
+        <p:blipFill>
+          <a:blip r:embed="rId4"/>
+          <a:stretch>
+            <a:fillRect/>
+          </a:stretch>
+        </p:blipFill>
+        <p:spPr>
+          <a:xfrm>
+            <a:off x="2441575" y="1860550"/>
+            <a:ext cx="928370" cy="923925"/>
+          </a:xfrm>
+          <a:prstGeom prst="rect">
+            <a:avLst/>
+          </a:prstGeom>
+        </p:spPr>
+      </p:pic>
+      <p:pic>
+        <p:nvPicPr>
+          <p:cNvPr id="19" name="图片 18"/>
+          <p:cNvPicPr>
+            <a:picLocks noChangeAspect="1"/>
+          </p:cNvPicPr>
+          <p:nvPr/>
+        </p:nvPicPr>
+        <p:blipFill>
+          <a:blip r:embed="rId5"/>
+          <a:stretch>
+            <a:fillRect/>
+          </a:stretch>
+        </p:blipFill>
+        <p:spPr>
+          <a:xfrm>
+            <a:off x="3802380" y="1837055"/>
+            <a:ext cx="1143000" cy="985520"/>
+          </a:xfrm>
+          <a:prstGeom prst="rect">
+            <a:avLst/>
+          </a:prstGeom>
+        </p:spPr>
+      </p:pic>
+      <p:pic>
+        <p:nvPicPr>
+          <p:cNvPr id="20" name="图片 19"/>
+          <p:cNvPicPr>
+            <a:picLocks noChangeAspect="1"/>
+          </p:cNvPicPr>
+          <p:nvPr/>
+        </p:nvPicPr>
+        <p:blipFill>
+          <a:blip r:embed="rId6"/>
+          <a:stretch>
+            <a:fillRect/>
+          </a:stretch>
+        </p:blipFill>
+        <p:spPr>
+          <a:xfrm>
+            <a:off x="5295265" y="1896745"/>
+            <a:ext cx="1022985" cy="925830"/>
+          </a:xfrm>
+          <a:prstGeom prst="rect">
+            <a:avLst/>
+          </a:prstGeom>
+        </p:spPr>
+      </p:pic>
+      <p:cxnSp>
+        <p:nvCxnSpPr>
+          <p:cNvPr id="26" name="直接连接符 25"/>
+          <p:cNvCxnSpPr/>
+          <p:nvPr/>
+        </p:nvCxnSpPr>
+        <p:spPr>
+          <a:xfrm flipV="1">
+            <a:off x="355600" y="2943860"/>
+            <a:ext cx="0" cy="80645"/>
+          </a:xfrm>
+          <a:prstGeom prst="line">
+            <a:avLst/>
+          </a:prstGeom>
+          <a:ln>
+            <a:solidFill>
+              <a:srgbClr val="404040"/>
+            </a:solidFill>
+          </a:ln>
+        </p:spPr>
+        <p:style>
+          <a:lnRef idx="2">
+            <a:schemeClr val="accent1"/>
+          </a:lnRef>
+          <a:fillRef idx="0">
+            <a:srgbClr val="FFFFFF"/>
+          </a:fillRef>
+          <a:effectRef idx="0">
+            <a:srgbClr val="FFFFFF"/>
+          </a:effectRef>
+          <a:fontRef idx="minor">
+            <a:schemeClr val="tx1"/>
+          </a:fontRef>
+        </p:style>
+      </p:cxnSp>
+      <p:sp>
+        <p:nvSpPr>
+          <p:cNvPr id="30" name="文本框 29"/>
+          <p:cNvSpPr txBox="1"/>
+          <p:nvPr/>
+        </p:nvSpPr>
+        <p:spPr>
+          <a:xfrm>
+            <a:off x="797560" y="1644650"/>
+            <a:ext cx="1320800" cy="275590"/>
+          </a:xfrm>
+          <a:prstGeom prst="rect">
+            <a:avLst/>
+          </a:prstGeom>
+          <a:noFill/>
+        </p:spPr>
+        <p:txBody>
+          <a:bodyPr wrap="square" rtlCol="0">
+            <a:spAutoFit/>
+          </a:bodyPr>
+          <a:p>
+            <a:pPr algn="ctr"/>
+            <a:r>
+              <a:rPr lang="en-US" altLang="zh-CN" sz="1200">
+                <a:solidFill>
+                  <a:schemeClr val="bg2">
+                    <a:lumMod val="50000"/>
+                  </a:schemeClr>
+                </a:solidFill>
+              </a:rPr>
+              <a:t>LOD0</a:t>
+            </a:r>
+            <a:endParaRPr lang="en-US" altLang="zh-CN" sz="1200">
+              <a:solidFill>
+                <a:schemeClr val="bg2">
+                  <a:lumMod val="50000"/>
+                </a:schemeClr>
+              </a:solidFill>
+            </a:endParaRPr>
+          </a:p>
+        </p:txBody>
+      </p:sp>
+      <p:sp>
+        <p:nvSpPr>
+          <p:cNvPr id="31" name="文本框 30"/>
+          <p:cNvSpPr txBox="1"/>
+          <p:nvPr/>
+        </p:nvSpPr>
+        <p:spPr>
+          <a:xfrm>
+            <a:off x="2204720" y="1644650"/>
+            <a:ext cx="1320800" cy="275590"/>
+          </a:xfrm>
+          <a:prstGeom prst="rect">
+            <a:avLst/>
+          </a:prstGeom>
+          <a:noFill/>
+        </p:spPr>
+        <p:txBody>
+          <a:bodyPr wrap="square" rtlCol="0">
+            <a:spAutoFit/>
+          </a:bodyPr>
+          <a:p>
+            <a:pPr algn="ctr"/>
+            <a:r>
+              <a:rPr lang="en-US" altLang="zh-CN" sz="1200">
+                <a:solidFill>
+                  <a:schemeClr val="bg2">
+                    <a:lumMod val="50000"/>
+                  </a:schemeClr>
+                </a:solidFill>
+              </a:rPr>
+              <a:t>LOD1</a:t>
+            </a:r>
+            <a:endParaRPr lang="en-US" altLang="zh-CN" sz="1200">
+              <a:solidFill>
+                <a:schemeClr val="bg2">
+                  <a:lumMod val="50000"/>
+                </a:schemeClr>
+              </a:solidFill>
+            </a:endParaRPr>
+          </a:p>
+        </p:txBody>
+      </p:sp>
+      <p:sp>
+        <p:nvSpPr>
+          <p:cNvPr id="32" name="文本框 31"/>
+          <p:cNvSpPr txBox="1"/>
+          <p:nvPr/>
+        </p:nvSpPr>
+        <p:spPr>
+          <a:xfrm>
+            <a:off x="3672205" y="1644650"/>
+            <a:ext cx="1320800" cy="275590"/>
+          </a:xfrm>
+          <a:prstGeom prst="rect">
+            <a:avLst/>
+          </a:prstGeom>
+          <a:noFill/>
+        </p:spPr>
+        <p:txBody>
+          <a:bodyPr wrap="square" rtlCol="0">
+            <a:spAutoFit/>
+          </a:bodyPr>
+          <a:p>
+            <a:pPr algn="ctr"/>
+            <a:r>
+              <a:rPr lang="en-US" altLang="zh-CN" sz="1200">
+                <a:solidFill>
+                  <a:schemeClr val="bg2">
+                    <a:lumMod val="50000"/>
+                  </a:schemeClr>
+                </a:solidFill>
+              </a:rPr>
+              <a:t>LOD2</a:t>
+            </a:r>
+            <a:endParaRPr lang="en-US" altLang="zh-CN" sz="1200">
+              <a:solidFill>
+                <a:schemeClr val="bg2">
+                  <a:lumMod val="50000"/>
+                </a:schemeClr>
+              </a:solidFill>
+            </a:endParaRPr>
+          </a:p>
+        </p:txBody>
+      </p:sp>
+      <p:sp>
+        <p:nvSpPr>
+          <p:cNvPr id="33" name="文本框 32"/>
+          <p:cNvSpPr txBox="1"/>
+          <p:nvPr/>
+        </p:nvSpPr>
+        <p:spPr>
+          <a:xfrm>
+            <a:off x="5139690" y="1644650"/>
+            <a:ext cx="1320800" cy="275590"/>
+          </a:xfrm>
+          <a:prstGeom prst="rect">
+            <a:avLst/>
+          </a:prstGeom>
+          <a:noFill/>
+        </p:spPr>
+        <p:txBody>
+          <a:bodyPr wrap="square" rtlCol="0">
+            <a:spAutoFit/>
+          </a:bodyPr>
+          <a:p>
+            <a:pPr algn="ctr"/>
+            <a:r>
+              <a:rPr lang="en-US" altLang="zh-CN" sz="1200">
+                <a:solidFill>
+                  <a:schemeClr val="bg2">
+                    <a:lumMod val="50000"/>
+                  </a:schemeClr>
+                </a:solidFill>
+              </a:rPr>
+              <a:t>LOD3</a:t>
+            </a:r>
+            <a:endParaRPr lang="en-US" altLang="zh-CN" sz="1200">
+              <a:solidFill>
+                <a:schemeClr val="bg2">
+                  <a:lumMod val="50000"/>
+                </a:schemeClr>
+              </a:solidFill>
+            </a:endParaRPr>
+          </a:p>
+        </p:txBody>
+      </p:sp>
+      <p:sp>
+        <p:nvSpPr>
+          <p:cNvPr id="2" name="文本框 1"/>
+          <p:cNvSpPr txBox="1"/>
+          <p:nvPr/>
+        </p:nvSpPr>
+        <p:spPr>
+          <a:xfrm>
+            <a:off x="2493010" y="2956243"/>
+            <a:ext cx="825500" cy="368300"/>
+          </a:xfrm>
+          <a:prstGeom prst="rect">
+            <a:avLst/>
+          </a:prstGeom>
+          <a:noFill/>
+        </p:spPr>
+        <p:txBody>
+          <a:bodyPr wrap="square" rtlCol="0">
+            <a:spAutoFit/>
+          </a:bodyPr>
+          <a:p>
+            <a:pPr algn="ctr"/>
+            <a:r>
+              <a:rPr lang="en-US" altLang="zh-CN">
+                <a:solidFill>
+                  <a:schemeClr val="bg1">
+                    <a:lumMod val="65000"/>
+                  </a:schemeClr>
+                </a:solidFill>
+              </a:rPr>
+              <a:t>40m</a:t>
+            </a:r>
+            <a:endParaRPr lang="en-US" altLang="zh-CN">
+              <a:solidFill>
+                <a:schemeClr val="bg1">
+                  <a:lumMod val="65000"/>
+                </a:schemeClr>
+              </a:solidFill>
+            </a:endParaRPr>
+          </a:p>
+        </p:txBody>
+      </p:sp>
+      <p:sp>
+        <p:nvSpPr>
+          <p:cNvPr id="3" name="文本框 2"/>
+          <p:cNvSpPr txBox="1"/>
+          <p:nvPr/>
+        </p:nvSpPr>
+        <p:spPr>
+          <a:xfrm>
+            <a:off x="3961130" y="2956243"/>
+            <a:ext cx="825500" cy="368300"/>
+          </a:xfrm>
+          <a:prstGeom prst="rect">
+            <a:avLst/>
+          </a:prstGeom>
+          <a:noFill/>
+        </p:spPr>
+        <p:txBody>
+          <a:bodyPr wrap="square" rtlCol="0">
+            <a:spAutoFit/>
+          </a:bodyPr>
+          <a:p>
+            <a:pPr algn="ctr"/>
+            <a:r>
+              <a:rPr lang="en-US" altLang="zh-CN">
+                <a:solidFill>
+                  <a:schemeClr val="bg1">
+                    <a:lumMod val="65000"/>
+                  </a:schemeClr>
+                </a:solidFill>
+              </a:rPr>
+              <a:t>60m</a:t>
+            </a:r>
+            <a:endParaRPr lang="en-US" altLang="zh-CN">
+              <a:solidFill>
+                <a:schemeClr val="bg1">
+                  <a:lumMod val="65000"/>
+                </a:schemeClr>
+              </a:solidFill>
+            </a:endParaRPr>
+          </a:p>
+        </p:txBody>
+      </p:sp>
+      <p:sp>
+        <p:nvSpPr>
+          <p:cNvPr id="4" name="文本框 3"/>
+          <p:cNvSpPr txBox="1"/>
+          <p:nvPr/>
+        </p:nvSpPr>
+        <p:spPr>
+          <a:xfrm>
+            <a:off x="5387340" y="2956243"/>
+            <a:ext cx="825500" cy="368300"/>
+          </a:xfrm>
+          <a:prstGeom prst="rect">
+            <a:avLst/>
+          </a:prstGeom>
+          <a:noFill/>
+        </p:spPr>
+        <p:txBody>
+          <a:bodyPr wrap="square" rtlCol="0">
+            <a:spAutoFit/>
+          </a:bodyPr>
+          <a:p>
+            <a:pPr algn="ctr"/>
+            <a:r>
+              <a:rPr lang="en-US" altLang="zh-CN">
+                <a:solidFill>
+                  <a:schemeClr val="bg1">
+                    <a:lumMod val="65000"/>
+                  </a:schemeClr>
+                </a:solidFill>
+              </a:rPr>
+              <a:t>80m</a:t>
+            </a:r>
+            <a:endParaRPr lang="en-US" altLang="zh-CN">
+              <a:solidFill>
+                <a:schemeClr val="bg1">
+                  <a:lumMod val="65000"/>
+                </a:schemeClr>
+              </a:solidFill>
+            </a:endParaRPr>
+          </a:p>
+        </p:txBody>
+      </p:sp>
+      <p:pic>
+        <p:nvPicPr>
+          <p:cNvPr id="42" name="图片 41"/>
+          <p:cNvPicPr>
+            <a:picLocks noChangeAspect="1"/>
+          </p:cNvPicPr>
+          <p:nvPr/>
+        </p:nvPicPr>
+        <p:blipFill>
+          <a:blip r:embed="rId3"/>
+          <a:stretch>
+            <a:fillRect/>
+          </a:stretch>
+        </p:blipFill>
+        <p:spPr>
+          <a:xfrm>
+            <a:off x="986790" y="1920240"/>
+            <a:ext cx="941070" cy="864235"/>
+          </a:xfrm>
+          <a:prstGeom prst="rect">
+            <a:avLst/>
+          </a:prstGeom>
+        </p:spPr>
+      </p:pic>
+      <p:pic>
+        <p:nvPicPr>
+          <p:cNvPr id="43" name="图片 42"/>
+          <p:cNvPicPr>
+            <a:picLocks noChangeAspect="1"/>
+          </p:cNvPicPr>
+          <p:nvPr/>
+        </p:nvPicPr>
+        <p:blipFill>
+          <a:blip r:embed="rId4"/>
+          <a:stretch>
+            <a:fillRect/>
+          </a:stretch>
+        </p:blipFill>
+        <p:spPr>
+          <a:xfrm>
+            <a:off x="3597275" y="4777740"/>
+            <a:ext cx="620395" cy="617855"/>
+          </a:xfrm>
+          <a:prstGeom prst="rect">
+            <a:avLst/>
+          </a:prstGeom>
+        </p:spPr>
+      </p:pic>
+      <p:pic>
+        <p:nvPicPr>
+          <p:cNvPr id="44" name="图片 43"/>
+          <p:cNvPicPr>
+            <a:picLocks noChangeAspect="1"/>
+          </p:cNvPicPr>
+          <p:nvPr/>
+        </p:nvPicPr>
+        <p:blipFill>
+          <a:blip r:embed="rId5"/>
+          <a:stretch>
+            <a:fillRect/>
+          </a:stretch>
+        </p:blipFill>
+        <p:spPr>
+          <a:xfrm>
+            <a:off x="5998845" y="4966335"/>
+            <a:ext cx="497840" cy="429260"/>
+          </a:xfrm>
+          <a:prstGeom prst="rect">
+            <a:avLst/>
+          </a:prstGeom>
+        </p:spPr>
+      </p:pic>
+      <p:pic>
+        <p:nvPicPr>
+          <p:cNvPr id="45" name="图片 44"/>
+          <p:cNvPicPr>
+            <a:picLocks noChangeAspect="1"/>
+          </p:cNvPicPr>
+          <p:nvPr/>
+        </p:nvPicPr>
+        <p:blipFill>
+          <a:blip r:embed="rId6"/>
+          <a:stretch>
+            <a:fillRect/>
+          </a:stretch>
+        </p:blipFill>
+        <p:spPr>
+          <a:xfrm>
+            <a:off x="8503920" y="5126355"/>
+            <a:ext cx="297180" cy="269240"/>
+          </a:xfrm>
+          <a:prstGeom prst="rect">
+            <a:avLst/>
+          </a:prstGeom>
+        </p:spPr>
+      </p:pic>
+      <p:sp>
+        <p:nvSpPr>
+          <p:cNvPr id="46" name="文本框 45"/>
+          <p:cNvSpPr txBox="1"/>
+          <p:nvPr/>
+        </p:nvSpPr>
+        <p:spPr>
+          <a:xfrm>
+            <a:off x="906145" y="4052570"/>
+            <a:ext cx="1320800" cy="275590"/>
+          </a:xfrm>
+          <a:prstGeom prst="rect">
+            <a:avLst/>
+          </a:prstGeom>
+          <a:noFill/>
+        </p:spPr>
+        <p:txBody>
+          <a:bodyPr wrap="square" rtlCol="0">
+            <a:spAutoFit/>
+          </a:bodyPr>
+          <a:p>
+            <a:pPr algn="ctr"/>
+            <a:r>
+              <a:rPr lang="en-US" altLang="zh-CN" sz="1200">
+                <a:solidFill>
+                  <a:schemeClr val="bg2">
+                    <a:lumMod val="50000"/>
+                  </a:schemeClr>
+                </a:solidFill>
+              </a:rPr>
+              <a:t>LOD0</a:t>
+            </a:r>
+            <a:endParaRPr lang="en-US" altLang="zh-CN" sz="1200">
+              <a:solidFill>
+                <a:schemeClr val="bg2">
+                  <a:lumMod val="50000"/>
+                </a:schemeClr>
+              </a:solidFill>
+            </a:endParaRPr>
+          </a:p>
+        </p:txBody>
+      </p:sp>
+      <p:sp>
+        <p:nvSpPr>
+          <p:cNvPr id="47" name="文本框 46"/>
+          <p:cNvSpPr txBox="1"/>
+          <p:nvPr/>
+        </p:nvSpPr>
+        <p:spPr>
+          <a:xfrm>
+            <a:off x="3246755" y="4052570"/>
+            <a:ext cx="1320800" cy="275590"/>
+          </a:xfrm>
+          <a:prstGeom prst="rect">
+            <a:avLst/>
+          </a:prstGeom>
+          <a:noFill/>
+        </p:spPr>
+        <p:txBody>
+          <a:bodyPr wrap="square" rtlCol="0">
+            <a:spAutoFit/>
+          </a:bodyPr>
+          <a:p>
+            <a:pPr algn="ctr"/>
+            <a:r>
+              <a:rPr lang="en-US" altLang="zh-CN" sz="1200">
+                <a:solidFill>
+                  <a:schemeClr val="bg2">
+                    <a:lumMod val="50000"/>
+                  </a:schemeClr>
+                </a:solidFill>
+              </a:rPr>
+              <a:t>LOD1</a:t>
+            </a:r>
+            <a:endParaRPr lang="en-US" altLang="zh-CN" sz="1200">
+              <a:solidFill>
+                <a:schemeClr val="bg2">
+                  <a:lumMod val="50000"/>
+                </a:schemeClr>
+              </a:solidFill>
+            </a:endParaRPr>
+          </a:p>
+        </p:txBody>
+      </p:sp>
+      <p:sp>
+        <p:nvSpPr>
+          <p:cNvPr id="48" name="文本框 47"/>
+          <p:cNvSpPr txBox="1"/>
+          <p:nvPr/>
+        </p:nvSpPr>
+        <p:spPr>
+          <a:xfrm>
+            <a:off x="5587365" y="4052570"/>
+            <a:ext cx="1320800" cy="275590"/>
+          </a:xfrm>
+          <a:prstGeom prst="rect">
+            <a:avLst/>
+          </a:prstGeom>
+          <a:noFill/>
+        </p:spPr>
+        <p:txBody>
+          <a:bodyPr wrap="square" rtlCol="0">
+            <a:spAutoFit/>
+          </a:bodyPr>
+          <a:p>
+            <a:pPr algn="ctr"/>
+            <a:r>
+              <a:rPr lang="en-US" altLang="zh-CN" sz="1200">
+                <a:solidFill>
+                  <a:schemeClr val="bg2">
+                    <a:lumMod val="50000"/>
+                  </a:schemeClr>
+                </a:solidFill>
+              </a:rPr>
+              <a:t>LOD2</a:t>
+            </a:r>
+            <a:endParaRPr lang="en-US" altLang="zh-CN" sz="1200">
+              <a:solidFill>
+                <a:schemeClr val="bg2">
+                  <a:lumMod val="50000"/>
+                </a:schemeClr>
+              </a:solidFill>
+            </a:endParaRPr>
+          </a:p>
+        </p:txBody>
+      </p:sp>
+      <p:sp>
+        <p:nvSpPr>
+          <p:cNvPr id="49" name="文本框 48"/>
+          <p:cNvSpPr txBox="1"/>
+          <p:nvPr/>
+        </p:nvSpPr>
+        <p:spPr>
+          <a:xfrm>
+            <a:off x="7927975" y="4052570"/>
+            <a:ext cx="1320800" cy="275590"/>
+          </a:xfrm>
+          <a:prstGeom prst="rect">
+            <a:avLst/>
+          </a:prstGeom>
+          <a:noFill/>
+        </p:spPr>
+        <p:txBody>
+          <a:bodyPr wrap="square" rtlCol="0">
+            <a:spAutoFit/>
+          </a:bodyPr>
+          <a:p>
+            <a:pPr algn="ctr"/>
+            <a:r>
+              <a:rPr lang="en-US" altLang="zh-CN" sz="1200">
+                <a:solidFill>
+                  <a:schemeClr val="bg2">
+                    <a:lumMod val="50000"/>
+                  </a:schemeClr>
+                </a:solidFill>
+              </a:rPr>
+              <a:t>LOD3</a:t>
+            </a:r>
+            <a:endParaRPr lang="en-US" altLang="zh-CN" sz="1200">
+              <a:solidFill>
+                <a:schemeClr val="bg2">
+                  <a:lumMod val="50000"/>
+                </a:schemeClr>
+              </a:solidFill>
+            </a:endParaRPr>
+          </a:p>
+        </p:txBody>
+      </p:sp>
+      <p:sp>
+        <p:nvSpPr>
+          <p:cNvPr id="50" name="文本框 49"/>
+          <p:cNvSpPr txBox="1"/>
+          <p:nvPr/>
+        </p:nvSpPr>
+        <p:spPr>
+          <a:xfrm>
+            <a:off x="1153795" y="5901373"/>
+            <a:ext cx="825500" cy="368300"/>
+          </a:xfrm>
+          <a:prstGeom prst="rect">
+            <a:avLst/>
+          </a:prstGeom>
+          <a:noFill/>
+        </p:spPr>
+        <p:txBody>
+          <a:bodyPr wrap="square" rtlCol="0">
+            <a:spAutoFit/>
+          </a:bodyPr>
+          <a:p>
+            <a:pPr algn="ctr"/>
+            <a:r>
+              <a:rPr lang="en-US" altLang="zh-CN">
+                <a:solidFill>
+                  <a:schemeClr val="bg1">
+                    <a:lumMod val="65000"/>
+                  </a:schemeClr>
+                </a:solidFill>
+              </a:rPr>
+              <a:t>1</a:t>
+            </a:r>
+            <a:endParaRPr lang="en-US" altLang="zh-CN">
+              <a:solidFill>
+                <a:schemeClr val="bg1">
+                  <a:lumMod val="65000"/>
+                </a:schemeClr>
+              </a:solidFill>
+            </a:endParaRPr>
+          </a:p>
+        </p:txBody>
+      </p:sp>
+      <p:sp>
+        <p:nvSpPr>
+          <p:cNvPr id="51" name="文本框 50"/>
+          <p:cNvSpPr txBox="1"/>
+          <p:nvPr/>
+        </p:nvSpPr>
+        <p:spPr>
+          <a:xfrm>
+            <a:off x="3494405" y="5901373"/>
+            <a:ext cx="825500" cy="368300"/>
+          </a:xfrm>
+          <a:prstGeom prst="rect">
+            <a:avLst/>
+          </a:prstGeom>
+          <a:noFill/>
+        </p:spPr>
+        <p:txBody>
+          <a:bodyPr wrap="square" rtlCol="0">
+            <a:spAutoFit/>
+          </a:bodyPr>
+          <a:p>
+            <a:pPr algn="ctr"/>
+            <a:r>
+              <a:rPr lang="en-US" altLang="zh-CN">
+                <a:solidFill>
+                  <a:schemeClr val="bg1">
+                    <a:lumMod val="65000"/>
+                  </a:schemeClr>
+                </a:solidFill>
+              </a:rPr>
+              <a:t>0.5</a:t>
+            </a:r>
+            <a:endParaRPr lang="en-US" altLang="zh-CN">
+              <a:solidFill>
+                <a:schemeClr val="bg1">
+                  <a:lumMod val="65000"/>
+                </a:schemeClr>
+              </a:solidFill>
+            </a:endParaRPr>
+          </a:p>
+        </p:txBody>
+      </p:sp>
+      <p:sp>
+        <p:nvSpPr>
+          <p:cNvPr id="52" name="文本框 51"/>
+          <p:cNvSpPr txBox="1"/>
+          <p:nvPr/>
+        </p:nvSpPr>
+        <p:spPr>
+          <a:xfrm>
+            <a:off x="5835015" y="5901373"/>
+            <a:ext cx="825500" cy="368300"/>
+          </a:xfrm>
+          <a:prstGeom prst="rect">
+            <a:avLst/>
+          </a:prstGeom>
+          <a:noFill/>
+        </p:spPr>
+        <p:txBody>
+          <a:bodyPr wrap="square" rtlCol="0">
+            <a:spAutoFit/>
+          </a:bodyPr>
+          <a:p>
+            <a:pPr algn="ctr"/>
+            <a:r>
+              <a:rPr lang="en-US" altLang="zh-CN">
+                <a:solidFill>
+                  <a:schemeClr val="bg1">
+                    <a:lumMod val="65000"/>
+                  </a:schemeClr>
+                </a:solidFill>
+              </a:rPr>
+              <a:t>0.25</a:t>
+            </a:r>
+            <a:endParaRPr lang="en-US" altLang="zh-CN">
+              <a:solidFill>
+                <a:schemeClr val="bg1">
+                  <a:lumMod val="65000"/>
+                </a:schemeClr>
+              </a:solidFill>
+            </a:endParaRPr>
+          </a:p>
+        </p:txBody>
+      </p:sp>
+      <p:sp>
+        <p:nvSpPr>
+          <p:cNvPr id="53" name="文本框 52"/>
+          <p:cNvSpPr txBox="1"/>
+          <p:nvPr/>
+        </p:nvSpPr>
+        <p:spPr>
+          <a:xfrm>
+            <a:off x="8175625" y="5901373"/>
+            <a:ext cx="825500" cy="368300"/>
+          </a:xfrm>
+          <a:prstGeom prst="rect">
+            <a:avLst/>
+          </a:prstGeom>
+          <a:noFill/>
+        </p:spPr>
+        <p:txBody>
+          <a:bodyPr wrap="square" rtlCol="0">
+            <a:spAutoFit/>
+          </a:bodyPr>
+          <a:p>
+            <a:pPr algn="ctr"/>
+            <a:r>
+              <a:rPr lang="en-US" altLang="zh-CN">
+                <a:solidFill>
+                  <a:schemeClr val="bg1">
+                    <a:lumMod val="65000"/>
+                  </a:schemeClr>
+                </a:solidFill>
+              </a:rPr>
+              <a:t>0.125</a:t>
+            </a:r>
+            <a:endParaRPr lang="en-US" altLang="zh-CN">
+              <a:solidFill>
+                <a:schemeClr val="bg1">
+                  <a:lumMod val="65000"/>
+                </a:schemeClr>
+              </a:solidFill>
+            </a:endParaRPr>
+          </a:p>
+        </p:txBody>
+      </p:sp>
+      <p:sp>
+        <p:nvSpPr>
+          <p:cNvPr id="55" name="文本框 54"/>
+          <p:cNvSpPr txBox="1"/>
+          <p:nvPr/>
+        </p:nvSpPr>
+        <p:spPr>
+          <a:xfrm>
+            <a:off x="-120650" y="5916295"/>
+            <a:ext cx="1511300" cy="368300"/>
+          </a:xfrm>
+          <a:prstGeom prst="rect">
+            <a:avLst/>
+          </a:prstGeom>
+          <a:noFill/>
+        </p:spPr>
+        <p:txBody>
+          <a:bodyPr wrap="square" rtlCol="0">
+            <a:spAutoFit/>
+          </a:bodyPr>
+          <a:p>
+            <a:pPr algn="ctr"/>
+            <a:r>
+              <a:rPr lang="en-US" altLang="zh-CN">
+                <a:solidFill>
+                  <a:schemeClr val="bg1">
+                    <a:lumMod val="65000"/>
+                  </a:schemeClr>
+                </a:solidFill>
+              </a:rPr>
+              <a:t>ScreenSize:</a:t>
+            </a:r>
+            <a:endParaRPr lang="en-US" altLang="zh-CN">
+              <a:solidFill>
+                <a:schemeClr val="bg1">
+                  <a:lumMod val="65000"/>
+                </a:schemeClr>
+              </a:solidFill>
+            </a:endParaRPr>
+          </a:p>
+        </p:txBody>
+      </p:sp>
+    </p:spTree>
+  </p:cSld>
+  <p:clrMapOvr>
+    <a:masterClrMapping/>
+  </p:clrMapOvr>
+</p:sld>
+</file>
+
+<file path=ppt/slides/slide3.xml><?xml version="1.0" encoding="utf-8"?>
+<p:sld xmlns:a="http://schemas.openxmlformats.org/drawingml/2006/main" xmlns:r="http://schemas.openxmlformats.org/officeDocument/2006/relationships" xmlns:p="http://schemas.openxmlformats.org/presentationml/2006/main">
+  <p:cSld>
+    <p:bg>
+      <p:bgPr>
+        <a:solidFill>
+          <a:srgbClr val="FFFFFF"/>
+        </a:solidFill>
+        <a:effectLst/>
+      </p:bgPr>
+    </p:bg>
+    <p:spTree>
+      <p:nvGrpSpPr>
+        <p:cNvPr id="1" name=""/>
+        <p:cNvGrpSpPr/>
+        <p:nvPr/>
+      </p:nvGrpSpPr>
+      <p:grpSpPr/>
+      <p:sp>
+        <p:nvSpPr>
+          <p:cNvPr id="24" name="饼形 23"/>
+          <p:cNvSpPr>
+            <a:spLocks noChangeAspect="1"/>
+          </p:cNvSpPr>
+          <p:nvPr/>
+        </p:nvSpPr>
+        <p:spPr>
+          <a:xfrm rot="18900000">
+            <a:off x="569595" y="565150"/>
+            <a:ext cx="8233410" cy="8233410"/>
+          </a:xfrm>
+          <a:prstGeom prst="pie">
+            <a:avLst>
+              <a:gd name="adj1" fmla="val 2089469"/>
+              <a:gd name="adj2" fmla="val 3356750"/>
+            </a:avLst>
+          </a:prstGeom>
+          <a:solidFill>
+            <a:schemeClr val="accent4"/>
+          </a:solidFill>
+          <a:ln>
+            <a:solidFill>
+              <a:srgbClr val="404040"/>
+            </a:solidFill>
+          </a:ln>
+        </p:spPr>
+        <p:style>
+          <a:lnRef idx="2">
+            <a:schemeClr val="accent1">
+              <a:lumMod val="75000"/>
+            </a:schemeClr>
+          </a:lnRef>
+          <a:fillRef idx="1">
+            <a:schemeClr val="accent1"/>
+          </a:fillRef>
+          <a:effectRef idx="0">
+            <a:srgbClr val="FFFFFF"/>
+          </a:effectRef>
+          <a:fontRef idx="minor">
+            <a:schemeClr val="lt1"/>
+          </a:fontRef>
+        </p:style>
+        <p:txBody>
+          <a:bodyPr rtlCol="0" anchor="ctr"/>
+          <a:p>
+            <a:pPr algn="ctr"/>
+            <a:endParaRPr lang="zh-CN" altLang="en-US">
+              <a:solidFill>
+                <a:schemeClr val="tx1"/>
+              </a:solidFill>
+            </a:endParaRPr>
+          </a:p>
+        </p:txBody>
+      </p:sp>
+      <p:pic>
+        <p:nvPicPr>
+          <p:cNvPr id="6" name="图片 5"/>
+          <p:cNvPicPr>
+            <a:picLocks noChangeAspect="1"/>
+          </p:cNvPicPr>
+          <p:nvPr/>
+        </p:nvPicPr>
+        <p:blipFill>
+          <a:blip r:embed="rId1"/>
+          <a:stretch>
+            <a:fillRect/>
+          </a:stretch>
+        </p:blipFill>
+        <p:spPr>
+          <a:xfrm>
+            <a:off x="3740150" y="4124325"/>
+            <a:ext cx="2982595" cy="1232535"/>
+          </a:xfrm>
+          <a:prstGeom prst="rect">
+            <a:avLst/>
+          </a:prstGeom>
+        </p:spPr>
+      </p:pic>
+      <p:sp>
+        <p:nvSpPr>
+          <p:cNvPr id="23" name="饼形 22"/>
+          <p:cNvSpPr>
+            <a:spLocks noChangeAspect="1"/>
+          </p:cNvSpPr>
+          <p:nvPr/>
+        </p:nvSpPr>
+        <p:spPr>
+          <a:xfrm rot="18900000">
+            <a:off x="2081530" y="2077720"/>
+            <a:ext cx="5209540" cy="5209540"/>
+          </a:xfrm>
+          <a:prstGeom prst="pie">
+            <a:avLst>
+              <a:gd name="adj1" fmla="val 2089469"/>
+              <a:gd name="adj2" fmla="val 3356750"/>
+            </a:avLst>
+          </a:prstGeom>
+          <a:solidFill>
+            <a:schemeClr val="accent6">
+              <a:lumMod val="75000"/>
+            </a:schemeClr>
+          </a:solidFill>
+          <a:ln>
+            <a:solidFill>
+              <a:srgbClr val="404040"/>
+            </a:solidFill>
+          </a:ln>
+        </p:spPr>
+        <p:style>
+          <a:lnRef idx="2">
+            <a:schemeClr val="accent1">
+              <a:lumMod val="75000"/>
+            </a:schemeClr>
+          </a:lnRef>
+          <a:fillRef idx="1">
+            <a:schemeClr val="accent1"/>
+          </a:fillRef>
+          <a:effectRef idx="0">
+            <a:srgbClr val="FFFFFF"/>
+          </a:effectRef>
+          <a:fontRef idx="minor">
+            <a:schemeClr val="lt1"/>
+          </a:fontRef>
+        </p:style>
+        <p:txBody>
+          <a:bodyPr rtlCol="0" anchor="ctr"/>
+          <a:p>
+            <a:pPr algn="ctr"/>
+            <a:endParaRPr lang="zh-CN" altLang="en-US">
+              <a:solidFill>
+                <a:schemeClr val="tx1"/>
+              </a:solidFill>
+            </a:endParaRPr>
+          </a:p>
+        </p:txBody>
+      </p:sp>
+      <p:cxnSp>
+        <p:nvCxnSpPr>
+          <p:cNvPr id="8" name="直接连接符 7"/>
+          <p:cNvCxnSpPr>
+            <a:endCxn id="22" idx="1"/>
+          </p:cNvCxnSpPr>
+          <p:nvPr/>
+        </p:nvCxnSpPr>
+        <p:spPr>
+          <a:xfrm flipV="1">
+            <a:off x="-26670" y="2912110"/>
+            <a:ext cx="11486515" cy="25400"/>
+          </a:xfrm>
+          <a:prstGeom prst="line">
+            <a:avLst/>
+          </a:prstGeom>
+          <a:ln>
+            <a:solidFill>
+              <a:schemeClr val="tx1">
+                <a:lumMod val="75000"/>
+                <a:lumOff val="25000"/>
+              </a:schemeClr>
+            </a:solidFill>
+          </a:ln>
+        </p:spPr>
+        <p:style>
+          <a:lnRef idx="2">
+            <a:schemeClr val="accent1"/>
+          </a:lnRef>
+          <a:fillRef idx="0">
+            <a:srgbClr val="FFFFFF"/>
+          </a:fillRef>
+          <a:effectRef idx="0">
+            <a:srgbClr val="FFFFFF"/>
+          </a:effectRef>
+          <a:fontRef idx="minor">
+            <a:schemeClr val="tx1"/>
+          </a:fontRef>
+        </p:style>
+      </p:cxnSp>
+      <p:sp>
+        <p:nvSpPr>
+          <p:cNvPr id="11" name="文本框 10"/>
+          <p:cNvSpPr txBox="1"/>
+          <p:nvPr/>
+        </p:nvSpPr>
+        <p:spPr>
+          <a:xfrm>
+            <a:off x="26035" y="2956560"/>
+            <a:ext cx="772160" cy="368300"/>
+          </a:xfrm>
+          <a:prstGeom prst="rect">
+            <a:avLst/>
+          </a:prstGeom>
+          <a:noFill/>
+        </p:spPr>
+        <p:txBody>
+          <a:bodyPr wrap="square" rtlCol="0">
+            <a:spAutoFit/>
+          </a:bodyPr>
+          <a:p>
+            <a:r>
+              <a:rPr lang="zh-CN" altLang="en-US">
+                <a:solidFill>
+                  <a:schemeClr val="tx1">
+                    <a:lumMod val="50000"/>
+                    <a:lumOff val="50000"/>
+                  </a:schemeClr>
+                </a:solidFill>
+              </a:rPr>
+              <a:t>origin</a:t>
+            </a:r>
+            <a:endParaRPr lang="zh-CN" altLang="en-US">
+              <a:solidFill>
+                <a:schemeClr val="tx1">
+                  <a:lumMod val="50000"/>
+                  <a:lumOff val="50000"/>
+                </a:schemeClr>
+              </a:solidFill>
+            </a:endParaRPr>
+          </a:p>
+        </p:txBody>
+      </p:sp>
+      <p:sp>
+        <p:nvSpPr>
+          <p:cNvPr id="55" name="文本框 54"/>
+          <p:cNvSpPr txBox="1"/>
+          <p:nvPr/>
+        </p:nvSpPr>
+        <p:spPr>
+          <a:xfrm>
+            <a:off x="-120650" y="5916295"/>
+            <a:ext cx="1511300" cy="368300"/>
+          </a:xfrm>
+          <a:prstGeom prst="rect">
+            <a:avLst/>
+          </a:prstGeom>
+          <a:noFill/>
+        </p:spPr>
+        <p:txBody>
+          <a:bodyPr wrap="square" rtlCol="0">
+            <a:spAutoFit/>
+          </a:bodyPr>
+          <a:p>
+            <a:pPr algn="ctr"/>
+            <a:r>
+              <a:rPr lang="en-US" altLang="zh-CN">
+                <a:solidFill>
+                  <a:schemeClr val="bg1">
+                    <a:lumMod val="65000"/>
+                  </a:schemeClr>
+                </a:solidFill>
+              </a:rPr>
+              <a:t>ScreenSize:</a:t>
+            </a:r>
+            <a:endParaRPr lang="en-US" altLang="zh-CN">
+              <a:solidFill>
+                <a:schemeClr val="bg1">
+                  <a:lumMod val="65000"/>
+                </a:schemeClr>
+              </a:solidFill>
+            </a:endParaRPr>
+          </a:p>
+        </p:txBody>
+      </p:sp>
+      <p:sp>
+        <p:nvSpPr>
+          <p:cNvPr id="21" name="饼形 20"/>
+          <p:cNvSpPr>
+            <a:spLocks noChangeAspect="1"/>
+          </p:cNvSpPr>
+          <p:nvPr/>
+        </p:nvSpPr>
+        <p:spPr>
+          <a:xfrm rot="18900000">
+            <a:off x="4939665" y="1449070"/>
+            <a:ext cx="1553845" cy="1553845"/>
+          </a:xfrm>
+          <a:prstGeom prst="pie">
+            <a:avLst>
+              <a:gd name="adj1" fmla="val 1355980"/>
+              <a:gd name="adj2" fmla="val 4035975"/>
+            </a:avLst>
+          </a:prstGeom>
+        </p:spPr>
+        <p:style>
+          <a:lnRef idx="2">
+            <a:schemeClr val="accent1">
+              <a:lumMod val="75000"/>
+            </a:schemeClr>
+          </a:lnRef>
+          <a:fillRef idx="1">
+            <a:schemeClr val="accent1"/>
+          </a:fillRef>
+          <a:effectRef idx="0">
+            <a:srgbClr val="FFFFFF"/>
+          </a:effectRef>
+          <a:fontRef idx="minor">
+            <a:schemeClr val="lt1"/>
+          </a:fontRef>
+        </p:style>
+        <p:txBody>
+          <a:bodyPr rtlCol="0" anchor="ctr"/>
+          <a:p>
+            <a:pPr algn="ctr"/>
+            <a:endParaRPr lang="zh-CN" altLang="en-US">
+              <a:solidFill>
+                <a:schemeClr val="tx1"/>
+              </a:solidFill>
+            </a:endParaRPr>
+          </a:p>
+        </p:txBody>
+      </p:sp>
+      <p:sp>
+        <p:nvSpPr>
+          <p:cNvPr id="16" name="饼形 15"/>
+          <p:cNvSpPr>
+            <a:spLocks noChangeAspect="1"/>
+          </p:cNvSpPr>
+          <p:nvPr/>
+        </p:nvSpPr>
+        <p:spPr>
+          <a:xfrm rot="18900000">
+            <a:off x="3246057" y="3242468"/>
+            <a:ext cx="2880000" cy="2880000"/>
+          </a:xfrm>
+          <a:prstGeom prst="pie">
+            <a:avLst>
+              <a:gd name="adj1" fmla="val 2089469"/>
+              <a:gd name="adj2" fmla="val 3356750"/>
+            </a:avLst>
+          </a:prstGeom>
+          <a:solidFill>
+            <a:schemeClr val="bg1">
+              <a:lumMod val="85000"/>
+            </a:schemeClr>
+          </a:solidFill>
+          <a:ln>
+            <a:solidFill>
+              <a:srgbClr val="404040"/>
+            </a:solidFill>
+          </a:ln>
+        </p:spPr>
+        <p:style>
+          <a:lnRef idx="2">
+            <a:schemeClr val="accent1">
+              <a:lumMod val="75000"/>
+            </a:schemeClr>
+          </a:lnRef>
+          <a:fillRef idx="1">
+            <a:schemeClr val="accent1"/>
+          </a:fillRef>
+          <a:effectRef idx="0">
+            <a:srgbClr val="FFFFFF"/>
+          </a:effectRef>
+          <a:fontRef idx="minor">
+            <a:schemeClr val="lt1"/>
+          </a:fontRef>
+        </p:style>
+        <p:txBody>
+          <a:bodyPr rtlCol="0" anchor="ctr"/>
+          <a:p>
+            <a:pPr algn="ctr"/>
+            <a:endParaRPr lang="zh-CN" altLang="en-US">
+              <a:solidFill>
+                <a:schemeClr val="tx1"/>
+              </a:solidFill>
+            </a:endParaRPr>
+          </a:p>
+        </p:txBody>
+      </p:sp>
+      <p:sp>
+        <p:nvSpPr>
+          <p:cNvPr id="25" name="文本框 24"/>
+          <p:cNvSpPr txBox="1"/>
+          <p:nvPr/>
+        </p:nvSpPr>
+        <p:spPr>
+          <a:xfrm>
+            <a:off x="5344795" y="4529455"/>
+            <a:ext cx="751205" cy="306705"/>
+          </a:xfrm>
+          <a:prstGeom prst="rect">
+            <a:avLst/>
+          </a:prstGeom>
+          <a:noFill/>
+        </p:spPr>
+        <p:txBody>
+          <a:bodyPr wrap="square" rtlCol="0">
+            <a:spAutoFit/>
+          </a:bodyPr>
+          <a:p>
+            <a:pPr algn="ctr"/>
+            <a:r>
+              <a:rPr lang="en-US" altLang="zh-CN" sz="1400"/>
+              <a:t>LOD0</a:t>
+            </a:r>
+            <a:endParaRPr lang="en-US" altLang="zh-CN" sz="1400"/>
+          </a:p>
+        </p:txBody>
+      </p:sp>
+      <p:sp>
+        <p:nvSpPr>
+          <p:cNvPr id="27" name="文本框 26"/>
+          <p:cNvSpPr txBox="1"/>
+          <p:nvPr/>
+        </p:nvSpPr>
+        <p:spPr>
+          <a:xfrm>
+            <a:off x="6335395" y="4529455"/>
+            <a:ext cx="751205" cy="306705"/>
+          </a:xfrm>
+          <a:prstGeom prst="rect">
+            <a:avLst/>
+          </a:prstGeom>
+          <a:noFill/>
+        </p:spPr>
+        <p:txBody>
+          <a:bodyPr wrap="square" rtlCol="0">
+            <a:spAutoFit/>
+          </a:bodyPr>
+          <a:p>
+            <a:pPr algn="ctr"/>
+            <a:r>
+              <a:rPr lang="en-US" altLang="zh-CN" sz="1400"/>
+              <a:t>LOD1</a:t>
+            </a:r>
+            <a:endParaRPr lang="en-US" altLang="zh-CN" sz="1400"/>
+          </a:p>
+        </p:txBody>
+      </p:sp>
+      <p:sp>
+        <p:nvSpPr>
+          <p:cNvPr id="28" name="文本框 27"/>
+          <p:cNvSpPr txBox="1"/>
+          <p:nvPr/>
+        </p:nvSpPr>
+        <p:spPr>
+          <a:xfrm>
+            <a:off x="7721600" y="4529455"/>
+            <a:ext cx="751205" cy="306705"/>
+          </a:xfrm>
+          <a:prstGeom prst="rect">
+            <a:avLst/>
+          </a:prstGeom>
+          <a:noFill/>
+        </p:spPr>
+        <p:txBody>
+          <a:bodyPr wrap="square" rtlCol="0">
+            <a:spAutoFit/>
+          </a:bodyPr>
+          <a:p>
+            <a:pPr algn="ctr"/>
+            <a:r>
+              <a:rPr lang="en-US" altLang="zh-CN" sz="1400"/>
+              <a:t>LOD2</a:t>
+            </a:r>
+            <a:endParaRPr lang="en-US" altLang="zh-CN" sz="1400"/>
+          </a:p>
+        </p:txBody>
+      </p:sp>
+      <p:sp>
+        <p:nvSpPr>
+          <p:cNvPr id="29" name="空心弧 28"/>
+          <p:cNvSpPr/>
+          <p:nvPr/>
+        </p:nvSpPr>
+        <p:spPr>
+          <a:xfrm rot="2700000">
+            <a:off x="-40640" y="958215"/>
+            <a:ext cx="7359650" cy="7279005"/>
+          </a:xfrm>
+          <a:prstGeom prst="blockArc">
+            <a:avLst>
+              <a:gd name="adj1" fmla="val 18550886"/>
+              <a:gd name="adj2" fmla="val 19442987"/>
+              <a:gd name="adj3" fmla="val 1351"/>
+            </a:avLst>
+          </a:prstGeom>
+          <a:solidFill>
+            <a:schemeClr val="accent3"/>
+          </a:solidFill>
+          <a:ln>
+            <a:noFill/>
+          </a:ln>
+        </p:spPr>
+        <p:style>
+          <a:lnRef idx="2">
+            <a:schemeClr val="accent1">
+              <a:lumMod val="75000"/>
+            </a:schemeClr>
+          </a:lnRef>
+          <a:fillRef idx="1">
+            <a:schemeClr val="accent1"/>
+          </a:fillRef>
+          <a:effectRef idx="0">
+            <a:srgbClr val="FFFFFF"/>
+          </a:effectRef>
+          <a:fontRef idx="minor">
+            <a:schemeClr val="lt1"/>
+          </a:fontRef>
+        </p:style>
+        <p:txBody>
+          <a:bodyPr rtlCol="0" anchor="ctr"/>
+          <a:p>
+            <a:pPr algn="ctr"/>
+            <a:endParaRPr lang="zh-CN" altLang="en-US">
+              <a:solidFill>
+                <a:schemeClr val="tx1"/>
+              </a:solidFill>
+            </a:endParaRPr>
+          </a:p>
+        </p:txBody>
+      </p:sp>
+      <p:sp>
+        <p:nvSpPr>
+          <p:cNvPr id="34" name="空心弧 33"/>
+          <p:cNvSpPr>
+            <a:spLocks noChangeAspect="1"/>
+          </p:cNvSpPr>
+          <p:nvPr/>
+        </p:nvSpPr>
+        <p:spPr>
+          <a:xfrm rot="2700000">
+            <a:off x="3300730" y="3255010"/>
+            <a:ext cx="2854960" cy="2854960"/>
+          </a:xfrm>
+          <a:prstGeom prst="blockArc">
+            <a:avLst>
+              <a:gd name="adj1" fmla="val 18279248"/>
+              <a:gd name="adj2" fmla="val 19567464"/>
+              <a:gd name="adj3" fmla="val 2850"/>
+            </a:avLst>
+          </a:prstGeom>
+          <a:solidFill>
+            <a:schemeClr val="accent3"/>
+          </a:solidFill>
+          <a:ln>
+            <a:noFill/>
+          </a:ln>
+        </p:spPr>
+        <p:style>
+          <a:lnRef idx="2">
+            <a:schemeClr val="accent1">
+              <a:lumMod val="75000"/>
+            </a:schemeClr>
+          </a:lnRef>
+          <a:fillRef idx="1">
+            <a:schemeClr val="accent1"/>
+          </a:fillRef>
+          <a:effectRef idx="0">
+            <a:srgbClr val="FFFFFF"/>
+          </a:effectRef>
+          <a:fontRef idx="minor">
+            <a:schemeClr val="lt1"/>
+          </a:fontRef>
+        </p:style>
+        <p:txBody>
+          <a:bodyPr rtlCol="0" anchor="ctr"/>
+          <a:p>
+            <a:pPr algn="ctr"/>
+            <a:endParaRPr lang="zh-CN" altLang="en-US">
+              <a:solidFill>
+                <a:schemeClr val="tx1"/>
+              </a:solidFill>
+            </a:endParaRPr>
+          </a:p>
+        </p:txBody>
+      </p:sp>
+      <p:sp>
+        <p:nvSpPr>
+          <p:cNvPr id="35" name="文本框 34"/>
+          <p:cNvSpPr txBox="1"/>
+          <p:nvPr/>
+        </p:nvSpPr>
+        <p:spPr>
+          <a:xfrm>
+            <a:off x="4617720" y="5646420"/>
+            <a:ext cx="4064000" cy="368300"/>
+          </a:xfrm>
+          <a:prstGeom prst="rect">
+            <a:avLst/>
+          </a:prstGeom>
+          <a:noFill/>
+        </p:spPr>
+        <p:txBody>
+          <a:bodyPr wrap="square" rtlCol="0">
+            <a:spAutoFit/>
+          </a:bodyPr>
+          <a:p>
+            <a:pPr algn="ctr"/>
+            <a:r>
+              <a:rPr lang="en-US" altLang="zh-CN">
+                <a:solidFill>
+                  <a:srgbClr val="FFC000"/>
+                </a:solidFill>
+              </a:rPr>
+              <a:t>LOD </a:t>
+            </a:r>
+            <a:r>
+              <a:rPr lang="zh-CN" altLang="en-US">
+                <a:solidFill>
+                  <a:srgbClr val="FFC000"/>
+                </a:solidFill>
+              </a:rPr>
+              <a:t>过渡区</a:t>
+            </a:r>
+            <a:endParaRPr lang="zh-CN" altLang="en-US">
+              <a:solidFill>
+                <a:srgbClr val="FFC000"/>
+              </a:solidFill>
+            </a:endParaRPr>
+          </a:p>
+        </p:txBody>
+      </p:sp>
+      <p:cxnSp>
+        <p:nvCxnSpPr>
+          <p:cNvPr id="36" name="直接箭头连接符 35"/>
+          <p:cNvCxnSpPr/>
+          <p:nvPr/>
+        </p:nvCxnSpPr>
+        <p:spPr>
+          <a:xfrm flipH="1" flipV="1">
+            <a:off x="6100445" y="5041900"/>
+            <a:ext cx="88900" cy="560070"/>
+          </a:xfrm>
+          <a:prstGeom prst="straightConnector1">
+            <a:avLst/>
+          </a:prstGeom>
+          <a:ln>
+            <a:solidFill>
+              <a:schemeClr val="accent3"/>
+            </a:solidFill>
+            <a:tailEnd type="triangle"/>
+          </a:ln>
+        </p:spPr>
+        <p:style>
+          <a:lnRef idx="2">
+            <a:schemeClr val="accent1"/>
+          </a:lnRef>
+          <a:fillRef idx="0">
+            <a:srgbClr val="FFFFFF"/>
+          </a:fillRef>
+          <a:effectRef idx="0">
+            <a:srgbClr val="FFFFFF"/>
+          </a:effectRef>
+          <a:fontRef idx="minor">
+            <a:schemeClr val="tx1"/>
+          </a:fontRef>
+        </p:style>
+      </p:cxnSp>
+      <p:cxnSp>
+        <p:nvCxnSpPr>
+          <p:cNvPr id="37" name="直接箭头连接符 36"/>
+          <p:cNvCxnSpPr/>
+          <p:nvPr/>
+        </p:nvCxnSpPr>
+        <p:spPr>
+          <a:xfrm flipV="1">
+            <a:off x="7086600" y="5223510"/>
+            <a:ext cx="114935" cy="378460"/>
+          </a:xfrm>
+          <a:prstGeom prst="straightConnector1">
+            <a:avLst/>
+          </a:prstGeom>
+          <a:ln>
+            <a:solidFill>
+              <a:schemeClr val="accent3"/>
+            </a:solidFill>
+            <a:tailEnd type="triangle"/>
+          </a:ln>
+        </p:spPr>
+        <p:style>
+          <a:lnRef idx="2">
+            <a:schemeClr val="accent1"/>
+          </a:lnRef>
+          <a:fillRef idx="0">
+            <a:srgbClr val="FFFFFF"/>
+          </a:fillRef>
+          <a:effectRef idx="0">
+            <a:srgbClr val="FFFFFF"/>
+          </a:effectRef>
+          <a:fontRef idx="minor">
+            <a:schemeClr val="tx1"/>
+          </a:fontRef>
+        </p:style>
+      </p:cxnSp>
+    </p:spTree>
+  </p:cSld>
+  <p:clrMapOvr>
+    <a:masterClrMapping/>
+  </p:clrMapOvr>
+</p:sld>
+</file>
+
 <file path=ppt/tags/tag1.xml><?xml version="1.0" encoding="utf-8"?>
 <p:tagLst xmlns:p="http://schemas.openxmlformats.org/presentationml/2006/main">
-  <p:tag name="commondata" val="eyJoZGlkIjoiY2M2M2MyZmNhYWM2NDMxODE0MjAzMGI2YTMzYWNhOGIifQ=="/>
+  <p:tag name="commondata" val="eyJoZGlkIjoiNzVhODgyYzFhMjg2OTRlMjk3YzE3Nzc3OGQ0Y2ZmMWIifQ=="/>
 </p:tagLst>
 </file>
 

</xml_diff>

<commit_message>
Deployed 6766e34 with MkDocs version: 1.6.1
</commit_message>
<xml_diff>
--- a/04-UnrealEngine/Docs.pptx
+++ b/04-UnrealEngine/Docs.pptx
@@ -10,11 +10,12 @@
     <p:sldId id="258" r:id="rId5"/>
     <p:sldId id="259" r:id="rId6"/>
     <p:sldId id="260" r:id="rId7"/>
+    <p:sldId id="261" r:id="rId8"/>
   </p:sldIdLst>
   <p:sldSz cx="12192000" cy="6858000"/>
   <p:notesSz cx="6858000" cy="9144000"/>
   <p:custDataLst>
-    <p:tags r:id="rId11"/>
+    <p:tags r:id="rId12"/>
   </p:custDataLst>
   <p:defaultTextStyle>
     <a:defPPr>
@@ -7205,7 +7206,7 @@
         </p:nvGraphicFramePr>
         <p:xfrm>
           <a:off x="3907155" y="2972435"/>
-          <a:ext cx="2879725" cy="3332480"/>
+          <a:ext cx="2880000" cy="3343830"/>
         </p:xfrm>
         <a:graphic>
           <a:graphicData uri="http://schemas.openxmlformats.org/drawingml/2006/table">
@@ -13355,7 +13356,7 @@
         </p:nvGraphicFramePr>
         <p:xfrm>
           <a:off x="155575" y="2972435"/>
-          <a:ext cx="2879725" cy="3344545"/>
+          <a:ext cx="2880000" cy="3344760"/>
         </p:xfrm>
         <a:graphic>
           <a:graphicData uri="http://schemas.openxmlformats.org/drawingml/2006/table">
@@ -17692,7 +17693,7 @@
         </p:blipFill>
         <p:spPr>
           <a:xfrm>
-            <a:off x="5215255" y="1377315"/>
+            <a:off x="4968875" y="1377315"/>
             <a:ext cx="457200" cy="457200"/>
           </a:xfrm>
           <a:prstGeom prst="rect">
@@ -17722,7 +17723,7 @@
         </p:blipFill>
         <p:spPr>
           <a:xfrm>
-            <a:off x="3213735" y="1398270"/>
+            <a:off x="2967355" y="1398270"/>
             <a:ext cx="457200" cy="457200"/>
           </a:xfrm>
           <a:prstGeom prst="rect">
@@ -17752,7 +17753,7 @@
         </p:blipFill>
         <p:spPr>
           <a:xfrm>
-            <a:off x="4203065" y="1433195"/>
+            <a:off x="3956685" y="1433195"/>
             <a:ext cx="382905" cy="382905"/>
           </a:xfrm>
           <a:prstGeom prst="rect">
@@ -17822,7 +17823,7 @@
         </p:nvCxnSpPr>
         <p:spPr>
           <a:xfrm flipV="1">
-            <a:off x="321945" y="1597025"/>
+            <a:off x="75565" y="1597025"/>
             <a:ext cx="11461750" cy="17145"/>
           </a:xfrm>
           <a:prstGeom prst="line">
@@ -17873,7 +17874,7 @@
         </p:blipFill>
         <p:spPr>
           <a:xfrm>
-            <a:off x="1275715" y="1251585"/>
+            <a:off x="1029335" y="1251585"/>
             <a:ext cx="457200" cy="457200"/>
           </a:xfrm>
           <a:prstGeom prst="rect">
@@ -17903,7 +17904,7 @@
         </p:blipFill>
         <p:spPr>
           <a:xfrm>
-            <a:off x="1805305" y="1473200"/>
+            <a:off x="1558925" y="1473200"/>
             <a:ext cx="275590" cy="275590"/>
           </a:xfrm>
           <a:prstGeom prst="rect">
@@ -17963,7 +17964,7 @@
         </p:blipFill>
         <p:spPr>
           <a:xfrm>
-            <a:off x="2481580" y="1433195"/>
+            <a:off x="2235200" y="1433195"/>
             <a:ext cx="275590" cy="275590"/>
           </a:xfrm>
           <a:prstGeom prst="rect">
@@ -17993,7 +17994,7 @@
         </p:blipFill>
         <p:spPr>
           <a:xfrm>
-            <a:off x="2192655" y="1433195"/>
+            <a:off x="1946275" y="1433195"/>
             <a:ext cx="275590" cy="275590"/>
           </a:xfrm>
           <a:prstGeom prst="rect">
@@ -18023,7 +18024,7 @@
         </p:blipFill>
         <p:spPr>
           <a:xfrm>
-            <a:off x="2759710" y="1433195"/>
+            <a:off x="2513330" y="1433195"/>
             <a:ext cx="275590" cy="275590"/>
           </a:xfrm>
           <a:prstGeom prst="rect">
@@ -18053,7 +18054,7 @@
         </p:blipFill>
         <p:spPr>
           <a:xfrm>
-            <a:off x="2938145" y="1433195"/>
+            <a:off x="2691765" y="1433195"/>
             <a:ext cx="275590" cy="275590"/>
           </a:xfrm>
           <a:prstGeom prst="rect">
@@ -18083,7 +18084,7 @@
         </p:blipFill>
         <p:spPr>
           <a:xfrm>
-            <a:off x="2919730" y="1433195"/>
+            <a:off x="2673350" y="1433195"/>
             <a:ext cx="275590" cy="275590"/>
           </a:xfrm>
           <a:prstGeom prst="rect">
@@ -18113,7 +18114,7 @@
         </p:blipFill>
         <p:spPr>
           <a:xfrm>
-            <a:off x="2644140" y="1473200"/>
+            <a:off x="2397760" y="1473200"/>
             <a:ext cx="275590" cy="275590"/>
           </a:xfrm>
           <a:prstGeom prst="rect">
@@ -18143,7 +18144,7 @@
         </p:blipFill>
         <p:spPr>
           <a:xfrm>
-            <a:off x="3542030" y="1537335"/>
+            <a:off x="3295650" y="1537335"/>
             <a:ext cx="275590" cy="211455"/>
           </a:xfrm>
           <a:prstGeom prst="rect">
@@ -18173,7 +18174,7 @@
         </p:blipFill>
         <p:spPr>
           <a:xfrm>
-            <a:off x="3817620" y="1433195"/>
+            <a:off x="3571240" y="1433195"/>
             <a:ext cx="275590" cy="275590"/>
           </a:xfrm>
           <a:prstGeom prst="rect">
@@ -18203,7 +18204,7 @@
         </p:blipFill>
         <p:spPr>
           <a:xfrm>
-            <a:off x="4405630" y="1492885"/>
+            <a:off x="4159250" y="1492885"/>
             <a:ext cx="275590" cy="275590"/>
           </a:xfrm>
           <a:prstGeom prst="rect">
@@ -18233,7 +18234,7 @@
         </p:blipFill>
         <p:spPr>
           <a:xfrm>
-            <a:off x="3970020" y="1398270"/>
+            <a:off x="3723640" y="1398270"/>
             <a:ext cx="370205" cy="370205"/>
           </a:xfrm>
           <a:prstGeom prst="rect">
@@ -18263,7 +18264,7 @@
         </p:blipFill>
         <p:spPr>
           <a:xfrm>
-            <a:off x="3971290" y="1536700"/>
+            <a:off x="3724910" y="1536700"/>
             <a:ext cx="231775" cy="231775"/>
           </a:xfrm>
           <a:prstGeom prst="rect">
@@ -18293,7 +18294,7 @@
         </p:blipFill>
         <p:spPr>
           <a:xfrm>
-            <a:off x="4628515" y="1492885"/>
+            <a:off x="4382135" y="1492885"/>
             <a:ext cx="275590" cy="275590"/>
           </a:xfrm>
           <a:prstGeom prst="rect">
@@ -18323,7 +18324,7 @@
         </p:blipFill>
         <p:spPr>
           <a:xfrm>
-            <a:off x="3670935" y="1433195"/>
+            <a:off x="3424555" y="1433195"/>
             <a:ext cx="275590" cy="275590"/>
           </a:xfrm>
           <a:prstGeom prst="rect">
@@ -18353,7 +18354,7 @@
         </p:blipFill>
         <p:spPr>
           <a:xfrm>
-            <a:off x="5985510" y="1391920"/>
+            <a:off x="5739130" y="1391920"/>
             <a:ext cx="275590" cy="275590"/>
           </a:xfrm>
           <a:prstGeom prst="rect">
@@ -18383,7 +18384,7 @@
         </p:blipFill>
         <p:spPr>
           <a:xfrm>
-            <a:off x="6261100" y="1377315"/>
+            <a:off x="6014720" y="1377315"/>
             <a:ext cx="275590" cy="275590"/>
           </a:xfrm>
           <a:prstGeom prst="rect">
@@ -18413,7 +18414,7 @@
         </p:blipFill>
         <p:spPr>
           <a:xfrm>
-            <a:off x="5577205" y="1398270"/>
+            <a:off x="5330825" y="1398270"/>
             <a:ext cx="275590" cy="275590"/>
           </a:xfrm>
           <a:prstGeom prst="rect">
@@ -18653,7 +18654,7 @@
         </p:blipFill>
         <p:spPr>
           <a:xfrm>
-            <a:off x="4815840" y="1197610"/>
+            <a:off x="4569460" y="1197610"/>
             <a:ext cx="469900" cy="469900"/>
           </a:xfrm>
           <a:prstGeom prst="rect">
@@ -18683,7 +18684,7 @@
         </p:blipFill>
         <p:spPr>
           <a:xfrm>
-            <a:off x="979805" y="1391920"/>
+            <a:off x="733425" y="1391920"/>
             <a:ext cx="457200" cy="457200"/>
           </a:xfrm>
           <a:prstGeom prst="rect">
@@ -18713,7 +18714,7 @@
         </p:blipFill>
         <p:spPr>
           <a:xfrm>
-            <a:off x="5762625" y="1377315"/>
+            <a:off x="5516245" y="1377315"/>
             <a:ext cx="457200" cy="457200"/>
           </a:xfrm>
           <a:prstGeom prst="rect">
@@ -18743,7 +18744,7 @@
         </p:blipFill>
         <p:spPr>
           <a:xfrm>
-            <a:off x="6946265" y="1377315"/>
+            <a:off x="6699885" y="1377315"/>
             <a:ext cx="457200" cy="457200"/>
           </a:xfrm>
           <a:prstGeom prst="rect">
@@ -18773,7 +18774,7 @@
         </p:blipFill>
         <p:spPr>
           <a:xfrm>
-            <a:off x="6353810" y="1377315"/>
+            <a:off x="6107430" y="1377315"/>
             <a:ext cx="457200" cy="457200"/>
           </a:xfrm>
           <a:prstGeom prst="rect">
@@ -18833,7 +18834,7 @@
         </p:blipFill>
         <p:spPr>
           <a:xfrm>
-            <a:off x="1586230" y="1377315"/>
+            <a:off x="1339850" y="1377315"/>
             <a:ext cx="457200" cy="457200"/>
           </a:xfrm>
           <a:prstGeom prst="rect">
@@ -21624,7 +21625,7 @@
         </p:nvSpPr>
         <p:spPr>
           <a:xfrm>
-            <a:off x="1631950" y="3429000"/>
+            <a:off x="1385570" y="3429000"/>
             <a:ext cx="857250" cy="368300"/>
           </a:xfrm>
           <a:prstGeom prst="rect">
@@ -21662,7 +21663,7 @@
         </p:nvSpPr>
         <p:spPr>
           <a:xfrm>
-            <a:off x="3035300" y="3429000"/>
+            <a:off x="2788920" y="3429000"/>
             <a:ext cx="857250" cy="368300"/>
           </a:xfrm>
           <a:prstGeom prst="rect">
@@ -21700,7 +21701,7 @@
         </p:nvSpPr>
         <p:spPr>
           <a:xfrm>
-            <a:off x="3035300" y="4902200"/>
+            <a:off x="2788920" y="4902200"/>
             <a:ext cx="857250" cy="368300"/>
           </a:xfrm>
           <a:prstGeom prst="rect">
@@ -21738,7 +21739,7 @@
         </p:nvSpPr>
         <p:spPr>
           <a:xfrm>
-            <a:off x="1334135" y="4593590"/>
+            <a:off x="1087755" y="4593590"/>
             <a:ext cx="709295" cy="211455"/>
           </a:xfrm>
           <a:prstGeom prst="rect">
@@ -21776,7 +21777,7 @@
         </p:nvSpPr>
         <p:spPr>
           <a:xfrm>
-            <a:off x="2043430" y="4593590"/>
+            <a:off x="1797050" y="4593590"/>
             <a:ext cx="709295" cy="211455"/>
           </a:xfrm>
           <a:prstGeom prst="rect">
@@ -21814,7 +21815,7 @@
         </p:nvSpPr>
         <p:spPr>
           <a:xfrm>
-            <a:off x="2047875" y="5302250"/>
+            <a:off x="1801495" y="5302250"/>
             <a:ext cx="709295" cy="211455"/>
           </a:xfrm>
           <a:prstGeom prst="rect">
@@ -21841,6 +21842,4571 @@
                 <a:schemeClr val="bg1"/>
               </a:solidFill>
             </a:endParaRPr>
+          </a:p>
+        </p:txBody>
+      </p:sp>
+      <p:pic>
+        <p:nvPicPr>
+          <p:cNvPr id="3" name="图片 2"/>
+          <p:cNvPicPr>
+            <a:picLocks noChangeAspect="1"/>
+          </p:cNvPicPr>
+          <p:nvPr/>
+        </p:nvPicPr>
+        <p:blipFill>
+          <a:blip r:embed="rId33"/>
+          <a:stretch>
+            <a:fillRect/>
+          </a:stretch>
+        </p:blipFill>
+        <p:spPr>
+          <a:xfrm>
+            <a:off x="0" y="1957070"/>
+            <a:ext cx="12305665" cy="2590165"/>
+          </a:xfrm>
+          <a:prstGeom prst="rect">
+            <a:avLst/>
+          </a:prstGeom>
+        </p:spPr>
+      </p:pic>
+      <p:sp>
+        <p:nvSpPr>
+          <p:cNvPr id="5" name="文本框 4"/>
+          <p:cNvSpPr txBox="1"/>
+          <p:nvPr/>
+        </p:nvSpPr>
+        <p:spPr>
+          <a:xfrm>
+            <a:off x="-19050" y="3797300"/>
+            <a:ext cx="3063240" cy="275590"/>
+          </a:xfrm>
+          <a:prstGeom prst="rect">
+            <a:avLst/>
+          </a:prstGeom>
+          <a:noFill/>
+        </p:spPr>
+        <p:txBody>
+          <a:bodyPr wrap="square" rtlCol="0">
+            <a:spAutoFit/>
+          </a:bodyPr>
+          <a:p>
+            <a:pPr algn="ctr"/>
+            <a:r>
+              <a:rPr lang="zh-CN" altLang="en-US" sz="1200">
+                <a:solidFill>
+                  <a:schemeClr val="bg1"/>
+                </a:solidFill>
+                <a:latin typeface="微软雅黑" panose="020B0503020204020204" charset="-122"/>
+                <a:ea typeface="微软雅黑" panose="020B0503020204020204" charset="-122"/>
+                <a:cs typeface="微软雅黑" panose="020B0503020204020204" charset="-122"/>
+              </a:rPr>
+              <a:t>缩小十倍，无</a:t>
+            </a:r>
+            <a:r>
+              <a:rPr lang="en-US" altLang="zh-CN" sz="1200">
+                <a:solidFill>
+                  <a:schemeClr val="bg1"/>
+                </a:solidFill>
+                <a:latin typeface="微软雅黑" panose="020B0503020204020204" charset="-122"/>
+                <a:ea typeface="微软雅黑" panose="020B0503020204020204" charset="-122"/>
+                <a:cs typeface="微软雅黑" panose="020B0503020204020204" charset="-122"/>
+              </a:rPr>
+              <a:t>Mipmap</a:t>
+            </a:r>
+            <a:r>
+              <a:rPr lang="zh-CN" altLang="en-US" sz="1200">
+                <a:solidFill>
+                  <a:schemeClr val="bg1"/>
+                </a:solidFill>
+                <a:latin typeface="微软雅黑" panose="020B0503020204020204" charset="-122"/>
+                <a:ea typeface="微软雅黑" panose="020B0503020204020204" charset="-122"/>
+                <a:cs typeface="微软雅黑" panose="020B0503020204020204" charset="-122"/>
+              </a:rPr>
+              <a:t>，存在锯齿边缘</a:t>
+            </a:r>
+            <a:endParaRPr lang="zh-CN" altLang="en-US" sz="1200">
+              <a:solidFill>
+                <a:schemeClr val="bg1"/>
+              </a:solidFill>
+              <a:latin typeface="微软雅黑" panose="020B0503020204020204" charset="-122"/>
+              <a:ea typeface="微软雅黑" panose="020B0503020204020204" charset="-122"/>
+              <a:cs typeface="微软雅黑" panose="020B0503020204020204" charset="-122"/>
+            </a:endParaRPr>
+          </a:p>
+        </p:txBody>
+      </p:sp>
+      <p:sp>
+        <p:nvSpPr>
+          <p:cNvPr id="6" name="文本框 5"/>
+          <p:cNvSpPr txBox="1"/>
+          <p:nvPr/>
+        </p:nvSpPr>
+        <p:spPr>
+          <a:xfrm>
+            <a:off x="3044190" y="3797300"/>
+            <a:ext cx="3063240" cy="275590"/>
+          </a:xfrm>
+          <a:prstGeom prst="rect">
+            <a:avLst/>
+          </a:prstGeom>
+          <a:noFill/>
+        </p:spPr>
+        <p:txBody>
+          <a:bodyPr wrap="square" rtlCol="0">
+            <a:spAutoFit/>
+          </a:bodyPr>
+          <a:p>
+            <a:pPr algn="ctr"/>
+            <a:r>
+              <a:rPr lang="zh-CN" sz="1200">
+                <a:solidFill>
+                  <a:schemeClr val="bg1"/>
+                </a:solidFill>
+                <a:latin typeface="微软雅黑" panose="020B0503020204020204" charset="-122"/>
+                <a:ea typeface="微软雅黑" panose="020B0503020204020204" charset="-122"/>
+                <a:cs typeface="微软雅黑" panose="020B0503020204020204" charset="-122"/>
+              </a:rPr>
+              <a:t>简单平均数</a:t>
+            </a:r>
+            <a:endParaRPr lang="zh-CN" sz="1200">
+              <a:solidFill>
+                <a:schemeClr val="bg1"/>
+              </a:solidFill>
+              <a:latin typeface="微软雅黑" panose="020B0503020204020204" charset="-122"/>
+              <a:ea typeface="微软雅黑" panose="020B0503020204020204" charset="-122"/>
+              <a:cs typeface="微软雅黑" panose="020B0503020204020204" charset="-122"/>
+            </a:endParaRPr>
+          </a:p>
+        </p:txBody>
+      </p:sp>
+      <p:sp>
+        <p:nvSpPr>
+          <p:cNvPr id="7" name="文本框 6"/>
+          <p:cNvSpPr txBox="1"/>
+          <p:nvPr/>
+        </p:nvSpPr>
+        <p:spPr>
+          <a:xfrm>
+            <a:off x="6107430" y="3797300"/>
+            <a:ext cx="3063240" cy="275590"/>
+          </a:xfrm>
+          <a:prstGeom prst="rect">
+            <a:avLst/>
+          </a:prstGeom>
+          <a:noFill/>
+        </p:spPr>
+        <p:txBody>
+          <a:bodyPr wrap="square" rtlCol="0">
+            <a:spAutoFit/>
+          </a:bodyPr>
+          <a:p>
+            <a:pPr algn="ctr"/>
+            <a:r>
+              <a:rPr lang="zh-CN" sz="1200">
+                <a:solidFill>
+                  <a:schemeClr val="bg1"/>
+                </a:solidFill>
+                <a:latin typeface="微软雅黑" panose="020B0503020204020204" charset="-122"/>
+                <a:ea typeface="微软雅黑" panose="020B0503020204020204" charset="-122"/>
+                <a:cs typeface="微软雅黑" panose="020B0503020204020204" charset="-122"/>
+              </a:rPr>
+              <a:t>模糊</a:t>
+            </a:r>
+            <a:r>
+              <a:rPr lang="en-US" altLang="zh-CN" sz="1200">
+                <a:solidFill>
+                  <a:schemeClr val="bg1"/>
+                </a:solidFill>
+                <a:latin typeface="微软雅黑" panose="020B0503020204020204" charset="-122"/>
+                <a:ea typeface="微软雅黑" panose="020B0503020204020204" charset="-122"/>
+                <a:cs typeface="微软雅黑" panose="020B0503020204020204" charset="-122"/>
+              </a:rPr>
+              <a:t>2</a:t>
+            </a:r>
+            <a:endParaRPr lang="en-US" altLang="zh-CN" sz="1200">
+              <a:solidFill>
+                <a:schemeClr val="bg1"/>
+              </a:solidFill>
+              <a:latin typeface="微软雅黑" panose="020B0503020204020204" charset="-122"/>
+              <a:ea typeface="微软雅黑" panose="020B0503020204020204" charset="-122"/>
+              <a:cs typeface="微软雅黑" panose="020B0503020204020204" charset="-122"/>
+            </a:endParaRPr>
+          </a:p>
+        </p:txBody>
+      </p:sp>
+      <p:sp>
+        <p:nvSpPr>
+          <p:cNvPr id="8" name="文本框 7"/>
+          <p:cNvSpPr txBox="1"/>
+          <p:nvPr/>
+        </p:nvSpPr>
+        <p:spPr>
+          <a:xfrm>
+            <a:off x="9242425" y="3797300"/>
+            <a:ext cx="3063240" cy="275590"/>
+          </a:xfrm>
+          <a:prstGeom prst="rect">
+            <a:avLst/>
+          </a:prstGeom>
+          <a:noFill/>
+        </p:spPr>
+        <p:txBody>
+          <a:bodyPr wrap="square" rtlCol="0">
+            <a:spAutoFit/>
+          </a:bodyPr>
+          <a:p>
+            <a:pPr algn="ctr"/>
+            <a:r>
+              <a:rPr lang="zh-CN" sz="1200">
+                <a:solidFill>
+                  <a:schemeClr val="bg1"/>
+                </a:solidFill>
+                <a:latin typeface="微软雅黑" panose="020B0503020204020204" charset="-122"/>
+                <a:ea typeface="微软雅黑" panose="020B0503020204020204" charset="-122"/>
+                <a:cs typeface="微软雅黑" panose="020B0503020204020204" charset="-122"/>
+              </a:rPr>
+              <a:t>锐化</a:t>
+            </a:r>
+            <a:r>
+              <a:rPr lang="en-US" altLang="zh-CN" sz="1200">
+                <a:solidFill>
+                  <a:schemeClr val="bg1"/>
+                </a:solidFill>
+                <a:latin typeface="微软雅黑" panose="020B0503020204020204" charset="-122"/>
+                <a:ea typeface="微软雅黑" panose="020B0503020204020204" charset="-122"/>
+                <a:cs typeface="微软雅黑" panose="020B0503020204020204" charset="-122"/>
+              </a:rPr>
+              <a:t>10</a:t>
+            </a:r>
+            <a:endParaRPr lang="en-US" altLang="zh-CN" sz="1200">
+              <a:solidFill>
+                <a:schemeClr val="bg1"/>
+              </a:solidFill>
+              <a:latin typeface="微软雅黑" panose="020B0503020204020204" charset="-122"/>
+              <a:ea typeface="微软雅黑" panose="020B0503020204020204" charset="-122"/>
+              <a:cs typeface="微软雅黑" panose="020B0503020204020204" charset="-122"/>
+            </a:endParaRPr>
+          </a:p>
+        </p:txBody>
+      </p:sp>
+    </p:spTree>
+  </p:cSld>
+  <p:clrMapOvr>
+    <a:masterClrMapping/>
+  </p:clrMapOvr>
+</p:sld>
+</file>
+
+<file path=ppt/slides/slide6.xml><?xml version="1.0" encoding="utf-8"?>
+<p:sld xmlns:a="http://schemas.openxmlformats.org/drawingml/2006/main" xmlns:r="http://schemas.openxmlformats.org/officeDocument/2006/relationships" xmlns:p="http://schemas.openxmlformats.org/presentationml/2006/main">
+  <p:cSld>
+    <p:bg>
+      <p:bgPr>
+        <a:solidFill>
+          <a:srgbClr val="FFFFFF"/>
+        </a:solidFill>
+        <a:effectLst/>
+      </p:bgPr>
+    </p:bg>
+    <p:spTree>
+      <p:nvGrpSpPr>
+        <p:cNvPr id="1" name=""/>
+        <p:cNvGrpSpPr/>
+        <p:nvPr/>
+      </p:nvGrpSpPr>
+      <p:grpSpPr/>
+      <p:pic>
+        <p:nvPicPr>
+          <p:cNvPr id="48" name="图片 47" descr="tree"/>
+          <p:cNvPicPr>
+            <a:picLocks noChangeAspect="1"/>
+          </p:cNvPicPr>
+          <p:nvPr/>
+        </p:nvPicPr>
+        <p:blipFill>
+          <a:blip r:embed="rId1">
+            <a:extLst>
+              <a:ext uri="{96DAC541-7B7A-43D3-8B79-37D633B846F1}">
+                <asvg:svgBlip xmlns:asvg="http://schemas.microsoft.com/office/drawing/2016/SVG/main" r:embed="rId2"/>
+              </a:ext>
+            </a:extLst>
+          </a:blip>
+          <a:stretch>
+            <a:fillRect/>
+          </a:stretch>
+        </p:blipFill>
+        <p:spPr>
+          <a:xfrm>
+            <a:off x="4340225" y="992505"/>
+            <a:ext cx="647700" cy="647700"/>
+          </a:xfrm>
+          <a:prstGeom prst="rect">
+            <a:avLst/>
+          </a:prstGeom>
+        </p:spPr>
+      </p:pic>
+      <p:pic>
+        <p:nvPicPr>
+          <p:cNvPr id="43" name="图片 42" descr="tree"/>
+          <p:cNvPicPr>
+            <a:picLocks noChangeAspect="1"/>
+          </p:cNvPicPr>
+          <p:nvPr/>
+        </p:nvPicPr>
+        <p:blipFill>
+          <a:blip r:embed="rId1">
+            <a:extLst>
+              <a:ext uri="{96DAC541-7B7A-43D3-8B79-37D633B846F1}">
+                <asvg:svgBlip xmlns:asvg="http://schemas.microsoft.com/office/drawing/2016/SVG/main" r:embed="rId2"/>
+              </a:ext>
+            </a:extLst>
+          </a:blip>
+          <a:stretch>
+            <a:fillRect/>
+          </a:stretch>
+        </p:blipFill>
+        <p:spPr>
+          <a:xfrm>
+            <a:off x="3705225" y="1039495"/>
+            <a:ext cx="497840" cy="497840"/>
+          </a:xfrm>
+          <a:prstGeom prst="rect">
+            <a:avLst/>
+          </a:prstGeom>
+        </p:spPr>
+      </p:pic>
+      <p:pic>
+        <p:nvPicPr>
+          <p:cNvPr id="60" name="图片 59" descr="菱形"/>
+          <p:cNvPicPr>
+            <a:picLocks noChangeAspect="1"/>
+          </p:cNvPicPr>
+          <p:nvPr/>
+        </p:nvPicPr>
+        <p:blipFill>
+          <a:blip r:embed="rId3">
+            <a:extLst>
+              <a:ext uri="{96DAC541-7B7A-43D3-8B79-37D633B846F1}">
+                <asvg:svgBlip xmlns:asvg="http://schemas.microsoft.com/office/drawing/2016/SVG/main" r:embed="rId4"/>
+              </a:ext>
+            </a:extLst>
+          </a:blip>
+          <a:stretch>
+            <a:fillRect/>
+          </a:stretch>
+        </p:blipFill>
+        <p:spPr>
+          <a:xfrm>
+            <a:off x="5215255" y="1377315"/>
+            <a:ext cx="457200" cy="457200"/>
+          </a:xfrm>
+          <a:prstGeom prst="rect">
+            <a:avLst/>
+          </a:prstGeom>
+        </p:spPr>
+      </p:pic>
+      <p:pic>
+        <p:nvPicPr>
+          <p:cNvPr id="58" name="图片 57" descr="菱形"/>
+          <p:cNvPicPr>
+            <a:picLocks noChangeAspect="1"/>
+          </p:cNvPicPr>
+          <p:nvPr/>
+        </p:nvPicPr>
+        <p:blipFill>
+          <a:blip r:embed="rId3">
+            <a:extLst>
+              <a:ext uri="{96DAC541-7B7A-43D3-8B79-37D633B846F1}">
+                <asvg:svgBlip xmlns:asvg="http://schemas.microsoft.com/office/drawing/2016/SVG/main" r:embed="rId4"/>
+              </a:ext>
+            </a:extLst>
+          </a:blip>
+          <a:stretch>
+            <a:fillRect/>
+          </a:stretch>
+        </p:blipFill>
+        <p:spPr>
+          <a:xfrm>
+            <a:off x="3213735" y="1398270"/>
+            <a:ext cx="457200" cy="457200"/>
+          </a:xfrm>
+          <a:prstGeom prst="rect">
+            <a:avLst/>
+          </a:prstGeom>
+        </p:spPr>
+      </p:pic>
+      <p:pic>
+        <p:nvPicPr>
+          <p:cNvPr id="59" name="图片 58" descr="菱形"/>
+          <p:cNvPicPr>
+            <a:picLocks noChangeAspect="1"/>
+          </p:cNvPicPr>
+          <p:nvPr/>
+        </p:nvPicPr>
+        <p:blipFill>
+          <a:blip r:embed="rId3">
+            <a:extLst>
+              <a:ext uri="{96DAC541-7B7A-43D3-8B79-37D633B846F1}">
+                <asvg:svgBlip xmlns:asvg="http://schemas.microsoft.com/office/drawing/2016/SVG/main" r:embed="rId4"/>
+              </a:ext>
+            </a:extLst>
+          </a:blip>
+          <a:stretch>
+            <a:fillRect/>
+          </a:stretch>
+        </p:blipFill>
+        <p:spPr>
+          <a:xfrm>
+            <a:off x="4203065" y="1433195"/>
+            <a:ext cx="382905" cy="382905"/>
+          </a:xfrm>
+          <a:prstGeom prst="rect">
+            <a:avLst/>
+          </a:prstGeom>
+        </p:spPr>
+      </p:pic>
+      <p:pic>
+        <p:nvPicPr>
+          <p:cNvPr id="4" name="图片 3"/>
+          <p:cNvPicPr>
+            <a:picLocks noChangeAspect="1"/>
+          </p:cNvPicPr>
+          <p:nvPr/>
+        </p:nvPicPr>
+        <p:blipFill>
+          <a:blip r:embed="rId5"/>
+          <a:stretch>
+            <a:fillRect/>
+          </a:stretch>
+        </p:blipFill>
+        <p:spPr>
+          <a:xfrm>
+            <a:off x="-62865" y="477520"/>
+            <a:ext cx="2982595" cy="1232535"/>
+          </a:xfrm>
+          <a:prstGeom prst="rect">
+            <a:avLst/>
+          </a:prstGeom>
+        </p:spPr>
+      </p:pic>
+      <p:pic>
+        <p:nvPicPr>
+          <p:cNvPr id="44" name="图片 43" descr="tree"/>
+          <p:cNvPicPr>
+            <a:picLocks noChangeAspect="1"/>
+          </p:cNvPicPr>
+          <p:nvPr/>
+        </p:nvPicPr>
+        <p:blipFill>
+          <a:blip r:embed="rId1">
+            <a:extLst>
+              <a:ext uri="{96DAC541-7B7A-43D3-8B79-37D633B846F1}">
+                <asvg:svgBlip xmlns:asvg="http://schemas.microsoft.com/office/drawing/2016/SVG/main" r:embed="rId2"/>
+              </a:ext>
+            </a:extLst>
+          </a:blip>
+          <a:stretch>
+            <a:fillRect/>
+          </a:stretch>
+        </p:blipFill>
+        <p:spPr>
+          <a:xfrm>
+            <a:off x="5133340" y="477520"/>
+            <a:ext cx="1163955" cy="1163955"/>
+          </a:xfrm>
+          <a:prstGeom prst="rect">
+            <a:avLst/>
+          </a:prstGeom>
+        </p:spPr>
+      </p:pic>
+      <p:cxnSp>
+        <p:nvCxnSpPr>
+          <p:cNvPr id="2" name="直接连接符 1"/>
+          <p:cNvCxnSpPr/>
+          <p:nvPr/>
+        </p:nvCxnSpPr>
+        <p:spPr>
+          <a:xfrm flipV="1">
+            <a:off x="321945" y="1597025"/>
+            <a:ext cx="11461750" cy="17145"/>
+          </a:xfrm>
+          <a:prstGeom prst="line">
+            <a:avLst/>
+          </a:prstGeom>
+          <a:ln>
+            <a:solidFill>
+              <a:schemeClr val="bg2">
+                <a:lumMod val="50000"/>
+              </a:schemeClr>
+            </a:solidFill>
+          </a:ln>
+        </p:spPr>
+        <p:style>
+          <a:lnRef idx="2">
+            <a:schemeClr val="accent1"/>
+          </a:lnRef>
+          <a:fillRef idx="0">
+            <a:srgbClr val="FFFFFF"/>
+          </a:fillRef>
+          <a:effectRef idx="0">
+            <a:srgbClr val="FFFFFF"/>
+          </a:effectRef>
+          <a:fontRef idx="minor">
+            <a:schemeClr val="tx1"/>
+          </a:fontRef>
+        </p:style>
+      </p:cxnSp>
+      <p:pic>
+        <p:nvPicPr>
+          <p:cNvPr id="9" name="图片 8" descr="石头"/>
+          <p:cNvPicPr>
+            <a:picLocks noChangeAspect="1"/>
+          </p:cNvPicPr>
+          <p:nvPr/>
+        </p:nvPicPr>
+        <p:blipFill>
+          <a:blip r:embed="rId6">
+            <a:extLst>
+              <a:ext uri="{96DAC541-7B7A-43D3-8B79-37D633B846F1}">
+                <asvg:svgBlip xmlns:asvg="http://schemas.microsoft.com/office/drawing/2016/SVG/main" r:embed="rId7"/>
+              </a:ext>
+            </a:extLst>
+          </a:blip>
+          <a:stretch>
+            <a:fillRect/>
+          </a:stretch>
+        </p:blipFill>
+        <p:spPr>
+          <a:xfrm>
+            <a:off x="1275715" y="1251585"/>
+            <a:ext cx="457200" cy="457200"/>
+          </a:xfrm>
+          <a:prstGeom prst="rect">
+            <a:avLst/>
+          </a:prstGeom>
+        </p:spPr>
+      </p:pic>
+      <p:pic>
+        <p:nvPicPr>
+          <p:cNvPr id="10" name="图片 9" descr="石头"/>
+          <p:cNvPicPr>
+            <a:picLocks noChangeAspect="1"/>
+          </p:cNvPicPr>
+          <p:nvPr/>
+        </p:nvPicPr>
+        <p:blipFill>
+          <a:blip r:embed="rId6">
+            <a:extLst>
+              <a:ext uri="{96DAC541-7B7A-43D3-8B79-37D633B846F1}">
+                <asvg:svgBlip xmlns:asvg="http://schemas.microsoft.com/office/drawing/2016/SVG/main" r:embed="rId8"/>
+              </a:ext>
+            </a:extLst>
+          </a:blip>
+          <a:stretch>
+            <a:fillRect/>
+          </a:stretch>
+        </p:blipFill>
+        <p:spPr>
+          <a:xfrm>
+            <a:off x="1805305" y="1473200"/>
+            <a:ext cx="275590" cy="275590"/>
+          </a:xfrm>
+          <a:prstGeom prst="rect">
+            <a:avLst/>
+          </a:prstGeom>
+        </p:spPr>
+      </p:pic>
+      <p:pic>
+        <p:nvPicPr>
+          <p:cNvPr id="12" name="图片 11" descr="山情-面"/>
+          <p:cNvPicPr>
+            <a:picLocks noChangeAspect="1"/>
+          </p:cNvPicPr>
+          <p:nvPr/>
+        </p:nvPicPr>
+        <p:blipFill>
+          <a:blip r:embed="rId9">
+            <a:extLst>
+              <a:ext uri="{96DAC541-7B7A-43D3-8B79-37D633B846F1}">
+                <asvg:svgBlip xmlns:asvg="http://schemas.microsoft.com/office/drawing/2016/SVG/main" r:embed="rId10"/>
+              </a:ext>
+            </a:extLst>
+          </a:blip>
+          <a:stretch>
+            <a:fillRect/>
+          </a:stretch>
+        </p:blipFill>
+        <p:spPr>
+          <a:xfrm>
+            <a:off x="7364095" y="-498475"/>
+            <a:ext cx="2716530" cy="2716530"/>
+          </a:xfrm>
+          <a:prstGeom prst="rect">
+            <a:avLst/>
+          </a:prstGeom>
+        </p:spPr>
+      </p:pic>
+      <p:pic>
+        <p:nvPicPr>
+          <p:cNvPr id="14" name="图片 13" descr="石头"/>
+          <p:cNvPicPr>
+            <a:picLocks noChangeAspect="1"/>
+          </p:cNvPicPr>
+          <p:nvPr/>
+        </p:nvPicPr>
+        <p:blipFill>
+          <a:blip r:embed="rId6">
+            <a:extLst>
+              <a:ext uri="{96DAC541-7B7A-43D3-8B79-37D633B846F1}">
+                <asvg:svgBlip xmlns:asvg="http://schemas.microsoft.com/office/drawing/2016/SVG/main" r:embed="rId11"/>
+              </a:ext>
+            </a:extLst>
+          </a:blip>
+          <a:stretch>
+            <a:fillRect/>
+          </a:stretch>
+        </p:blipFill>
+        <p:spPr>
+          <a:xfrm>
+            <a:off x="2481580" y="1433195"/>
+            <a:ext cx="275590" cy="275590"/>
+          </a:xfrm>
+          <a:prstGeom prst="rect">
+            <a:avLst/>
+          </a:prstGeom>
+        </p:spPr>
+      </p:pic>
+      <p:pic>
+        <p:nvPicPr>
+          <p:cNvPr id="15" name="图片 14" descr="石头"/>
+          <p:cNvPicPr>
+            <a:picLocks noChangeAspect="1"/>
+          </p:cNvPicPr>
+          <p:nvPr/>
+        </p:nvPicPr>
+        <p:blipFill>
+          <a:blip r:embed="rId6">
+            <a:extLst>
+              <a:ext uri="{96DAC541-7B7A-43D3-8B79-37D633B846F1}">
+                <asvg:svgBlip xmlns:asvg="http://schemas.microsoft.com/office/drawing/2016/SVG/main" r:embed="rId12"/>
+              </a:ext>
+            </a:extLst>
+          </a:blip>
+          <a:stretch>
+            <a:fillRect/>
+          </a:stretch>
+        </p:blipFill>
+        <p:spPr>
+          <a:xfrm>
+            <a:off x="2192655" y="1433195"/>
+            <a:ext cx="275590" cy="275590"/>
+          </a:xfrm>
+          <a:prstGeom prst="rect">
+            <a:avLst/>
+          </a:prstGeom>
+        </p:spPr>
+      </p:pic>
+      <p:pic>
+        <p:nvPicPr>
+          <p:cNvPr id="17" name="图片 16" descr="石头"/>
+          <p:cNvPicPr>
+            <a:picLocks noChangeAspect="1"/>
+          </p:cNvPicPr>
+          <p:nvPr/>
+        </p:nvPicPr>
+        <p:blipFill>
+          <a:blip r:embed="rId6">
+            <a:extLst>
+              <a:ext uri="{96DAC541-7B7A-43D3-8B79-37D633B846F1}">
+                <asvg:svgBlip xmlns:asvg="http://schemas.microsoft.com/office/drawing/2016/SVG/main" r:embed="rId13"/>
+              </a:ext>
+            </a:extLst>
+          </a:blip>
+          <a:stretch>
+            <a:fillRect/>
+          </a:stretch>
+        </p:blipFill>
+        <p:spPr>
+          <a:xfrm>
+            <a:off x="2759710" y="1433195"/>
+            <a:ext cx="275590" cy="275590"/>
+          </a:xfrm>
+          <a:prstGeom prst="rect">
+            <a:avLst/>
+          </a:prstGeom>
+        </p:spPr>
+      </p:pic>
+      <p:pic>
+        <p:nvPicPr>
+          <p:cNvPr id="18" name="图片 17" descr="石头"/>
+          <p:cNvPicPr>
+            <a:picLocks noChangeAspect="1"/>
+          </p:cNvPicPr>
+          <p:nvPr/>
+        </p:nvPicPr>
+        <p:blipFill>
+          <a:blip r:embed="rId6">
+            <a:extLst>
+              <a:ext uri="{96DAC541-7B7A-43D3-8B79-37D633B846F1}">
+                <asvg:svgBlip xmlns:asvg="http://schemas.microsoft.com/office/drawing/2016/SVG/main" r:embed="rId14"/>
+              </a:ext>
+            </a:extLst>
+          </a:blip>
+          <a:stretch>
+            <a:fillRect/>
+          </a:stretch>
+        </p:blipFill>
+        <p:spPr>
+          <a:xfrm>
+            <a:off x="2938145" y="1433195"/>
+            <a:ext cx="275590" cy="275590"/>
+          </a:xfrm>
+          <a:prstGeom prst="rect">
+            <a:avLst/>
+          </a:prstGeom>
+        </p:spPr>
+      </p:pic>
+      <p:pic>
+        <p:nvPicPr>
+          <p:cNvPr id="19" name="图片 18" descr="石头"/>
+          <p:cNvPicPr>
+            <a:picLocks noChangeAspect="1"/>
+          </p:cNvPicPr>
+          <p:nvPr/>
+        </p:nvPicPr>
+        <p:blipFill>
+          <a:blip r:embed="rId6">
+            <a:extLst>
+              <a:ext uri="{96DAC541-7B7A-43D3-8B79-37D633B846F1}">
+                <asvg:svgBlip xmlns:asvg="http://schemas.microsoft.com/office/drawing/2016/SVG/main" r:embed="rId15"/>
+              </a:ext>
+            </a:extLst>
+          </a:blip>
+          <a:stretch>
+            <a:fillRect/>
+          </a:stretch>
+        </p:blipFill>
+        <p:spPr>
+          <a:xfrm>
+            <a:off x="2919730" y="1433195"/>
+            <a:ext cx="275590" cy="275590"/>
+          </a:xfrm>
+          <a:prstGeom prst="rect">
+            <a:avLst/>
+          </a:prstGeom>
+        </p:spPr>
+      </p:pic>
+      <p:pic>
+        <p:nvPicPr>
+          <p:cNvPr id="20" name="图片 19" descr="石头"/>
+          <p:cNvPicPr>
+            <a:picLocks noChangeAspect="1"/>
+          </p:cNvPicPr>
+          <p:nvPr/>
+        </p:nvPicPr>
+        <p:blipFill>
+          <a:blip r:embed="rId6">
+            <a:extLst>
+              <a:ext uri="{96DAC541-7B7A-43D3-8B79-37D633B846F1}">
+                <asvg:svgBlip xmlns:asvg="http://schemas.microsoft.com/office/drawing/2016/SVG/main" r:embed="rId16"/>
+              </a:ext>
+            </a:extLst>
+          </a:blip>
+          <a:stretch>
+            <a:fillRect/>
+          </a:stretch>
+        </p:blipFill>
+        <p:spPr>
+          <a:xfrm>
+            <a:off x="2644140" y="1473200"/>
+            <a:ext cx="275590" cy="275590"/>
+          </a:xfrm>
+          <a:prstGeom prst="rect">
+            <a:avLst/>
+          </a:prstGeom>
+        </p:spPr>
+      </p:pic>
+      <p:pic>
+        <p:nvPicPr>
+          <p:cNvPr id="22" name="图片 21" descr="石头"/>
+          <p:cNvPicPr>
+            <a:picLocks noChangeAspect="1"/>
+          </p:cNvPicPr>
+          <p:nvPr/>
+        </p:nvPicPr>
+        <p:blipFill>
+          <a:blip r:embed="rId6">
+            <a:extLst>
+              <a:ext uri="{96DAC541-7B7A-43D3-8B79-37D633B846F1}">
+                <asvg:svgBlip xmlns:asvg="http://schemas.microsoft.com/office/drawing/2016/SVG/main" r:embed="rId17"/>
+              </a:ext>
+            </a:extLst>
+          </a:blip>
+          <a:stretch>
+            <a:fillRect/>
+          </a:stretch>
+        </p:blipFill>
+        <p:spPr>
+          <a:xfrm>
+            <a:off x="3542030" y="1537335"/>
+            <a:ext cx="275590" cy="211455"/>
+          </a:xfrm>
+          <a:prstGeom prst="rect">
+            <a:avLst/>
+          </a:prstGeom>
+        </p:spPr>
+      </p:pic>
+      <p:pic>
+        <p:nvPicPr>
+          <p:cNvPr id="26" name="图片 25" descr="石头"/>
+          <p:cNvPicPr>
+            <a:picLocks noChangeAspect="1"/>
+          </p:cNvPicPr>
+          <p:nvPr/>
+        </p:nvPicPr>
+        <p:blipFill>
+          <a:blip r:embed="rId6">
+            <a:extLst>
+              <a:ext uri="{96DAC541-7B7A-43D3-8B79-37D633B846F1}">
+                <asvg:svgBlip xmlns:asvg="http://schemas.microsoft.com/office/drawing/2016/SVG/main" r:embed="rId18"/>
+              </a:ext>
+            </a:extLst>
+          </a:blip>
+          <a:stretch>
+            <a:fillRect/>
+          </a:stretch>
+        </p:blipFill>
+        <p:spPr>
+          <a:xfrm>
+            <a:off x="3817620" y="1433195"/>
+            <a:ext cx="275590" cy="275590"/>
+          </a:xfrm>
+          <a:prstGeom prst="rect">
+            <a:avLst/>
+          </a:prstGeom>
+        </p:spPr>
+      </p:pic>
+      <p:pic>
+        <p:nvPicPr>
+          <p:cNvPr id="30" name="图片 29" descr="石头"/>
+          <p:cNvPicPr>
+            <a:picLocks noChangeAspect="1"/>
+          </p:cNvPicPr>
+          <p:nvPr/>
+        </p:nvPicPr>
+        <p:blipFill>
+          <a:blip r:embed="rId6">
+            <a:extLst>
+              <a:ext uri="{96DAC541-7B7A-43D3-8B79-37D633B846F1}">
+                <asvg:svgBlip xmlns:asvg="http://schemas.microsoft.com/office/drawing/2016/SVG/main" r:embed="rId19"/>
+              </a:ext>
+            </a:extLst>
+          </a:blip>
+          <a:stretch>
+            <a:fillRect/>
+          </a:stretch>
+        </p:blipFill>
+        <p:spPr>
+          <a:xfrm>
+            <a:off x="4405630" y="1492885"/>
+            <a:ext cx="275590" cy="275590"/>
+          </a:xfrm>
+          <a:prstGeom prst="rect">
+            <a:avLst/>
+          </a:prstGeom>
+        </p:spPr>
+      </p:pic>
+      <p:pic>
+        <p:nvPicPr>
+          <p:cNvPr id="31" name="图片 30" descr="石头"/>
+          <p:cNvPicPr>
+            <a:picLocks noChangeAspect="1"/>
+          </p:cNvPicPr>
+          <p:nvPr/>
+        </p:nvPicPr>
+        <p:blipFill>
+          <a:blip r:embed="rId6">
+            <a:extLst>
+              <a:ext uri="{96DAC541-7B7A-43D3-8B79-37D633B846F1}">
+                <asvg:svgBlip xmlns:asvg="http://schemas.microsoft.com/office/drawing/2016/SVG/main" r:embed="rId20"/>
+              </a:ext>
+            </a:extLst>
+          </a:blip>
+          <a:stretch>
+            <a:fillRect/>
+          </a:stretch>
+        </p:blipFill>
+        <p:spPr>
+          <a:xfrm>
+            <a:off x="3970020" y="1398270"/>
+            <a:ext cx="370205" cy="370205"/>
+          </a:xfrm>
+          <a:prstGeom prst="rect">
+            <a:avLst/>
+          </a:prstGeom>
+        </p:spPr>
+      </p:pic>
+      <p:pic>
+        <p:nvPicPr>
+          <p:cNvPr id="32" name="图片 31" descr="石头"/>
+          <p:cNvPicPr>
+            <a:picLocks noChangeAspect="1"/>
+          </p:cNvPicPr>
+          <p:nvPr/>
+        </p:nvPicPr>
+        <p:blipFill>
+          <a:blip r:embed="rId6">
+            <a:extLst>
+              <a:ext uri="{96DAC541-7B7A-43D3-8B79-37D633B846F1}">
+                <asvg:svgBlip xmlns:asvg="http://schemas.microsoft.com/office/drawing/2016/SVG/main" r:embed="rId21"/>
+              </a:ext>
+            </a:extLst>
+          </a:blip>
+          <a:stretch>
+            <a:fillRect/>
+          </a:stretch>
+        </p:blipFill>
+        <p:spPr>
+          <a:xfrm>
+            <a:off x="3971290" y="1536700"/>
+            <a:ext cx="231775" cy="231775"/>
+          </a:xfrm>
+          <a:prstGeom prst="rect">
+            <a:avLst/>
+          </a:prstGeom>
+        </p:spPr>
+      </p:pic>
+      <p:pic>
+        <p:nvPicPr>
+          <p:cNvPr id="33" name="图片 32" descr="石头"/>
+          <p:cNvPicPr>
+            <a:picLocks noChangeAspect="1"/>
+          </p:cNvPicPr>
+          <p:nvPr/>
+        </p:nvPicPr>
+        <p:blipFill>
+          <a:blip r:embed="rId6">
+            <a:extLst>
+              <a:ext uri="{96DAC541-7B7A-43D3-8B79-37D633B846F1}">
+                <asvg:svgBlip xmlns:asvg="http://schemas.microsoft.com/office/drawing/2016/SVG/main" r:embed="rId22"/>
+              </a:ext>
+            </a:extLst>
+          </a:blip>
+          <a:stretch>
+            <a:fillRect/>
+          </a:stretch>
+        </p:blipFill>
+        <p:spPr>
+          <a:xfrm>
+            <a:off x="4628515" y="1492885"/>
+            <a:ext cx="275590" cy="275590"/>
+          </a:xfrm>
+          <a:prstGeom prst="rect">
+            <a:avLst/>
+          </a:prstGeom>
+        </p:spPr>
+      </p:pic>
+      <p:pic>
+        <p:nvPicPr>
+          <p:cNvPr id="38" name="图片 37" descr="石头"/>
+          <p:cNvPicPr>
+            <a:picLocks noChangeAspect="1"/>
+          </p:cNvPicPr>
+          <p:nvPr/>
+        </p:nvPicPr>
+        <p:blipFill>
+          <a:blip r:embed="rId6">
+            <a:extLst>
+              <a:ext uri="{96DAC541-7B7A-43D3-8B79-37D633B846F1}">
+                <asvg:svgBlip xmlns:asvg="http://schemas.microsoft.com/office/drawing/2016/SVG/main" r:embed="rId23"/>
+              </a:ext>
+            </a:extLst>
+          </a:blip>
+          <a:stretch>
+            <a:fillRect/>
+          </a:stretch>
+        </p:blipFill>
+        <p:spPr>
+          <a:xfrm>
+            <a:off x="3670935" y="1433195"/>
+            <a:ext cx="275590" cy="275590"/>
+          </a:xfrm>
+          <a:prstGeom prst="rect">
+            <a:avLst/>
+          </a:prstGeom>
+        </p:spPr>
+      </p:pic>
+      <p:pic>
+        <p:nvPicPr>
+          <p:cNvPr id="39" name="图片 38" descr="石头"/>
+          <p:cNvPicPr>
+            <a:picLocks noChangeAspect="1"/>
+          </p:cNvPicPr>
+          <p:nvPr/>
+        </p:nvPicPr>
+        <p:blipFill>
+          <a:blip r:embed="rId6">
+            <a:extLst>
+              <a:ext uri="{96DAC541-7B7A-43D3-8B79-37D633B846F1}">
+                <asvg:svgBlip xmlns:asvg="http://schemas.microsoft.com/office/drawing/2016/SVG/main" r:embed="rId24"/>
+              </a:ext>
+            </a:extLst>
+          </a:blip>
+          <a:stretch>
+            <a:fillRect/>
+          </a:stretch>
+        </p:blipFill>
+        <p:spPr>
+          <a:xfrm>
+            <a:off x="5985510" y="1391920"/>
+            <a:ext cx="275590" cy="275590"/>
+          </a:xfrm>
+          <a:prstGeom prst="rect">
+            <a:avLst/>
+          </a:prstGeom>
+        </p:spPr>
+      </p:pic>
+      <p:pic>
+        <p:nvPicPr>
+          <p:cNvPr id="40" name="图片 39" descr="石头"/>
+          <p:cNvPicPr>
+            <a:picLocks noChangeAspect="1"/>
+          </p:cNvPicPr>
+          <p:nvPr/>
+        </p:nvPicPr>
+        <p:blipFill>
+          <a:blip r:embed="rId6">
+            <a:extLst>
+              <a:ext uri="{96DAC541-7B7A-43D3-8B79-37D633B846F1}">
+                <asvg:svgBlip xmlns:asvg="http://schemas.microsoft.com/office/drawing/2016/SVG/main" r:embed="rId25"/>
+              </a:ext>
+            </a:extLst>
+          </a:blip>
+          <a:stretch>
+            <a:fillRect/>
+          </a:stretch>
+        </p:blipFill>
+        <p:spPr>
+          <a:xfrm>
+            <a:off x="6261100" y="1377315"/>
+            <a:ext cx="275590" cy="275590"/>
+          </a:xfrm>
+          <a:prstGeom prst="rect">
+            <a:avLst/>
+          </a:prstGeom>
+        </p:spPr>
+      </p:pic>
+      <p:pic>
+        <p:nvPicPr>
+          <p:cNvPr id="41" name="图片 40" descr="石头"/>
+          <p:cNvPicPr>
+            <a:picLocks noChangeAspect="1"/>
+          </p:cNvPicPr>
+          <p:nvPr/>
+        </p:nvPicPr>
+        <p:blipFill>
+          <a:blip r:embed="rId6">
+            <a:extLst>
+              <a:ext uri="{96DAC541-7B7A-43D3-8B79-37D633B846F1}">
+                <asvg:svgBlip xmlns:asvg="http://schemas.microsoft.com/office/drawing/2016/SVG/main" r:embed="rId26"/>
+              </a:ext>
+            </a:extLst>
+          </a:blip>
+          <a:stretch>
+            <a:fillRect/>
+          </a:stretch>
+        </p:blipFill>
+        <p:spPr>
+          <a:xfrm>
+            <a:off x="5577205" y="1398270"/>
+            <a:ext cx="275590" cy="275590"/>
+          </a:xfrm>
+          <a:prstGeom prst="rect">
+            <a:avLst/>
+          </a:prstGeom>
+        </p:spPr>
+      </p:pic>
+      <p:pic>
+        <p:nvPicPr>
+          <p:cNvPr id="45" name="图片 44" descr="tree"/>
+          <p:cNvPicPr>
+            <a:picLocks noChangeAspect="1"/>
+          </p:cNvPicPr>
+          <p:nvPr/>
+        </p:nvPicPr>
+        <p:blipFill>
+          <a:blip r:embed="rId1">
+            <a:extLst>
+              <a:ext uri="{96DAC541-7B7A-43D3-8B79-37D633B846F1}">
+                <asvg:svgBlip xmlns:asvg="http://schemas.microsoft.com/office/drawing/2016/SVG/main" r:embed="rId2"/>
+              </a:ext>
+            </a:extLst>
+          </a:blip>
+          <a:stretch>
+            <a:fillRect/>
+          </a:stretch>
+        </p:blipFill>
+        <p:spPr>
+          <a:xfrm>
+            <a:off x="2192655" y="1016000"/>
+            <a:ext cx="624205" cy="624205"/>
+          </a:xfrm>
+          <a:prstGeom prst="rect">
+            <a:avLst/>
+          </a:prstGeom>
+        </p:spPr>
+      </p:pic>
+      <p:pic>
+        <p:nvPicPr>
+          <p:cNvPr id="46" name="图片 45" descr="tree"/>
+          <p:cNvPicPr>
+            <a:picLocks noChangeAspect="1"/>
+          </p:cNvPicPr>
+          <p:nvPr/>
+        </p:nvPicPr>
+        <p:blipFill>
+          <a:blip r:embed="rId1">
+            <a:extLst>
+              <a:ext uri="{96DAC541-7B7A-43D3-8B79-37D633B846F1}">
+                <asvg:svgBlip xmlns:asvg="http://schemas.microsoft.com/office/drawing/2016/SVG/main" r:embed="rId2"/>
+              </a:ext>
+            </a:extLst>
+          </a:blip>
+          <a:stretch>
+            <a:fillRect/>
+          </a:stretch>
+        </p:blipFill>
+        <p:spPr>
+          <a:xfrm>
+            <a:off x="9119235" y="342265"/>
+            <a:ext cx="673735" cy="673735"/>
+          </a:xfrm>
+          <a:prstGeom prst="rect">
+            <a:avLst/>
+          </a:prstGeom>
+        </p:spPr>
+      </p:pic>
+      <p:pic>
+        <p:nvPicPr>
+          <p:cNvPr id="47" name="图片 46" descr="tree"/>
+          <p:cNvPicPr>
+            <a:picLocks noChangeAspect="1"/>
+          </p:cNvPicPr>
+          <p:nvPr/>
+        </p:nvPicPr>
+        <p:blipFill>
+          <a:blip r:embed="rId1">
+            <a:extLst>
+              <a:ext uri="{96DAC541-7B7A-43D3-8B79-37D633B846F1}">
+                <asvg:svgBlip xmlns:asvg="http://schemas.microsoft.com/office/drawing/2016/SVG/main" r:embed="rId2"/>
+              </a:ext>
+            </a:extLst>
+          </a:blip>
+          <a:stretch>
+            <a:fillRect/>
+          </a:stretch>
+        </p:blipFill>
+        <p:spPr>
+          <a:xfrm>
+            <a:off x="8620760" y="146050"/>
+            <a:ext cx="498475" cy="498475"/>
+          </a:xfrm>
+          <a:prstGeom prst="rect">
+            <a:avLst/>
+          </a:prstGeom>
+        </p:spPr>
+      </p:pic>
+      <p:pic>
+        <p:nvPicPr>
+          <p:cNvPr id="49" name="图片 48" descr="低矮房屋"/>
+          <p:cNvPicPr>
+            <a:picLocks noChangeAspect="1"/>
+          </p:cNvPicPr>
+          <p:nvPr/>
+        </p:nvPicPr>
+        <p:blipFill>
+          <a:blip r:embed="rId27">
+            <a:extLst>
+              <a:ext uri="{96DAC541-7B7A-43D3-8B79-37D633B846F1}">
+                <asvg:svgBlip xmlns:asvg="http://schemas.microsoft.com/office/drawing/2016/SVG/main" r:embed="rId28"/>
+              </a:ext>
+            </a:extLst>
+          </a:blip>
+          <a:stretch>
+            <a:fillRect/>
+          </a:stretch>
+        </p:blipFill>
+        <p:spPr>
+          <a:xfrm>
+            <a:off x="6261100" y="678815"/>
+            <a:ext cx="1069975" cy="1069975"/>
+          </a:xfrm>
+          <a:prstGeom prst="rect">
+            <a:avLst/>
+          </a:prstGeom>
+        </p:spPr>
+      </p:pic>
+      <p:pic>
+        <p:nvPicPr>
+          <p:cNvPr id="50" name="图片 49" descr="tree"/>
+          <p:cNvPicPr>
+            <a:picLocks noChangeAspect="1"/>
+          </p:cNvPicPr>
+          <p:nvPr/>
+        </p:nvPicPr>
+        <p:blipFill>
+          <a:blip r:embed="rId1">
+            <a:extLst>
+              <a:ext uri="{96DAC541-7B7A-43D3-8B79-37D633B846F1}">
+                <asvg:svgBlip xmlns:asvg="http://schemas.microsoft.com/office/drawing/2016/SVG/main" r:embed="rId2"/>
+              </a:ext>
+            </a:extLst>
+          </a:blip>
+          <a:stretch>
+            <a:fillRect/>
+          </a:stretch>
+        </p:blipFill>
+        <p:spPr>
+          <a:xfrm>
+            <a:off x="2844165" y="902970"/>
+            <a:ext cx="738505" cy="738505"/>
+          </a:xfrm>
+          <a:prstGeom prst="rect">
+            <a:avLst/>
+          </a:prstGeom>
+        </p:spPr>
+      </p:pic>
+      <p:pic>
+        <p:nvPicPr>
+          <p:cNvPr id="51" name="图片 50" descr="石头"/>
+          <p:cNvPicPr>
+            <a:picLocks noChangeAspect="1"/>
+          </p:cNvPicPr>
+          <p:nvPr/>
+        </p:nvPicPr>
+        <p:blipFill>
+          <a:blip r:embed="rId6">
+            <a:extLst>
+              <a:ext uri="{96DAC541-7B7A-43D3-8B79-37D633B846F1}">
+                <asvg:svgBlip xmlns:asvg="http://schemas.microsoft.com/office/drawing/2016/SVG/main" r:embed="rId29"/>
+              </a:ext>
+            </a:extLst>
+          </a:blip>
+          <a:stretch>
+            <a:fillRect/>
+          </a:stretch>
+        </p:blipFill>
+        <p:spPr>
+          <a:xfrm>
+            <a:off x="7137400" y="1102360"/>
+            <a:ext cx="606425" cy="606425"/>
+          </a:xfrm>
+          <a:prstGeom prst="rect">
+            <a:avLst/>
+          </a:prstGeom>
+        </p:spPr>
+      </p:pic>
+      <p:pic>
+        <p:nvPicPr>
+          <p:cNvPr id="52" name="图片 51" descr="tree"/>
+          <p:cNvPicPr>
+            <a:picLocks noChangeAspect="1"/>
+          </p:cNvPicPr>
+          <p:nvPr/>
+        </p:nvPicPr>
+        <p:blipFill>
+          <a:blip r:embed="rId1">
+            <a:extLst>
+              <a:ext uri="{96DAC541-7B7A-43D3-8B79-37D633B846F1}">
+                <asvg:svgBlip xmlns:asvg="http://schemas.microsoft.com/office/drawing/2016/SVG/main" r:embed="rId2"/>
+              </a:ext>
+            </a:extLst>
+          </a:blip>
+          <a:stretch>
+            <a:fillRect/>
+          </a:stretch>
+        </p:blipFill>
+        <p:spPr>
+          <a:xfrm>
+            <a:off x="7548880" y="808990"/>
+            <a:ext cx="498475" cy="498475"/>
+          </a:xfrm>
+          <a:prstGeom prst="rect">
+            <a:avLst/>
+          </a:prstGeom>
+        </p:spPr>
+      </p:pic>
+      <p:pic>
+        <p:nvPicPr>
+          <p:cNvPr id="54" name="图片 53" descr="低矮房屋"/>
+          <p:cNvPicPr>
+            <a:picLocks noChangeAspect="1"/>
+          </p:cNvPicPr>
+          <p:nvPr/>
+        </p:nvPicPr>
+        <p:blipFill>
+          <a:blip r:embed="rId27">
+            <a:extLst>
+              <a:ext uri="{96DAC541-7B7A-43D3-8B79-37D633B846F1}">
+                <asvg:svgBlip xmlns:asvg="http://schemas.microsoft.com/office/drawing/2016/SVG/main" r:embed="rId30"/>
+              </a:ext>
+            </a:extLst>
+          </a:blip>
+          <a:stretch>
+            <a:fillRect/>
+          </a:stretch>
+        </p:blipFill>
+        <p:spPr>
+          <a:xfrm>
+            <a:off x="4815840" y="1197610"/>
+            <a:ext cx="469900" cy="469900"/>
+          </a:xfrm>
+          <a:prstGeom prst="rect">
+            <a:avLst/>
+          </a:prstGeom>
+        </p:spPr>
+      </p:pic>
+      <p:pic>
+        <p:nvPicPr>
+          <p:cNvPr id="56" name="图片 55" descr="菱形"/>
+          <p:cNvPicPr>
+            <a:picLocks noChangeAspect="1"/>
+          </p:cNvPicPr>
+          <p:nvPr/>
+        </p:nvPicPr>
+        <p:blipFill>
+          <a:blip r:embed="rId3">
+            <a:extLst>
+              <a:ext uri="{96DAC541-7B7A-43D3-8B79-37D633B846F1}">
+                <asvg:svgBlip xmlns:asvg="http://schemas.microsoft.com/office/drawing/2016/SVG/main" r:embed="rId31"/>
+              </a:ext>
+            </a:extLst>
+          </a:blip>
+          <a:stretch>
+            <a:fillRect/>
+          </a:stretch>
+        </p:blipFill>
+        <p:spPr>
+          <a:xfrm>
+            <a:off x="979805" y="1391920"/>
+            <a:ext cx="457200" cy="457200"/>
+          </a:xfrm>
+          <a:prstGeom prst="rect">
+            <a:avLst/>
+          </a:prstGeom>
+        </p:spPr>
+      </p:pic>
+      <p:pic>
+        <p:nvPicPr>
+          <p:cNvPr id="61" name="图片 60" descr="菱形"/>
+          <p:cNvPicPr>
+            <a:picLocks noChangeAspect="1"/>
+          </p:cNvPicPr>
+          <p:nvPr/>
+        </p:nvPicPr>
+        <p:blipFill>
+          <a:blip r:embed="rId3">
+            <a:extLst>
+              <a:ext uri="{96DAC541-7B7A-43D3-8B79-37D633B846F1}">
+                <asvg:svgBlip xmlns:asvg="http://schemas.microsoft.com/office/drawing/2016/SVG/main" r:embed="rId4"/>
+              </a:ext>
+            </a:extLst>
+          </a:blip>
+          <a:stretch>
+            <a:fillRect/>
+          </a:stretch>
+        </p:blipFill>
+        <p:spPr>
+          <a:xfrm>
+            <a:off x="5762625" y="1377315"/>
+            <a:ext cx="457200" cy="457200"/>
+          </a:xfrm>
+          <a:prstGeom prst="rect">
+            <a:avLst/>
+          </a:prstGeom>
+        </p:spPr>
+      </p:pic>
+      <p:pic>
+        <p:nvPicPr>
+          <p:cNvPr id="62" name="图片 61" descr="菱形"/>
+          <p:cNvPicPr>
+            <a:picLocks noChangeAspect="1"/>
+          </p:cNvPicPr>
+          <p:nvPr/>
+        </p:nvPicPr>
+        <p:blipFill>
+          <a:blip r:embed="rId3">
+            <a:extLst>
+              <a:ext uri="{96DAC541-7B7A-43D3-8B79-37D633B846F1}">
+                <asvg:svgBlip xmlns:asvg="http://schemas.microsoft.com/office/drawing/2016/SVG/main" r:embed="rId4"/>
+              </a:ext>
+            </a:extLst>
+          </a:blip>
+          <a:stretch>
+            <a:fillRect/>
+          </a:stretch>
+        </p:blipFill>
+        <p:spPr>
+          <a:xfrm>
+            <a:off x="6946265" y="1377315"/>
+            <a:ext cx="457200" cy="457200"/>
+          </a:xfrm>
+          <a:prstGeom prst="rect">
+            <a:avLst/>
+          </a:prstGeom>
+        </p:spPr>
+      </p:pic>
+      <p:pic>
+        <p:nvPicPr>
+          <p:cNvPr id="63" name="图片 62" descr="菱形"/>
+          <p:cNvPicPr>
+            <a:picLocks noChangeAspect="1"/>
+          </p:cNvPicPr>
+          <p:nvPr/>
+        </p:nvPicPr>
+        <p:blipFill>
+          <a:blip r:embed="rId3">
+            <a:extLst>
+              <a:ext uri="{96DAC541-7B7A-43D3-8B79-37D633B846F1}">
+                <asvg:svgBlip xmlns:asvg="http://schemas.microsoft.com/office/drawing/2016/SVG/main" r:embed="rId4"/>
+              </a:ext>
+            </a:extLst>
+          </a:blip>
+          <a:stretch>
+            <a:fillRect/>
+          </a:stretch>
+        </p:blipFill>
+        <p:spPr>
+          <a:xfrm>
+            <a:off x="6353810" y="1377315"/>
+            <a:ext cx="457200" cy="457200"/>
+          </a:xfrm>
+          <a:prstGeom prst="rect">
+            <a:avLst/>
+          </a:prstGeom>
+        </p:spPr>
+      </p:pic>
+      <p:pic>
+        <p:nvPicPr>
+          <p:cNvPr id="53" name="图片 52" descr="低矮房屋"/>
+          <p:cNvPicPr>
+            <a:picLocks noChangeAspect="1"/>
+          </p:cNvPicPr>
+          <p:nvPr/>
+        </p:nvPicPr>
+        <p:blipFill>
+          <a:blip r:embed="rId27">
+            <a:extLst>
+              <a:ext uri="{96DAC541-7B7A-43D3-8B79-37D633B846F1}">
+                <asvg:svgBlip xmlns:asvg="http://schemas.microsoft.com/office/drawing/2016/SVG/main" r:embed="rId30"/>
+              </a:ext>
+            </a:extLst>
+          </a:blip>
+          <a:stretch>
+            <a:fillRect/>
+          </a:stretch>
+        </p:blipFill>
+        <p:spPr>
+          <a:xfrm>
+            <a:off x="1649730" y="965835"/>
+            <a:ext cx="742950" cy="742950"/>
+          </a:xfrm>
+          <a:prstGeom prst="rect">
+            <a:avLst/>
+          </a:prstGeom>
+        </p:spPr>
+      </p:pic>
+      <p:pic>
+        <p:nvPicPr>
+          <p:cNvPr id="57" name="图片 56" descr="菱形"/>
+          <p:cNvPicPr>
+            <a:picLocks noChangeAspect="1"/>
+          </p:cNvPicPr>
+          <p:nvPr/>
+        </p:nvPicPr>
+        <p:blipFill>
+          <a:blip r:embed="rId3">
+            <a:extLst>
+              <a:ext uri="{96DAC541-7B7A-43D3-8B79-37D633B846F1}">
+                <asvg:svgBlip xmlns:asvg="http://schemas.microsoft.com/office/drawing/2016/SVG/main" r:embed="rId4"/>
+              </a:ext>
+            </a:extLst>
+          </a:blip>
+          <a:stretch>
+            <a:fillRect/>
+          </a:stretch>
+        </p:blipFill>
+        <p:spPr>
+          <a:xfrm>
+            <a:off x="1586230" y="1377315"/>
+            <a:ext cx="457200" cy="457200"/>
+          </a:xfrm>
+          <a:prstGeom prst="rect">
+            <a:avLst/>
+          </a:prstGeom>
+        </p:spPr>
+      </p:pic>
+      <p:graphicFrame>
+        <p:nvGraphicFramePr>
+          <p:cNvPr id="66" name="表格 65"/>
+          <p:cNvGraphicFramePr/>
+          <p:nvPr>
+            <p:custDataLst>
+              <p:tags r:id="rId32"/>
+            </p:custDataLst>
+          </p:nvPr>
+        </p:nvGraphicFramePr>
+        <p:xfrm>
+          <a:off x="1323340" y="2473960"/>
+          <a:ext cx="2880000" cy="3344000"/>
+        </p:xfrm>
+        <a:graphic>
+          <a:graphicData uri="http://schemas.openxmlformats.org/drawingml/2006/table">
+            <a:tbl>
+              <a:tblPr firstRow="1" bandRow="1">
+                <a:tableStyleId>{5C22544A-7EE6-4342-B048-85BDC9FD1C3A}</a:tableStyleId>
+              </a:tblPr>
+              <a:tblGrid>
+                <a:gridCol w="360000"/>
+                <a:gridCol w="360000"/>
+                <a:gridCol w="360045"/>
+                <a:gridCol w="359955"/>
+                <a:gridCol w="360045"/>
+                <a:gridCol w="360045"/>
+                <a:gridCol w="359910"/>
+                <a:gridCol w="360000"/>
+              </a:tblGrid>
+              <a:tr h="406400">
+                <a:tc>
+                  <a:txBody>
+                    <a:bodyPr/>
+                    <a:p>
+                      <a:pPr>
+                        <a:buNone/>
+                      </a:pPr>
+                      <a:endParaRPr lang="zh-CN" altLang="en-US"/>
+                    </a:p>
+                  </a:txBody>
+                  <a:tcPr>
+                    <a:lnB w="12700" cmpd="sng">
+                      <a:solidFill>
+                        <a:schemeClr val="tx1"/>
+                      </a:solidFill>
+                      <a:prstDash val="solid"/>
+                    </a:lnB>
+                    <a:solidFill>
+                      <a:schemeClr val="bg1"/>
+                    </a:solidFill>
+                  </a:tcPr>
+                </a:tc>
+                <a:tc>
+                  <a:txBody>
+                    <a:bodyPr/>
+                    <a:p>
+                      <a:pPr>
+                        <a:buNone/>
+                      </a:pPr>
+                      <a:endParaRPr lang="zh-CN" altLang="en-US"/>
+                    </a:p>
+                  </a:txBody>
+                  <a:tcPr>
+                    <a:lnB w="12700" cmpd="sng">
+                      <a:solidFill>
+                        <a:schemeClr val="tx1"/>
+                      </a:solidFill>
+                      <a:prstDash val="solid"/>
+                    </a:lnB>
+                    <a:solidFill>
+                      <a:schemeClr val="bg1"/>
+                    </a:solidFill>
+                  </a:tcPr>
+                </a:tc>
+                <a:tc>
+                  <a:txBody>
+                    <a:bodyPr/>
+                    <a:p>
+                      <a:pPr>
+                        <a:buNone/>
+                      </a:pPr>
+                      <a:endParaRPr lang="zh-CN" altLang="en-US"/>
+                    </a:p>
+                  </a:txBody>
+                  <a:tcPr>
+                    <a:lnB w="12700" cmpd="sng">
+                      <a:solidFill>
+                        <a:schemeClr val="tx1"/>
+                      </a:solidFill>
+                      <a:prstDash val="solid"/>
+                    </a:lnB>
+                    <a:solidFill>
+                      <a:schemeClr val="bg1"/>
+                    </a:solidFill>
+                  </a:tcPr>
+                </a:tc>
+                <a:tc>
+                  <a:txBody>
+                    <a:bodyPr/>
+                    <a:p>
+                      <a:pPr>
+                        <a:buNone/>
+                      </a:pPr>
+                      <a:endParaRPr lang="zh-CN" altLang="en-US"/>
+                    </a:p>
+                  </a:txBody>
+                  <a:tcPr>
+                    <a:lnB w="12700" cmpd="sng">
+                      <a:solidFill>
+                        <a:schemeClr val="tx1"/>
+                      </a:solidFill>
+                      <a:prstDash val="solid"/>
+                    </a:lnB>
+                    <a:solidFill>
+                      <a:schemeClr val="bg1"/>
+                    </a:solidFill>
+                  </a:tcPr>
+                </a:tc>
+                <a:tc>
+                  <a:txBody>
+                    <a:bodyPr/>
+                    <a:p>
+                      <a:pPr>
+                        <a:buNone/>
+                      </a:pPr>
+                      <a:endParaRPr lang="zh-CN" altLang="en-US"/>
+                    </a:p>
+                  </a:txBody>
+                  <a:tcPr>
+                    <a:lnB w="12700" cmpd="sng">
+                      <a:solidFill>
+                        <a:schemeClr val="tx1"/>
+                      </a:solidFill>
+                      <a:prstDash val="solid"/>
+                    </a:lnB>
+                    <a:solidFill>
+                      <a:schemeClr val="bg1"/>
+                    </a:solidFill>
+                  </a:tcPr>
+                </a:tc>
+                <a:tc>
+                  <a:txBody>
+                    <a:bodyPr/>
+                    <a:p>
+                      <a:pPr>
+                        <a:buNone/>
+                      </a:pPr>
+                      <a:endParaRPr lang="zh-CN" altLang="en-US"/>
+                    </a:p>
+                  </a:txBody>
+                  <a:tcPr>
+                    <a:lnB w="12700" cmpd="sng">
+                      <a:solidFill>
+                        <a:schemeClr val="tx1"/>
+                      </a:solidFill>
+                      <a:prstDash val="solid"/>
+                    </a:lnB>
+                    <a:solidFill>
+                      <a:schemeClr val="bg1"/>
+                    </a:solidFill>
+                  </a:tcPr>
+                </a:tc>
+                <a:tc>
+                  <a:txBody>
+                    <a:bodyPr/>
+                    <a:p>
+                      <a:pPr>
+                        <a:buNone/>
+                      </a:pPr>
+                      <a:endParaRPr lang="zh-CN" altLang="en-US"/>
+                    </a:p>
+                  </a:txBody>
+                  <a:tcPr>
+                    <a:lnB w="12700" cmpd="sng">
+                      <a:solidFill>
+                        <a:schemeClr val="tx1"/>
+                      </a:solidFill>
+                      <a:prstDash val="solid"/>
+                    </a:lnB>
+                    <a:solidFill>
+                      <a:schemeClr val="bg1"/>
+                    </a:solidFill>
+                  </a:tcPr>
+                </a:tc>
+                <a:tc>
+                  <a:txBody>
+                    <a:bodyPr/>
+                    <a:p>
+                      <a:pPr>
+                        <a:buNone/>
+                      </a:pPr>
+                      <a:endParaRPr lang="zh-CN" altLang="en-US"/>
+                    </a:p>
+                  </a:txBody>
+                  <a:tcPr>
+                    <a:lnB w="12700" cmpd="sng">
+                      <a:solidFill>
+                        <a:schemeClr val="tx1"/>
+                      </a:solidFill>
+                      <a:prstDash val="solid"/>
+                    </a:lnB>
+                    <a:solidFill>
+                      <a:schemeClr val="bg1"/>
+                    </a:solidFill>
+                  </a:tcPr>
+                </a:tc>
+              </a:tr>
+              <a:tr h="367200">
+                <a:tc>
+                  <a:txBody>
+                    <a:bodyPr/>
+                    <a:p>
+                      <a:pPr>
+                        <a:buNone/>
+                      </a:pPr>
+                      <a:endParaRPr lang="zh-CN" altLang="en-US"/>
+                    </a:p>
+                  </a:txBody>
+                  <a:tcPr>
+                    <a:lnL w="12700" cmpd="sng">
+                      <a:solidFill>
+                        <a:schemeClr val="tx1"/>
+                      </a:solidFill>
+                      <a:prstDash val="solid"/>
+                    </a:lnL>
+                    <a:lnR w="12700" cmpd="sng">
+                      <a:solidFill>
+                        <a:schemeClr val="accent2"/>
+                      </a:solidFill>
+                      <a:prstDash val="solid"/>
+                    </a:lnR>
+                    <a:lnT w="12700" cmpd="sng">
+                      <a:solidFill>
+                        <a:schemeClr val="tx1"/>
+                      </a:solidFill>
+                      <a:prstDash val="solid"/>
+                    </a:lnT>
+                    <a:lnB w="12700" cmpd="sng">
+                      <a:solidFill>
+                        <a:schemeClr val="accent2"/>
+                      </a:solidFill>
+                      <a:prstDash val="solid"/>
+                    </a:lnB>
+                    <a:solidFill>
+                      <a:schemeClr val="accent2"/>
+                    </a:solidFill>
+                  </a:tcPr>
+                </a:tc>
+                <a:tc>
+                  <a:txBody>
+                    <a:bodyPr/>
+                    <a:p>
+                      <a:pPr>
+                        <a:buNone/>
+                      </a:pPr>
+                      <a:endParaRPr lang="zh-CN" altLang="en-US"/>
+                    </a:p>
+                  </a:txBody>
+                  <a:tcPr>
+                    <a:lnL w="12700" cmpd="sng">
+                      <a:solidFill>
+                        <a:schemeClr val="accent2"/>
+                      </a:solidFill>
+                      <a:prstDash val="solid"/>
+                    </a:lnL>
+                    <a:lnR w="12700" cmpd="sng">
+                      <a:solidFill>
+                        <a:schemeClr val="accent2"/>
+                      </a:solidFill>
+                      <a:prstDash val="solid"/>
+                    </a:lnR>
+                    <a:lnT w="12700" cmpd="sng">
+                      <a:solidFill>
+                        <a:schemeClr val="tx1"/>
+                      </a:solidFill>
+                      <a:prstDash val="solid"/>
+                    </a:lnT>
+                    <a:lnB w="12700" cmpd="sng">
+                      <a:solidFill>
+                        <a:schemeClr val="accent2"/>
+                      </a:solidFill>
+                      <a:prstDash val="solid"/>
+                    </a:lnB>
+                    <a:solidFill>
+                      <a:schemeClr val="accent2"/>
+                    </a:solidFill>
+                  </a:tcPr>
+                </a:tc>
+                <a:tc>
+                  <a:txBody>
+                    <a:bodyPr/>
+                    <a:p>
+                      <a:pPr>
+                        <a:buNone/>
+                      </a:pPr>
+                      <a:endParaRPr lang="zh-CN" altLang="en-US"/>
+                    </a:p>
+                  </a:txBody>
+                  <a:tcPr>
+                    <a:lnL w="12700" cmpd="sng">
+                      <a:solidFill>
+                        <a:schemeClr val="accent2"/>
+                      </a:solidFill>
+                      <a:prstDash val="solid"/>
+                    </a:lnL>
+                    <a:lnR w="12700" cmpd="sng">
+                      <a:solidFill>
+                        <a:schemeClr val="accent2"/>
+                      </a:solidFill>
+                      <a:prstDash val="solid"/>
+                    </a:lnR>
+                    <a:lnT w="12700" cmpd="sng">
+                      <a:solidFill>
+                        <a:schemeClr val="tx1"/>
+                      </a:solidFill>
+                      <a:prstDash val="solid"/>
+                    </a:lnT>
+                    <a:lnB w="12700" cmpd="sng">
+                      <a:solidFill>
+                        <a:schemeClr val="accent2"/>
+                      </a:solidFill>
+                      <a:prstDash val="solid"/>
+                    </a:lnB>
+                    <a:solidFill>
+                      <a:schemeClr val="accent2"/>
+                    </a:solidFill>
+                  </a:tcPr>
+                </a:tc>
+                <a:tc>
+                  <a:txBody>
+                    <a:bodyPr/>
+                    <a:p>
+                      <a:pPr>
+                        <a:buNone/>
+                      </a:pPr>
+                      <a:endParaRPr lang="zh-CN" altLang="en-US"/>
+                    </a:p>
+                  </a:txBody>
+                  <a:tcPr>
+                    <a:lnL w="12700" cmpd="sng">
+                      <a:solidFill>
+                        <a:schemeClr val="accent2"/>
+                      </a:solidFill>
+                      <a:prstDash val="solid"/>
+                    </a:lnL>
+                    <a:lnR w="12700" cmpd="sng">
+                      <a:solidFill>
+                        <a:schemeClr val="tx1"/>
+                      </a:solidFill>
+                      <a:prstDash val="solid"/>
+                    </a:lnR>
+                    <a:lnT w="12700" cmpd="sng">
+                      <a:solidFill>
+                        <a:schemeClr val="tx1"/>
+                      </a:solidFill>
+                      <a:prstDash val="solid"/>
+                    </a:lnT>
+                    <a:lnB w="12700" cmpd="sng">
+                      <a:solidFill>
+                        <a:schemeClr val="accent2"/>
+                      </a:solidFill>
+                      <a:prstDash val="solid"/>
+                    </a:lnB>
+                    <a:solidFill>
+                      <a:schemeClr val="accent2"/>
+                    </a:solidFill>
+                  </a:tcPr>
+                </a:tc>
+                <a:tc>
+                  <a:txBody>
+                    <a:bodyPr/>
+                    <a:p>
+                      <a:pPr>
+                        <a:buNone/>
+                      </a:pPr>
+                      <a:endParaRPr lang="zh-CN" altLang="en-US"/>
+                    </a:p>
+                  </a:txBody>
+                  <a:tcPr>
+                    <a:lnL w="12700" cmpd="sng">
+                      <a:solidFill>
+                        <a:schemeClr val="tx1"/>
+                      </a:solidFill>
+                      <a:prstDash val="solid"/>
+                    </a:lnL>
+                    <a:lnR w="12700" cmpd="sng">
+                      <a:solidFill>
+                        <a:schemeClr val="accent2"/>
+                      </a:solidFill>
+                      <a:prstDash val="solid"/>
+                    </a:lnR>
+                    <a:lnT w="12700" cmpd="sng">
+                      <a:solidFill>
+                        <a:schemeClr val="tx1"/>
+                      </a:solidFill>
+                      <a:prstDash val="solid"/>
+                    </a:lnT>
+                    <a:lnB w="12700" cmpd="sng">
+                      <a:solidFill>
+                        <a:schemeClr val="accent2"/>
+                      </a:solidFill>
+                      <a:prstDash val="solid"/>
+                    </a:lnB>
+                    <a:solidFill>
+                      <a:schemeClr val="accent2"/>
+                    </a:solidFill>
+                  </a:tcPr>
+                </a:tc>
+                <a:tc>
+                  <a:txBody>
+                    <a:bodyPr/>
+                    <a:p>
+                      <a:pPr>
+                        <a:buNone/>
+                      </a:pPr>
+                      <a:endParaRPr lang="zh-CN" altLang="en-US"/>
+                    </a:p>
+                  </a:txBody>
+                  <a:tcPr>
+                    <a:lnL w="12700" cmpd="sng">
+                      <a:solidFill>
+                        <a:schemeClr val="accent2"/>
+                      </a:solidFill>
+                      <a:prstDash val="solid"/>
+                    </a:lnL>
+                    <a:lnR w="12700" cmpd="sng">
+                      <a:solidFill>
+                        <a:schemeClr val="accent2"/>
+                      </a:solidFill>
+                      <a:prstDash val="solid"/>
+                    </a:lnR>
+                    <a:lnT w="12700" cmpd="sng">
+                      <a:solidFill>
+                        <a:schemeClr val="tx1"/>
+                      </a:solidFill>
+                      <a:prstDash val="solid"/>
+                    </a:lnT>
+                    <a:lnB w="12700" cmpd="sng">
+                      <a:solidFill>
+                        <a:schemeClr val="accent2"/>
+                      </a:solidFill>
+                      <a:prstDash val="solid"/>
+                    </a:lnB>
+                    <a:solidFill>
+                      <a:schemeClr val="accent2"/>
+                    </a:solidFill>
+                  </a:tcPr>
+                </a:tc>
+                <a:tc>
+                  <a:txBody>
+                    <a:bodyPr/>
+                    <a:p>
+                      <a:pPr>
+                        <a:buNone/>
+                      </a:pPr>
+                      <a:endParaRPr lang="zh-CN" altLang="en-US"/>
+                    </a:p>
+                  </a:txBody>
+                  <a:tcPr>
+                    <a:lnL w="12700" cmpd="sng">
+                      <a:solidFill>
+                        <a:schemeClr val="accent2"/>
+                      </a:solidFill>
+                      <a:prstDash val="solid"/>
+                    </a:lnL>
+                    <a:lnR w="12700" cmpd="sng">
+                      <a:solidFill>
+                        <a:schemeClr val="accent2"/>
+                      </a:solidFill>
+                      <a:prstDash val="solid"/>
+                    </a:lnR>
+                    <a:lnT w="12700" cmpd="sng">
+                      <a:solidFill>
+                        <a:schemeClr val="tx1"/>
+                      </a:solidFill>
+                      <a:prstDash val="solid"/>
+                    </a:lnT>
+                    <a:lnB w="12700" cmpd="sng">
+                      <a:solidFill>
+                        <a:schemeClr val="accent2"/>
+                      </a:solidFill>
+                      <a:prstDash val="solid"/>
+                    </a:lnB>
+                    <a:solidFill>
+                      <a:schemeClr val="accent2"/>
+                    </a:solidFill>
+                  </a:tcPr>
+                </a:tc>
+                <a:tc>
+                  <a:txBody>
+                    <a:bodyPr/>
+                    <a:p>
+                      <a:pPr>
+                        <a:buNone/>
+                      </a:pPr>
+                      <a:endParaRPr lang="zh-CN" altLang="en-US"/>
+                    </a:p>
+                  </a:txBody>
+                  <a:tcPr>
+                    <a:lnL w="12700" cmpd="sng">
+                      <a:solidFill>
+                        <a:schemeClr val="accent2"/>
+                      </a:solidFill>
+                      <a:prstDash val="solid"/>
+                    </a:lnL>
+                    <a:lnR w="12700" cmpd="sng">
+                      <a:solidFill>
+                        <a:schemeClr val="tx1"/>
+                      </a:solidFill>
+                      <a:prstDash val="solid"/>
+                    </a:lnR>
+                    <a:lnT w="12700" cmpd="sng">
+                      <a:solidFill>
+                        <a:schemeClr val="tx1"/>
+                      </a:solidFill>
+                      <a:prstDash val="solid"/>
+                    </a:lnT>
+                    <a:lnB w="12700" cmpd="sng">
+                      <a:solidFill>
+                        <a:schemeClr val="accent2"/>
+                      </a:solidFill>
+                      <a:prstDash val="solid"/>
+                    </a:lnB>
+                    <a:solidFill>
+                      <a:schemeClr val="accent2"/>
+                    </a:solidFill>
+                  </a:tcPr>
+                </a:tc>
+              </a:tr>
+              <a:tr h="367200">
+                <a:tc>
+                  <a:txBody>
+                    <a:bodyPr/>
+                    <a:p>
+                      <a:pPr>
+                        <a:buNone/>
+                      </a:pPr>
+                      <a:endParaRPr lang="zh-CN" altLang="en-US"/>
+                    </a:p>
+                  </a:txBody>
+                  <a:tcPr>
+                    <a:lnL w="12700" cmpd="sng">
+                      <a:solidFill>
+                        <a:schemeClr val="tx1"/>
+                      </a:solidFill>
+                      <a:prstDash val="solid"/>
+                    </a:lnL>
+                    <a:lnR w="12700" cmpd="sng">
+                      <a:solidFill>
+                        <a:schemeClr val="accent2"/>
+                      </a:solidFill>
+                      <a:prstDash val="solid"/>
+                    </a:lnR>
+                    <a:lnT w="12700" cmpd="sng">
+                      <a:solidFill>
+                        <a:schemeClr val="accent2"/>
+                      </a:solidFill>
+                      <a:prstDash val="solid"/>
+                    </a:lnT>
+                    <a:lnB w="12700" cmpd="sng">
+                      <a:solidFill>
+                        <a:schemeClr val="accent2"/>
+                      </a:solidFill>
+                      <a:prstDash val="solid"/>
+                    </a:lnB>
+                    <a:solidFill>
+                      <a:schemeClr val="accent2"/>
+                    </a:solidFill>
+                  </a:tcPr>
+                </a:tc>
+                <a:tc>
+                  <a:txBody>
+                    <a:bodyPr/>
+                    <a:p>
+                      <a:pPr>
+                        <a:buNone/>
+                      </a:pPr>
+                      <a:endParaRPr lang="zh-CN" altLang="en-US"/>
+                    </a:p>
+                  </a:txBody>
+                  <a:tcPr>
+                    <a:lnL w="12700" cmpd="sng">
+                      <a:solidFill>
+                        <a:schemeClr val="accent2"/>
+                      </a:solidFill>
+                      <a:prstDash val="solid"/>
+                    </a:lnL>
+                    <a:lnR w="12700" cmpd="sng">
+                      <a:solidFill>
+                        <a:schemeClr val="accent2"/>
+                      </a:solidFill>
+                      <a:prstDash val="solid"/>
+                    </a:lnR>
+                    <a:lnT w="12700" cmpd="sng">
+                      <a:solidFill>
+                        <a:schemeClr val="accent2"/>
+                      </a:solidFill>
+                      <a:prstDash val="solid"/>
+                    </a:lnT>
+                    <a:lnB w="12700" cmpd="sng">
+                      <a:solidFill>
+                        <a:schemeClr val="accent2"/>
+                      </a:solidFill>
+                      <a:prstDash val="solid"/>
+                    </a:lnB>
+                    <a:solidFill>
+                      <a:schemeClr val="accent2"/>
+                    </a:solidFill>
+                  </a:tcPr>
+                </a:tc>
+                <a:tc>
+                  <a:txBody>
+                    <a:bodyPr/>
+                    <a:p>
+                      <a:pPr>
+                        <a:buNone/>
+                      </a:pPr>
+                      <a:endParaRPr lang="zh-CN" altLang="en-US"/>
+                    </a:p>
+                  </a:txBody>
+                  <a:tcPr>
+                    <a:lnL w="12700" cmpd="sng">
+                      <a:solidFill>
+                        <a:schemeClr val="accent2"/>
+                      </a:solidFill>
+                      <a:prstDash val="solid"/>
+                    </a:lnL>
+                    <a:lnR w="12700" cmpd="sng">
+                      <a:solidFill>
+                        <a:schemeClr val="accent2"/>
+                      </a:solidFill>
+                      <a:prstDash val="solid"/>
+                    </a:lnR>
+                    <a:lnT w="12700" cmpd="sng">
+                      <a:solidFill>
+                        <a:schemeClr val="accent2"/>
+                      </a:solidFill>
+                      <a:prstDash val="solid"/>
+                    </a:lnT>
+                    <a:lnB w="12700" cmpd="sng">
+                      <a:solidFill>
+                        <a:schemeClr val="accent2"/>
+                      </a:solidFill>
+                      <a:prstDash val="solid"/>
+                    </a:lnB>
+                    <a:solidFill>
+                      <a:schemeClr val="accent2"/>
+                    </a:solidFill>
+                  </a:tcPr>
+                </a:tc>
+                <a:tc>
+                  <a:txBody>
+                    <a:bodyPr/>
+                    <a:p>
+                      <a:pPr>
+                        <a:buNone/>
+                      </a:pPr>
+                      <a:endParaRPr lang="zh-CN" altLang="en-US"/>
+                    </a:p>
+                  </a:txBody>
+                  <a:tcPr>
+                    <a:lnL w="12700" cmpd="sng">
+                      <a:solidFill>
+                        <a:schemeClr val="accent2"/>
+                      </a:solidFill>
+                      <a:prstDash val="solid"/>
+                    </a:lnL>
+                    <a:lnR w="12700" cmpd="sng">
+                      <a:solidFill>
+                        <a:schemeClr val="tx1"/>
+                      </a:solidFill>
+                      <a:prstDash val="solid"/>
+                    </a:lnR>
+                    <a:lnT w="12700" cmpd="sng">
+                      <a:solidFill>
+                        <a:schemeClr val="accent2"/>
+                      </a:solidFill>
+                      <a:prstDash val="solid"/>
+                    </a:lnT>
+                    <a:lnB w="12700" cmpd="sng">
+                      <a:solidFill>
+                        <a:schemeClr val="accent2"/>
+                      </a:solidFill>
+                      <a:prstDash val="solid"/>
+                    </a:lnB>
+                    <a:solidFill>
+                      <a:schemeClr val="accent2"/>
+                    </a:solidFill>
+                  </a:tcPr>
+                </a:tc>
+                <a:tc>
+                  <a:txBody>
+                    <a:bodyPr/>
+                    <a:p>
+                      <a:pPr>
+                        <a:buNone/>
+                      </a:pPr>
+                      <a:endParaRPr lang="zh-CN" altLang="en-US"/>
+                    </a:p>
+                  </a:txBody>
+                  <a:tcPr>
+                    <a:lnL w="12700" cmpd="sng">
+                      <a:solidFill>
+                        <a:schemeClr val="tx1"/>
+                      </a:solidFill>
+                      <a:prstDash val="solid"/>
+                    </a:lnL>
+                    <a:lnR w="12700" cmpd="sng">
+                      <a:solidFill>
+                        <a:schemeClr val="accent2"/>
+                      </a:solidFill>
+                      <a:prstDash val="solid"/>
+                    </a:lnR>
+                    <a:lnT w="12700" cmpd="sng">
+                      <a:solidFill>
+                        <a:schemeClr val="accent2"/>
+                      </a:solidFill>
+                      <a:prstDash val="solid"/>
+                    </a:lnT>
+                    <a:lnB w="12700" cmpd="sng">
+                      <a:solidFill>
+                        <a:schemeClr val="accent2"/>
+                      </a:solidFill>
+                      <a:prstDash val="solid"/>
+                    </a:lnB>
+                    <a:solidFill>
+                      <a:schemeClr val="accent2"/>
+                    </a:solidFill>
+                  </a:tcPr>
+                </a:tc>
+                <a:tc>
+                  <a:txBody>
+                    <a:bodyPr/>
+                    <a:p>
+                      <a:pPr>
+                        <a:buNone/>
+                      </a:pPr>
+                      <a:endParaRPr lang="zh-CN" altLang="en-US"/>
+                    </a:p>
+                  </a:txBody>
+                  <a:tcPr>
+                    <a:lnL w="12700" cmpd="sng">
+                      <a:solidFill>
+                        <a:schemeClr val="accent2"/>
+                      </a:solidFill>
+                      <a:prstDash val="solid"/>
+                    </a:lnL>
+                    <a:lnR w="12700" cmpd="sng">
+                      <a:solidFill>
+                        <a:schemeClr val="accent2"/>
+                      </a:solidFill>
+                      <a:prstDash val="solid"/>
+                    </a:lnR>
+                    <a:lnT w="12700" cmpd="sng">
+                      <a:solidFill>
+                        <a:schemeClr val="accent2"/>
+                      </a:solidFill>
+                      <a:prstDash val="solid"/>
+                    </a:lnT>
+                    <a:lnB w="12700" cmpd="sng">
+                      <a:solidFill>
+                        <a:schemeClr val="accent2"/>
+                      </a:solidFill>
+                      <a:prstDash val="solid"/>
+                    </a:lnB>
+                    <a:solidFill>
+                      <a:schemeClr val="accent2"/>
+                    </a:solidFill>
+                  </a:tcPr>
+                </a:tc>
+                <a:tc>
+                  <a:txBody>
+                    <a:bodyPr/>
+                    <a:p>
+                      <a:pPr>
+                        <a:buNone/>
+                      </a:pPr>
+                      <a:endParaRPr lang="zh-CN" altLang="en-US"/>
+                    </a:p>
+                  </a:txBody>
+                  <a:tcPr>
+                    <a:lnL w="12700" cmpd="sng">
+                      <a:solidFill>
+                        <a:schemeClr val="accent2"/>
+                      </a:solidFill>
+                      <a:prstDash val="solid"/>
+                    </a:lnL>
+                    <a:lnR w="12700" cmpd="sng">
+                      <a:solidFill>
+                        <a:schemeClr val="accent2"/>
+                      </a:solidFill>
+                      <a:prstDash val="solid"/>
+                    </a:lnR>
+                    <a:lnT w="12700" cmpd="sng">
+                      <a:solidFill>
+                        <a:schemeClr val="accent2"/>
+                      </a:solidFill>
+                      <a:prstDash val="solid"/>
+                    </a:lnT>
+                    <a:lnB w="12700" cmpd="sng">
+                      <a:solidFill>
+                        <a:schemeClr val="accent2"/>
+                      </a:solidFill>
+                      <a:prstDash val="solid"/>
+                    </a:lnB>
+                    <a:solidFill>
+                      <a:schemeClr val="accent2"/>
+                    </a:solidFill>
+                  </a:tcPr>
+                </a:tc>
+                <a:tc>
+                  <a:txBody>
+                    <a:bodyPr/>
+                    <a:p>
+                      <a:pPr>
+                        <a:buNone/>
+                      </a:pPr>
+                      <a:endParaRPr lang="zh-CN" altLang="en-US"/>
+                    </a:p>
+                  </a:txBody>
+                  <a:tcPr>
+                    <a:lnL w="12700" cmpd="sng">
+                      <a:solidFill>
+                        <a:schemeClr val="accent2"/>
+                      </a:solidFill>
+                      <a:prstDash val="solid"/>
+                    </a:lnL>
+                    <a:lnR w="12700" cmpd="sng">
+                      <a:solidFill>
+                        <a:schemeClr val="tx1"/>
+                      </a:solidFill>
+                      <a:prstDash val="solid"/>
+                    </a:lnR>
+                    <a:lnT w="12700" cmpd="sng">
+                      <a:solidFill>
+                        <a:schemeClr val="accent2"/>
+                      </a:solidFill>
+                      <a:prstDash val="solid"/>
+                    </a:lnT>
+                    <a:lnB w="12700" cmpd="sng">
+                      <a:solidFill>
+                        <a:schemeClr val="accent2"/>
+                      </a:solidFill>
+                      <a:prstDash val="solid"/>
+                    </a:lnB>
+                    <a:solidFill>
+                      <a:schemeClr val="accent2"/>
+                    </a:solidFill>
+                  </a:tcPr>
+                </a:tc>
+              </a:tr>
+              <a:tr h="367200">
+                <a:tc>
+                  <a:txBody>
+                    <a:bodyPr/>
+                    <a:p>
+                      <a:pPr>
+                        <a:buNone/>
+                      </a:pPr>
+                      <a:endParaRPr lang="zh-CN" altLang="en-US"/>
+                    </a:p>
+                  </a:txBody>
+                  <a:tcPr>
+                    <a:lnL w="12700" cmpd="sng">
+                      <a:solidFill>
+                        <a:schemeClr val="tx1"/>
+                      </a:solidFill>
+                      <a:prstDash val="solid"/>
+                    </a:lnL>
+                    <a:lnR w="12700" cmpd="sng">
+                      <a:solidFill>
+                        <a:schemeClr val="accent2"/>
+                      </a:solidFill>
+                      <a:prstDash val="solid"/>
+                    </a:lnR>
+                    <a:lnT w="12700" cmpd="sng">
+                      <a:solidFill>
+                        <a:schemeClr val="accent2"/>
+                      </a:solidFill>
+                      <a:prstDash val="solid"/>
+                    </a:lnT>
+                    <a:lnB w="12700" cmpd="sng">
+                      <a:solidFill>
+                        <a:schemeClr val="accent2"/>
+                      </a:solidFill>
+                      <a:prstDash val="solid"/>
+                    </a:lnB>
+                    <a:solidFill>
+                      <a:schemeClr val="accent2"/>
+                    </a:solidFill>
+                  </a:tcPr>
+                </a:tc>
+                <a:tc>
+                  <a:txBody>
+                    <a:bodyPr/>
+                    <a:p>
+                      <a:pPr>
+                        <a:buNone/>
+                      </a:pPr>
+                      <a:endParaRPr lang="zh-CN" altLang="en-US"/>
+                    </a:p>
+                  </a:txBody>
+                  <a:tcPr>
+                    <a:lnL w="12700" cmpd="sng">
+                      <a:solidFill>
+                        <a:schemeClr val="accent2"/>
+                      </a:solidFill>
+                      <a:prstDash val="solid"/>
+                    </a:lnL>
+                    <a:lnR w="12700" cmpd="sng">
+                      <a:solidFill>
+                        <a:schemeClr val="accent2"/>
+                      </a:solidFill>
+                      <a:prstDash val="solid"/>
+                    </a:lnR>
+                    <a:lnT w="12700" cmpd="sng">
+                      <a:solidFill>
+                        <a:schemeClr val="accent2"/>
+                      </a:solidFill>
+                      <a:prstDash val="solid"/>
+                    </a:lnT>
+                    <a:lnB w="12700" cmpd="sng">
+                      <a:solidFill>
+                        <a:schemeClr val="accent2"/>
+                      </a:solidFill>
+                      <a:prstDash val="solid"/>
+                    </a:lnB>
+                    <a:solidFill>
+                      <a:schemeClr val="accent2"/>
+                    </a:solidFill>
+                  </a:tcPr>
+                </a:tc>
+                <a:tc>
+                  <a:txBody>
+                    <a:bodyPr/>
+                    <a:p>
+                      <a:pPr>
+                        <a:buNone/>
+                      </a:pPr>
+                      <a:endParaRPr lang="zh-CN" altLang="en-US"/>
+                    </a:p>
+                  </a:txBody>
+                  <a:tcPr>
+                    <a:lnL w="12700" cmpd="sng">
+                      <a:solidFill>
+                        <a:schemeClr val="accent2"/>
+                      </a:solidFill>
+                      <a:prstDash val="solid"/>
+                    </a:lnL>
+                    <a:lnR w="12700" cmpd="sng">
+                      <a:solidFill>
+                        <a:schemeClr val="accent2"/>
+                      </a:solidFill>
+                      <a:prstDash val="solid"/>
+                    </a:lnR>
+                    <a:lnT w="12700" cmpd="sng">
+                      <a:solidFill>
+                        <a:schemeClr val="accent2"/>
+                      </a:solidFill>
+                      <a:prstDash val="solid"/>
+                    </a:lnT>
+                    <a:lnB w="12700" cmpd="sng">
+                      <a:solidFill>
+                        <a:schemeClr val="accent2"/>
+                      </a:solidFill>
+                      <a:prstDash val="solid"/>
+                    </a:lnB>
+                    <a:solidFill>
+                      <a:schemeClr val="accent2"/>
+                    </a:solidFill>
+                  </a:tcPr>
+                </a:tc>
+                <a:tc>
+                  <a:txBody>
+                    <a:bodyPr/>
+                    <a:p>
+                      <a:pPr>
+                        <a:buNone/>
+                      </a:pPr>
+                      <a:endParaRPr lang="zh-CN" altLang="en-US"/>
+                    </a:p>
+                  </a:txBody>
+                  <a:tcPr>
+                    <a:lnL w="12700" cmpd="sng">
+                      <a:solidFill>
+                        <a:schemeClr val="accent2"/>
+                      </a:solidFill>
+                      <a:prstDash val="solid"/>
+                    </a:lnL>
+                    <a:lnR w="12700" cmpd="sng">
+                      <a:solidFill>
+                        <a:schemeClr val="tx1"/>
+                      </a:solidFill>
+                      <a:prstDash val="solid"/>
+                    </a:lnR>
+                    <a:lnT w="12700" cmpd="sng">
+                      <a:solidFill>
+                        <a:schemeClr val="accent2"/>
+                      </a:solidFill>
+                      <a:prstDash val="solid"/>
+                    </a:lnT>
+                    <a:lnB w="12700" cmpd="sng">
+                      <a:solidFill>
+                        <a:schemeClr val="accent2"/>
+                      </a:solidFill>
+                      <a:prstDash val="solid"/>
+                    </a:lnB>
+                    <a:solidFill>
+                      <a:schemeClr val="accent2"/>
+                    </a:solidFill>
+                  </a:tcPr>
+                </a:tc>
+                <a:tc>
+                  <a:txBody>
+                    <a:bodyPr/>
+                    <a:p>
+                      <a:pPr>
+                        <a:buNone/>
+                      </a:pPr>
+                      <a:endParaRPr lang="zh-CN" altLang="en-US"/>
+                    </a:p>
+                  </a:txBody>
+                  <a:tcPr>
+                    <a:lnL w="12700" cmpd="sng">
+                      <a:solidFill>
+                        <a:schemeClr val="tx1"/>
+                      </a:solidFill>
+                      <a:prstDash val="solid"/>
+                    </a:lnL>
+                    <a:lnR w="12700" cmpd="sng">
+                      <a:solidFill>
+                        <a:schemeClr val="accent2"/>
+                      </a:solidFill>
+                      <a:prstDash val="solid"/>
+                    </a:lnR>
+                    <a:lnT w="12700" cmpd="sng">
+                      <a:solidFill>
+                        <a:schemeClr val="accent2"/>
+                      </a:solidFill>
+                      <a:prstDash val="solid"/>
+                    </a:lnT>
+                    <a:lnB w="12700" cmpd="sng">
+                      <a:solidFill>
+                        <a:schemeClr val="accent2"/>
+                      </a:solidFill>
+                      <a:prstDash val="solid"/>
+                    </a:lnB>
+                    <a:solidFill>
+                      <a:schemeClr val="accent2"/>
+                    </a:solidFill>
+                  </a:tcPr>
+                </a:tc>
+                <a:tc>
+                  <a:txBody>
+                    <a:bodyPr/>
+                    <a:p>
+                      <a:pPr>
+                        <a:buNone/>
+                      </a:pPr>
+                      <a:endParaRPr lang="zh-CN" altLang="en-US"/>
+                    </a:p>
+                  </a:txBody>
+                  <a:tcPr>
+                    <a:lnL w="12700" cmpd="sng">
+                      <a:solidFill>
+                        <a:schemeClr val="accent2"/>
+                      </a:solidFill>
+                      <a:prstDash val="solid"/>
+                    </a:lnL>
+                    <a:lnR w="12700" cmpd="sng">
+                      <a:solidFill>
+                        <a:schemeClr val="accent2"/>
+                      </a:solidFill>
+                      <a:prstDash val="solid"/>
+                    </a:lnR>
+                    <a:lnT w="12700" cmpd="sng">
+                      <a:solidFill>
+                        <a:schemeClr val="accent2"/>
+                      </a:solidFill>
+                      <a:prstDash val="solid"/>
+                    </a:lnT>
+                    <a:lnB w="12700" cmpd="sng">
+                      <a:solidFill>
+                        <a:schemeClr val="accent2"/>
+                      </a:solidFill>
+                      <a:prstDash val="solid"/>
+                    </a:lnB>
+                    <a:solidFill>
+                      <a:schemeClr val="accent2"/>
+                    </a:solidFill>
+                  </a:tcPr>
+                </a:tc>
+                <a:tc>
+                  <a:txBody>
+                    <a:bodyPr/>
+                    <a:p>
+                      <a:pPr>
+                        <a:buNone/>
+                      </a:pPr>
+                      <a:endParaRPr lang="zh-CN" altLang="en-US"/>
+                    </a:p>
+                  </a:txBody>
+                  <a:tcPr>
+                    <a:lnL w="12700" cmpd="sng">
+                      <a:solidFill>
+                        <a:schemeClr val="accent2"/>
+                      </a:solidFill>
+                      <a:prstDash val="solid"/>
+                    </a:lnL>
+                    <a:lnR w="12700" cmpd="sng">
+                      <a:solidFill>
+                        <a:schemeClr val="accent2"/>
+                      </a:solidFill>
+                      <a:prstDash val="solid"/>
+                    </a:lnR>
+                    <a:lnT w="12700" cmpd="sng">
+                      <a:solidFill>
+                        <a:schemeClr val="accent2"/>
+                      </a:solidFill>
+                      <a:prstDash val="solid"/>
+                    </a:lnT>
+                    <a:lnB w="12700" cmpd="sng">
+                      <a:solidFill>
+                        <a:schemeClr val="accent2"/>
+                      </a:solidFill>
+                      <a:prstDash val="solid"/>
+                    </a:lnB>
+                    <a:solidFill>
+                      <a:schemeClr val="accent2"/>
+                    </a:solidFill>
+                  </a:tcPr>
+                </a:tc>
+                <a:tc>
+                  <a:txBody>
+                    <a:bodyPr/>
+                    <a:p>
+                      <a:pPr>
+                        <a:buNone/>
+                      </a:pPr>
+                      <a:endParaRPr lang="zh-CN" altLang="en-US"/>
+                    </a:p>
+                  </a:txBody>
+                  <a:tcPr>
+                    <a:lnL w="12700" cmpd="sng">
+                      <a:solidFill>
+                        <a:schemeClr val="accent2"/>
+                      </a:solidFill>
+                      <a:prstDash val="solid"/>
+                    </a:lnL>
+                    <a:lnR w="12700" cmpd="sng">
+                      <a:solidFill>
+                        <a:schemeClr val="tx1"/>
+                      </a:solidFill>
+                      <a:prstDash val="solid"/>
+                    </a:lnR>
+                    <a:lnT w="12700" cmpd="sng">
+                      <a:solidFill>
+                        <a:schemeClr val="accent2"/>
+                      </a:solidFill>
+                      <a:prstDash val="solid"/>
+                    </a:lnT>
+                    <a:lnB w="12700" cmpd="sng">
+                      <a:solidFill>
+                        <a:schemeClr val="accent2"/>
+                      </a:solidFill>
+                      <a:prstDash val="solid"/>
+                    </a:lnB>
+                    <a:solidFill>
+                      <a:schemeClr val="accent2"/>
+                    </a:solidFill>
+                  </a:tcPr>
+                </a:tc>
+              </a:tr>
+              <a:tr h="367200">
+                <a:tc>
+                  <a:txBody>
+                    <a:bodyPr/>
+                    <a:p>
+                      <a:pPr>
+                        <a:buNone/>
+                      </a:pPr>
+                      <a:endParaRPr lang="zh-CN" altLang="en-US"/>
+                    </a:p>
+                  </a:txBody>
+                  <a:tcPr>
+                    <a:lnL w="12700" cmpd="sng">
+                      <a:solidFill>
+                        <a:schemeClr val="tx1"/>
+                      </a:solidFill>
+                      <a:prstDash val="solid"/>
+                    </a:lnL>
+                    <a:lnR w="12700" cmpd="sng">
+                      <a:solidFill>
+                        <a:schemeClr val="accent2"/>
+                      </a:solidFill>
+                      <a:prstDash val="solid"/>
+                    </a:lnR>
+                    <a:lnT w="12700" cmpd="sng">
+                      <a:solidFill>
+                        <a:schemeClr val="accent2"/>
+                      </a:solidFill>
+                      <a:prstDash val="solid"/>
+                    </a:lnT>
+                    <a:lnB w="12700" cmpd="sng">
+                      <a:solidFill>
+                        <a:schemeClr val="tx1"/>
+                      </a:solidFill>
+                      <a:prstDash val="solid"/>
+                    </a:lnB>
+                    <a:solidFill>
+                      <a:schemeClr val="accent2"/>
+                    </a:solidFill>
+                  </a:tcPr>
+                </a:tc>
+                <a:tc>
+                  <a:txBody>
+                    <a:bodyPr/>
+                    <a:p>
+                      <a:pPr>
+                        <a:buNone/>
+                      </a:pPr>
+                      <a:endParaRPr lang="zh-CN" altLang="en-US"/>
+                    </a:p>
+                  </a:txBody>
+                  <a:tcPr>
+                    <a:lnL w="12700" cmpd="sng">
+                      <a:solidFill>
+                        <a:schemeClr val="accent2"/>
+                      </a:solidFill>
+                      <a:prstDash val="solid"/>
+                    </a:lnL>
+                    <a:lnR w="12700" cmpd="sng">
+                      <a:solidFill>
+                        <a:schemeClr val="accent2"/>
+                      </a:solidFill>
+                      <a:prstDash val="solid"/>
+                    </a:lnR>
+                    <a:lnT w="12700" cmpd="sng">
+                      <a:solidFill>
+                        <a:schemeClr val="accent2"/>
+                      </a:solidFill>
+                      <a:prstDash val="solid"/>
+                    </a:lnT>
+                    <a:lnB w="12700" cmpd="sng">
+                      <a:solidFill>
+                        <a:schemeClr val="tx1"/>
+                      </a:solidFill>
+                      <a:prstDash val="solid"/>
+                    </a:lnB>
+                    <a:solidFill>
+                      <a:schemeClr val="accent2"/>
+                    </a:solidFill>
+                  </a:tcPr>
+                </a:tc>
+                <a:tc>
+                  <a:txBody>
+                    <a:bodyPr/>
+                    <a:p>
+                      <a:pPr>
+                        <a:buNone/>
+                      </a:pPr>
+                      <a:endParaRPr lang="zh-CN" altLang="en-US"/>
+                    </a:p>
+                  </a:txBody>
+                  <a:tcPr>
+                    <a:lnL w="12700" cmpd="sng">
+                      <a:solidFill>
+                        <a:schemeClr val="accent2"/>
+                      </a:solidFill>
+                      <a:prstDash val="solid"/>
+                    </a:lnL>
+                    <a:lnR w="12700" cmpd="sng">
+                      <a:solidFill>
+                        <a:schemeClr val="accent2"/>
+                      </a:solidFill>
+                      <a:prstDash val="solid"/>
+                    </a:lnR>
+                    <a:lnT w="12700" cmpd="sng">
+                      <a:solidFill>
+                        <a:schemeClr val="accent2"/>
+                      </a:solidFill>
+                      <a:prstDash val="solid"/>
+                    </a:lnT>
+                    <a:lnB w="12700" cmpd="sng">
+                      <a:solidFill>
+                        <a:schemeClr val="tx1"/>
+                      </a:solidFill>
+                      <a:prstDash val="solid"/>
+                    </a:lnB>
+                    <a:solidFill>
+                      <a:schemeClr val="accent2"/>
+                    </a:solidFill>
+                  </a:tcPr>
+                </a:tc>
+                <a:tc>
+                  <a:txBody>
+                    <a:bodyPr/>
+                    <a:p>
+                      <a:pPr>
+                        <a:buNone/>
+                      </a:pPr>
+                      <a:endParaRPr lang="zh-CN" altLang="en-US"/>
+                    </a:p>
+                  </a:txBody>
+                  <a:tcPr>
+                    <a:lnL w="12700" cmpd="sng">
+                      <a:solidFill>
+                        <a:schemeClr val="accent2"/>
+                      </a:solidFill>
+                      <a:prstDash val="solid"/>
+                    </a:lnL>
+                    <a:lnR w="12700" cmpd="sng">
+                      <a:solidFill>
+                        <a:schemeClr val="tx1"/>
+                      </a:solidFill>
+                      <a:prstDash val="solid"/>
+                    </a:lnR>
+                    <a:lnT w="12700" cmpd="sng">
+                      <a:solidFill>
+                        <a:schemeClr val="accent2"/>
+                      </a:solidFill>
+                      <a:prstDash val="solid"/>
+                    </a:lnT>
+                    <a:lnB w="12700" cmpd="sng">
+                      <a:solidFill>
+                        <a:schemeClr val="tx1"/>
+                      </a:solidFill>
+                      <a:prstDash val="solid"/>
+                    </a:lnB>
+                    <a:solidFill>
+                      <a:schemeClr val="accent2"/>
+                    </a:solidFill>
+                  </a:tcPr>
+                </a:tc>
+                <a:tc>
+                  <a:txBody>
+                    <a:bodyPr/>
+                    <a:p>
+                      <a:pPr>
+                        <a:buNone/>
+                      </a:pPr>
+                      <a:endParaRPr lang="zh-CN" altLang="en-US"/>
+                    </a:p>
+                  </a:txBody>
+                  <a:tcPr>
+                    <a:lnL w="12700" cmpd="sng">
+                      <a:solidFill>
+                        <a:schemeClr val="tx1"/>
+                      </a:solidFill>
+                      <a:prstDash val="solid"/>
+                    </a:lnL>
+                    <a:lnR w="12700" cmpd="sng">
+                      <a:solidFill>
+                        <a:schemeClr val="accent2"/>
+                      </a:solidFill>
+                      <a:prstDash val="solid"/>
+                    </a:lnR>
+                    <a:lnT w="12700" cmpd="sng">
+                      <a:solidFill>
+                        <a:schemeClr val="accent2"/>
+                      </a:solidFill>
+                      <a:prstDash val="solid"/>
+                    </a:lnT>
+                    <a:lnB w="12700" cmpd="sng">
+                      <a:solidFill>
+                        <a:schemeClr val="tx1"/>
+                      </a:solidFill>
+                      <a:prstDash val="solid"/>
+                    </a:lnB>
+                    <a:solidFill>
+                      <a:schemeClr val="accent2"/>
+                    </a:solidFill>
+                  </a:tcPr>
+                </a:tc>
+                <a:tc>
+                  <a:txBody>
+                    <a:bodyPr/>
+                    <a:p>
+                      <a:pPr>
+                        <a:buNone/>
+                      </a:pPr>
+                      <a:endParaRPr lang="zh-CN" altLang="en-US"/>
+                    </a:p>
+                  </a:txBody>
+                  <a:tcPr>
+                    <a:lnL w="12700" cmpd="sng">
+                      <a:solidFill>
+                        <a:schemeClr val="accent2"/>
+                      </a:solidFill>
+                      <a:prstDash val="solid"/>
+                    </a:lnL>
+                    <a:lnR w="12700" cmpd="sng">
+                      <a:solidFill>
+                        <a:schemeClr val="accent2"/>
+                      </a:solidFill>
+                      <a:prstDash val="solid"/>
+                    </a:lnR>
+                    <a:lnT w="12700" cmpd="sng">
+                      <a:solidFill>
+                        <a:schemeClr val="accent2"/>
+                      </a:solidFill>
+                      <a:prstDash val="solid"/>
+                    </a:lnT>
+                    <a:lnB w="12700" cmpd="sng">
+                      <a:solidFill>
+                        <a:schemeClr val="tx1"/>
+                      </a:solidFill>
+                      <a:prstDash val="solid"/>
+                    </a:lnB>
+                    <a:solidFill>
+                      <a:schemeClr val="accent2"/>
+                    </a:solidFill>
+                  </a:tcPr>
+                </a:tc>
+                <a:tc>
+                  <a:txBody>
+                    <a:bodyPr/>
+                    <a:p>
+                      <a:pPr>
+                        <a:buNone/>
+                      </a:pPr>
+                      <a:endParaRPr lang="zh-CN" altLang="en-US"/>
+                    </a:p>
+                  </a:txBody>
+                  <a:tcPr>
+                    <a:lnL w="12700" cmpd="sng">
+                      <a:solidFill>
+                        <a:schemeClr val="accent2"/>
+                      </a:solidFill>
+                      <a:prstDash val="solid"/>
+                    </a:lnL>
+                    <a:lnR w="12700" cmpd="sng">
+                      <a:solidFill>
+                        <a:schemeClr val="accent2"/>
+                      </a:solidFill>
+                      <a:prstDash val="solid"/>
+                    </a:lnR>
+                    <a:lnT w="12700" cmpd="sng">
+                      <a:solidFill>
+                        <a:schemeClr val="accent2"/>
+                      </a:solidFill>
+                      <a:prstDash val="solid"/>
+                    </a:lnT>
+                    <a:lnB w="12700" cmpd="sng">
+                      <a:solidFill>
+                        <a:schemeClr val="tx1"/>
+                      </a:solidFill>
+                      <a:prstDash val="solid"/>
+                    </a:lnB>
+                    <a:solidFill>
+                      <a:schemeClr val="accent2"/>
+                    </a:solidFill>
+                  </a:tcPr>
+                </a:tc>
+                <a:tc>
+                  <a:txBody>
+                    <a:bodyPr/>
+                    <a:p>
+                      <a:pPr>
+                        <a:buNone/>
+                      </a:pPr>
+                      <a:endParaRPr lang="zh-CN" altLang="en-US"/>
+                    </a:p>
+                  </a:txBody>
+                  <a:tcPr>
+                    <a:lnL w="12700" cmpd="sng">
+                      <a:solidFill>
+                        <a:schemeClr val="accent2"/>
+                      </a:solidFill>
+                      <a:prstDash val="solid"/>
+                    </a:lnL>
+                    <a:lnR w="12700" cmpd="sng">
+                      <a:solidFill>
+                        <a:schemeClr val="tx1"/>
+                      </a:solidFill>
+                      <a:prstDash val="solid"/>
+                    </a:lnR>
+                    <a:lnT w="12700" cmpd="sng">
+                      <a:solidFill>
+                        <a:schemeClr val="accent2"/>
+                      </a:solidFill>
+                      <a:prstDash val="solid"/>
+                    </a:lnT>
+                    <a:lnB w="12700" cmpd="sng">
+                      <a:solidFill>
+                        <a:schemeClr val="tx1"/>
+                      </a:solidFill>
+                      <a:prstDash val="solid"/>
+                    </a:lnB>
+                    <a:solidFill>
+                      <a:schemeClr val="accent2"/>
+                    </a:solidFill>
+                  </a:tcPr>
+                </a:tc>
+              </a:tr>
+              <a:tr h="367200">
+                <a:tc>
+                  <a:txBody>
+                    <a:bodyPr/>
+                    <a:p>
+                      <a:pPr>
+                        <a:buNone/>
+                      </a:pPr>
+                      <a:endParaRPr lang="zh-CN" altLang="en-US"/>
+                    </a:p>
+                  </a:txBody>
+                  <a:tcPr>
+                    <a:lnL w="12700" cmpd="sng">
+                      <a:solidFill>
+                        <a:schemeClr val="tx1"/>
+                      </a:solidFill>
+                      <a:prstDash val="solid"/>
+                    </a:lnL>
+                    <a:lnR w="12700" cmpd="sng">
+                      <a:solidFill>
+                        <a:schemeClr val="accent2"/>
+                      </a:solidFill>
+                      <a:prstDash val="solid"/>
+                    </a:lnR>
+                    <a:lnT w="12700" cmpd="sng">
+                      <a:solidFill>
+                        <a:schemeClr val="tx1"/>
+                      </a:solidFill>
+                      <a:prstDash val="solid"/>
+                    </a:lnT>
+                    <a:lnB w="12700" cmpd="sng">
+                      <a:solidFill>
+                        <a:schemeClr val="accent2"/>
+                      </a:solidFill>
+                      <a:prstDash val="solid"/>
+                    </a:lnB>
+                    <a:solidFill>
+                      <a:schemeClr val="accent2"/>
+                    </a:solidFill>
+                  </a:tcPr>
+                </a:tc>
+                <a:tc>
+                  <a:txBody>
+                    <a:bodyPr/>
+                    <a:p>
+                      <a:pPr>
+                        <a:buNone/>
+                      </a:pPr>
+                      <a:endParaRPr lang="zh-CN" altLang="en-US"/>
+                    </a:p>
+                  </a:txBody>
+                  <a:tcPr>
+                    <a:lnL w="12700" cmpd="sng">
+                      <a:solidFill>
+                        <a:schemeClr val="accent2"/>
+                      </a:solidFill>
+                      <a:prstDash val="solid"/>
+                    </a:lnL>
+                    <a:lnR w="12700" cmpd="sng">
+                      <a:solidFill>
+                        <a:schemeClr val="tx1"/>
+                      </a:solidFill>
+                      <a:prstDash val="solid"/>
+                    </a:lnR>
+                    <a:lnT w="12700" cmpd="sng">
+                      <a:solidFill>
+                        <a:schemeClr val="tx1"/>
+                      </a:solidFill>
+                      <a:prstDash val="solid"/>
+                    </a:lnT>
+                    <a:lnB w="12700" cmpd="sng">
+                      <a:solidFill>
+                        <a:schemeClr val="accent2"/>
+                      </a:solidFill>
+                      <a:prstDash val="solid"/>
+                    </a:lnB>
+                    <a:solidFill>
+                      <a:schemeClr val="accent2"/>
+                    </a:solidFill>
+                  </a:tcPr>
+                </a:tc>
+                <a:tc>
+                  <a:txBody>
+                    <a:bodyPr/>
+                    <a:p>
+                      <a:pPr>
+                        <a:buNone/>
+                      </a:pPr>
+                      <a:endParaRPr lang="zh-CN" altLang="en-US"/>
+                    </a:p>
+                  </a:txBody>
+                  <a:tcPr>
+                    <a:lnL w="12700" cmpd="sng">
+                      <a:solidFill>
+                        <a:schemeClr val="tx1"/>
+                      </a:solidFill>
+                      <a:prstDash val="solid"/>
+                    </a:lnL>
+                    <a:lnR w="12700" cmpd="sng">
+                      <a:solidFill>
+                        <a:schemeClr val="accent2"/>
+                      </a:solidFill>
+                      <a:prstDash val="solid"/>
+                    </a:lnR>
+                    <a:lnT w="12700" cmpd="sng">
+                      <a:solidFill>
+                        <a:schemeClr val="tx1"/>
+                      </a:solidFill>
+                      <a:prstDash val="solid"/>
+                    </a:lnT>
+                    <a:lnB w="12700" cmpd="sng">
+                      <a:solidFill>
+                        <a:schemeClr val="accent2"/>
+                      </a:solidFill>
+                      <a:prstDash val="solid"/>
+                    </a:lnB>
+                    <a:solidFill>
+                      <a:schemeClr val="accent2"/>
+                    </a:solidFill>
+                  </a:tcPr>
+                </a:tc>
+                <a:tc>
+                  <a:txBody>
+                    <a:bodyPr/>
+                    <a:p>
+                      <a:pPr>
+                        <a:buNone/>
+                      </a:pPr>
+                      <a:endParaRPr lang="zh-CN" altLang="en-US"/>
+                    </a:p>
+                  </a:txBody>
+                  <a:tcPr>
+                    <a:lnL w="12700" cmpd="sng">
+                      <a:solidFill>
+                        <a:schemeClr val="accent2"/>
+                      </a:solidFill>
+                      <a:prstDash val="solid"/>
+                    </a:lnL>
+                    <a:lnR w="12700" cmpd="sng">
+                      <a:solidFill>
+                        <a:schemeClr val="tx1"/>
+                      </a:solidFill>
+                      <a:prstDash val="solid"/>
+                    </a:lnR>
+                    <a:lnT w="12700" cmpd="sng">
+                      <a:solidFill>
+                        <a:schemeClr val="tx1"/>
+                      </a:solidFill>
+                      <a:prstDash val="solid"/>
+                    </a:lnT>
+                    <a:lnB w="12700" cmpd="sng">
+                      <a:solidFill>
+                        <a:schemeClr val="accent2"/>
+                      </a:solidFill>
+                      <a:prstDash val="solid"/>
+                    </a:lnB>
+                    <a:solidFill>
+                      <a:schemeClr val="accent2"/>
+                    </a:solidFill>
+                  </a:tcPr>
+                </a:tc>
+                <a:tc>
+                  <a:txBody>
+                    <a:bodyPr/>
+                    <a:p>
+                      <a:pPr>
+                        <a:buNone/>
+                      </a:pPr>
+                      <a:endParaRPr lang="zh-CN" altLang="en-US"/>
+                    </a:p>
+                  </a:txBody>
+                  <a:tcPr>
+                    <a:lnL w="12700" cmpd="sng">
+                      <a:solidFill>
+                        <a:schemeClr val="tx1"/>
+                      </a:solidFill>
+                      <a:prstDash val="solid"/>
+                    </a:lnL>
+                    <a:lnR w="12700" cmpd="sng">
+                      <a:solidFill>
+                        <a:schemeClr val="accent2"/>
+                      </a:solidFill>
+                      <a:prstDash val="solid"/>
+                    </a:lnR>
+                    <a:lnT w="12700" cmpd="sng">
+                      <a:solidFill>
+                        <a:schemeClr val="tx1"/>
+                      </a:solidFill>
+                      <a:prstDash val="solid"/>
+                    </a:lnT>
+                    <a:lnB w="12700" cmpd="sng">
+                      <a:solidFill>
+                        <a:schemeClr val="accent2"/>
+                      </a:solidFill>
+                      <a:prstDash val="solid"/>
+                    </a:lnB>
+                    <a:solidFill>
+                      <a:schemeClr val="accent2"/>
+                    </a:solidFill>
+                  </a:tcPr>
+                </a:tc>
+                <a:tc>
+                  <a:txBody>
+                    <a:bodyPr/>
+                    <a:p>
+                      <a:pPr>
+                        <a:buNone/>
+                      </a:pPr>
+                      <a:endParaRPr lang="zh-CN" altLang="en-US"/>
+                    </a:p>
+                  </a:txBody>
+                  <a:tcPr>
+                    <a:lnL w="12700" cmpd="sng">
+                      <a:solidFill>
+                        <a:schemeClr val="accent2"/>
+                      </a:solidFill>
+                      <a:prstDash val="solid"/>
+                    </a:lnL>
+                    <a:lnR w="12700" cmpd="sng">
+                      <a:solidFill>
+                        <a:schemeClr val="accent2"/>
+                      </a:solidFill>
+                      <a:prstDash val="solid"/>
+                    </a:lnR>
+                    <a:lnT w="12700" cmpd="sng">
+                      <a:solidFill>
+                        <a:schemeClr val="tx1"/>
+                      </a:solidFill>
+                      <a:prstDash val="solid"/>
+                    </a:lnT>
+                    <a:lnB w="12700" cmpd="sng">
+                      <a:solidFill>
+                        <a:schemeClr val="accent2"/>
+                      </a:solidFill>
+                      <a:prstDash val="solid"/>
+                    </a:lnB>
+                    <a:solidFill>
+                      <a:schemeClr val="accent2"/>
+                    </a:solidFill>
+                  </a:tcPr>
+                </a:tc>
+                <a:tc>
+                  <a:txBody>
+                    <a:bodyPr/>
+                    <a:p>
+                      <a:pPr>
+                        <a:buNone/>
+                      </a:pPr>
+                      <a:endParaRPr lang="zh-CN" altLang="en-US"/>
+                    </a:p>
+                  </a:txBody>
+                  <a:tcPr>
+                    <a:lnL w="12700" cmpd="sng">
+                      <a:solidFill>
+                        <a:schemeClr val="accent2"/>
+                      </a:solidFill>
+                      <a:prstDash val="solid"/>
+                    </a:lnL>
+                    <a:lnR w="12700" cmpd="sng">
+                      <a:solidFill>
+                        <a:schemeClr val="accent2"/>
+                      </a:solidFill>
+                      <a:prstDash val="solid"/>
+                    </a:lnR>
+                    <a:lnT w="12700" cmpd="sng">
+                      <a:solidFill>
+                        <a:schemeClr val="tx1"/>
+                      </a:solidFill>
+                      <a:prstDash val="solid"/>
+                    </a:lnT>
+                    <a:lnB w="12700" cmpd="sng">
+                      <a:solidFill>
+                        <a:schemeClr val="accent2"/>
+                      </a:solidFill>
+                      <a:prstDash val="solid"/>
+                    </a:lnB>
+                    <a:solidFill>
+                      <a:schemeClr val="accent2"/>
+                    </a:solidFill>
+                  </a:tcPr>
+                </a:tc>
+                <a:tc>
+                  <a:txBody>
+                    <a:bodyPr/>
+                    <a:p>
+                      <a:pPr>
+                        <a:buNone/>
+                      </a:pPr>
+                      <a:endParaRPr lang="zh-CN" altLang="en-US"/>
+                    </a:p>
+                  </a:txBody>
+                  <a:tcPr>
+                    <a:lnL w="12700" cmpd="sng">
+                      <a:solidFill>
+                        <a:schemeClr val="accent2"/>
+                      </a:solidFill>
+                      <a:prstDash val="solid"/>
+                    </a:lnL>
+                    <a:lnR w="12700" cmpd="sng">
+                      <a:solidFill>
+                        <a:schemeClr val="tx1"/>
+                      </a:solidFill>
+                      <a:prstDash val="solid"/>
+                    </a:lnR>
+                    <a:lnT w="12700" cmpd="sng">
+                      <a:solidFill>
+                        <a:schemeClr val="tx1"/>
+                      </a:solidFill>
+                      <a:prstDash val="solid"/>
+                    </a:lnT>
+                    <a:lnB w="12700" cmpd="sng">
+                      <a:solidFill>
+                        <a:schemeClr val="accent2"/>
+                      </a:solidFill>
+                      <a:prstDash val="solid"/>
+                    </a:lnB>
+                    <a:solidFill>
+                      <a:schemeClr val="accent2"/>
+                    </a:solidFill>
+                  </a:tcPr>
+                </a:tc>
+              </a:tr>
+              <a:tr h="367200">
+                <a:tc>
+                  <a:txBody>
+                    <a:bodyPr/>
+                    <a:p>
+                      <a:pPr>
+                        <a:buNone/>
+                      </a:pPr>
+                      <a:endParaRPr lang="zh-CN" altLang="en-US"/>
+                    </a:p>
+                  </a:txBody>
+                  <a:tcPr>
+                    <a:lnL w="12700" cmpd="sng">
+                      <a:solidFill>
+                        <a:schemeClr val="tx1"/>
+                      </a:solidFill>
+                      <a:prstDash val="solid"/>
+                    </a:lnL>
+                    <a:lnR w="12700" cmpd="sng">
+                      <a:solidFill>
+                        <a:schemeClr val="accent2"/>
+                      </a:solidFill>
+                      <a:prstDash val="solid"/>
+                    </a:lnR>
+                    <a:lnT w="12700" cmpd="sng">
+                      <a:solidFill>
+                        <a:schemeClr val="accent2"/>
+                      </a:solidFill>
+                      <a:prstDash val="solid"/>
+                    </a:lnT>
+                    <a:lnB w="12700" cmpd="sng">
+                      <a:solidFill>
+                        <a:schemeClr val="tx1"/>
+                      </a:solidFill>
+                      <a:prstDash val="solid"/>
+                    </a:lnB>
+                    <a:solidFill>
+                      <a:schemeClr val="accent2"/>
+                    </a:solidFill>
+                  </a:tcPr>
+                </a:tc>
+                <a:tc>
+                  <a:txBody>
+                    <a:bodyPr/>
+                    <a:p>
+                      <a:pPr>
+                        <a:buNone/>
+                      </a:pPr>
+                      <a:endParaRPr lang="zh-CN" altLang="en-US"/>
+                    </a:p>
+                  </a:txBody>
+                  <a:tcPr>
+                    <a:lnL w="12700" cmpd="sng">
+                      <a:solidFill>
+                        <a:schemeClr val="accent2"/>
+                      </a:solidFill>
+                      <a:prstDash val="solid"/>
+                    </a:lnL>
+                    <a:lnR w="12700" cmpd="sng">
+                      <a:solidFill>
+                        <a:schemeClr val="tx1"/>
+                      </a:solidFill>
+                      <a:prstDash val="solid"/>
+                    </a:lnR>
+                    <a:lnT w="12700" cmpd="sng">
+                      <a:solidFill>
+                        <a:schemeClr val="accent2"/>
+                      </a:solidFill>
+                      <a:prstDash val="solid"/>
+                    </a:lnT>
+                    <a:lnB w="12700" cmpd="sng">
+                      <a:solidFill>
+                        <a:schemeClr val="tx1"/>
+                      </a:solidFill>
+                      <a:prstDash val="solid"/>
+                    </a:lnB>
+                    <a:solidFill>
+                      <a:schemeClr val="accent2"/>
+                    </a:solidFill>
+                  </a:tcPr>
+                </a:tc>
+                <a:tc>
+                  <a:txBody>
+                    <a:bodyPr/>
+                    <a:p>
+                      <a:pPr>
+                        <a:buNone/>
+                      </a:pPr>
+                      <a:endParaRPr lang="zh-CN" altLang="en-US"/>
+                    </a:p>
+                  </a:txBody>
+                  <a:tcPr>
+                    <a:lnL w="12700" cmpd="sng">
+                      <a:solidFill>
+                        <a:schemeClr val="tx1"/>
+                      </a:solidFill>
+                      <a:prstDash val="solid"/>
+                    </a:lnL>
+                    <a:lnR w="12700" cmpd="sng">
+                      <a:solidFill>
+                        <a:schemeClr val="accent2"/>
+                      </a:solidFill>
+                      <a:prstDash val="solid"/>
+                    </a:lnR>
+                    <a:lnT w="12700" cmpd="sng">
+                      <a:solidFill>
+                        <a:schemeClr val="accent2"/>
+                      </a:solidFill>
+                      <a:prstDash val="solid"/>
+                    </a:lnT>
+                    <a:lnB w="12700" cmpd="sng">
+                      <a:solidFill>
+                        <a:schemeClr val="tx1"/>
+                      </a:solidFill>
+                      <a:prstDash val="solid"/>
+                    </a:lnB>
+                    <a:solidFill>
+                      <a:schemeClr val="accent2"/>
+                    </a:solidFill>
+                  </a:tcPr>
+                </a:tc>
+                <a:tc>
+                  <a:txBody>
+                    <a:bodyPr/>
+                    <a:p>
+                      <a:pPr>
+                        <a:buNone/>
+                      </a:pPr>
+                      <a:endParaRPr lang="zh-CN" altLang="en-US"/>
+                    </a:p>
+                  </a:txBody>
+                  <a:tcPr>
+                    <a:lnL w="12700" cmpd="sng">
+                      <a:solidFill>
+                        <a:schemeClr val="accent2"/>
+                      </a:solidFill>
+                      <a:prstDash val="solid"/>
+                    </a:lnL>
+                    <a:lnR w="12700" cmpd="sng">
+                      <a:solidFill>
+                        <a:schemeClr val="tx1"/>
+                      </a:solidFill>
+                      <a:prstDash val="solid"/>
+                    </a:lnR>
+                    <a:lnT w="12700" cmpd="sng">
+                      <a:solidFill>
+                        <a:schemeClr val="accent2"/>
+                      </a:solidFill>
+                      <a:prstDash val="solid"/>
+                    </a:lnT>
+                    <a:lnB w="12700" cmpd="sng">
+                      <a:solidFill>
+                        <a:schemeClr val="tx1"/>
+                      </a:solidFill>
+                      <a:prstDash val="solid"/>
+                    </a:lnB>
+                    <a:solidFill>
+                      <a:schemeClr val="accent2"/>
+                    </a:solidFill>
+                  </a:tcPr>
+                </a:tc>
+                <a:tc>
+                  <a:txBody>
+                    <a:bodyPr/>
+                    <a:p>
+                      <a:pPr>
+                        <a:buNone/>
+                      </a:pPr>
+                      <a:endParaRPr lang="zh-CN" altLang="en-US"/>
+                    </a:p>
+                  </a:txBody>
+                  <a:tcPr>
+                    <a:lnL w="12700" cmpd="sng">
+                      <a:solidFill>
+                        <a:schemeClr val="tx1"/>
+                      </a:solidFill>
+                      <a:prstDash val="solid"/>
+                    </a:lnL>
+                    <a:lnR w="12700" cmpd="sng">
+                      <a:solidFill>
+                        <a:schemeClr val="accent2"/>
+                      </a:solidFill>
+                      <a:prstDash val="solid"/>
+                    </a:lnR>
+                    <a:lnT w="12700" cmpd="sng">
+                      <a:solidFill>
+                        <a:schemeClr val="accent2"/>
+                      </a:solidFill>
+                      <a:prstDash val="solid"/>
+                    </a:lnT>
+                    <a:lnB w="12700" cmpd="sng">
+                      <a:solidFill>
+                        <a:schemeClr val="accent2"/>
+                      </a:solidFill>
+                      <a:prstDash val="solid"/>
+                    </a:lnB>
+                    <a:solidFill>
+                      <a:schemeClr val="accent2"/>
+                    </a:solidFill>
+                  </a:tcPr>
+                </a:tc>
+                <a:tc>
+                  <a:txBody>
+                    <a:bodyPr/>
+                    <a:p>
+                      <a:pPr>
+                        <a:buNone/>
+                      </a:pPr>
+                      <a:endParaRPr lang="zh-CN" altLang="en-US"/>
+                    </a:p>
+                  </a:txBody>
+                  <a:tcPr>
+                    <a:lnL w="12700" cmpd="sng">
+                      <a:solidFill>
+                        <a:schemeClr val="accent2"/>
+                      </a:solidFill>
+                      <a:prstDash val="solid"/>
+                    </a:lnL>
+                    <a:lnR w="12700" cmpd="sng">
+                      <a:solidFill>
+                        <a:schemeClr val="accent2"/>
+                      </a:solidFill>
+                      <a:prstDash val="solid"/>
+                    </a:lnR>
+                    <a:lnT w="12700" cmpd="sng">
+                      <a:solidFill>
+                        <a:schemeClr val="accent2"/>
+                      </a:solidFill>
+                      <a:prstDash val="solid"/>
+                    </a:lnT>
+                    <a:lnB w="12700" cmpd="sng">
+                      <a:solidFill>
+                        <a:schemeClr val="accent2"/>
+                      </a:solidFill>
+                      <a:prstDash val="solid"/>
+                    </a:lnB>
+                    <a:solidFill>
+                      <a:schemeClr val="accent2"/>
+                    </a:solidFill>
+                  </a:tcPr>
+                </a:tc>
+                <a:tc>
+                  <a:txBody>
+                    <a:bodyPr/>
+                    <a:p>
+                      <a:pPr>
+                        <a:buNone/>
+                      </a:pPr>
+                      <a:endParaRPr lang="zh-CN" altLang="en-US"/>
+                    </a:p>
+                  </a:txBody>
+                  <a:tcPr>
+                    <a:lnL w="12700" cmpd="sng">
+                      <a:solidFill>
+                        <a:schemeClr val="accent2"/>
+                      </a:solidFill>
+                      <a:prstDash val="solid"/>
+                    </a:lnL>
+                    <a:lnR w="12700" cmpd="sng">
+                      <a:solidFill>
+                        <a:schemeClr val="accent2"/>
+                      </a:solidFill>
+                      <a:prstDash val="solid"/>
+                    </a:lnR>
+                    <a:lnT w="12700" cmpd="sng">
+                      <a:solidFill>
+                        <a:schemeClr val="accent2"/>
+                      </a:solidFill>
+                      <a:prstDash val="solid"/>
+                    </a:lnT>
+                    <a:lnB w="12700" cmpd="sng">
+                      <a:solidFill>
+                        <a:schemeClr val="accent2"/>
+                      </a:solidFill>
+                      <a:prstDash val="solid"/>
+                    </a:lnB>
+                    <a:solidFill>
+                      <a:schemeClr val="accent2"/>
+                    </a:solidFill>
+                  </a:tcPr>
+                </a:tc>
+                <a:tc>
+                  <a:txBody>
+                    <a:bodyPr/>
+                    <a:p>
+                      <a:pPr>
+                        <a:buNone/>
+                      </a:pPr>
+                      <a:endParaRPr lang="zh-CN" altLang="en-US"/>
+                    </a:p>
+                  </a:txBody>
+                  <a:tcPr>
+                    <a:lnL w="12700" cmpd="sng">
+                      <a:solidFill>
+                        <a:schemeClr val="accent2"/>
+                      </a:solidFill>
+                      <a:prstDash val="solid"/>
+                    </a:lnL>
+                    <a:lnR w="12700" cmpd="sng">
+                      <a:solidFill>
+                        <a:schemeClr val="tx1"/>
+                      </a:solidFill>
+                      <a:prstDash val="solid"/>
+                    </a:lnR>
+                    <a:lnT w="12700" cmpd="sng">
+                      <a:solidFill>
+                        <a:schemeClr val="accent2"/>
+                      </a:solidFill>
+                      <a:prstDash val="solid"/>
+                    </a:lnT>
+                    <a:lnB w="12700" cmpd="sng">
+                      <a:solidFill>
+                        <a:schemeClr val="accent2"/>
+                      </a:solidFill>
+                      <a:prstDash val="solid"/>
+                    </a:lnB>
+                    <a:solidFill>
+                      <a:schemeClr val="accent2"/>
+                    </a:solidFill>
+                  </a:tcPr>
+                </a:tc>
+              </a:tr>
+              <a:tr h="367200">
+                <a:tc>
+                  <a:txBody>
+                    <a:bodyPr/>
+                    <a:p>
+                      <a:pPr>
+                        <a:buNone/>
+                      </a:pPr>
+                      <a:endParaRPr lang="zh-CN" altLang="en-US"/>
+                    </a:p>
+                  </a:txBody>
+                  <a:tcPr>
+                    <a:lnT w="12700" cmpd="sng">
+                      <a:solidFill>
+                        <a:schemeClr val="tx1"/>
+                      </a:solidFill>
+                      <a:prstDash val="solid"/>
+                    </a:lnT>
+                    <a:solidFill>
+                      <a:schemeClr val="accent2"/>
+                    </a:solidFill>
+                  </a:tcPr>
+                </a:tc>
+                <a:tc>
+                  <a:txBody>
+                    <a:bodyPr/>
+                    <a:p>
+                      <a:pPr>
+                        <a:buNone/>
+                      </a:pPr>
+                      <a:endParaRPr lang="zh-CN" altLang="en-US"/>
+                    </a:p>
+                  </a:txBody>
+                  <a:tcPr>
+                    <a:lnR w="12700" cmpd="sng">
+                      <a:solidFill>
+                        <a:schemeClr val="tx1"/>
+                      </a:solidFill>
+                      <a:prstDash val="solid"/>
+                    </a:lnR>
+                    <a:lnT w="12700" cmpd="sng">
+                      <a:solidFill>
+                        <a:schemeClr val="tx1"/>
+                      </a:solidFill>
+                      <a:prstDash val="solid"/>
+                    </a:lnT>
+                    <a:solidFill>
+                      <a:schemeClr val="accent2"/>
+                    </a:solidFill>
+                  </a:tcPr>
+                </a:tc>
+                <a:tc>
+                  <a:txBody>
+                    <a:bodyPr/>
+                    <a:p>
+                      <a:pPr>
+                        <a:buNone/>
+                      </a:pPr>
+                      <a:endParaRPr lang="zh-CN" altLang="en-US"/>
+                    </a:p>
+                  </a:txBody>
+                  <a:tcPr>
+                    <a:lnL w="12700" cmpd="sng">
+                      <a:solidFill>
+                        <a:schemeClr val="tx1"/>
+                      </a:solidFill>
+                      <a:prstDash val="solid"/>
+                    </a:lnL>
+                    <a:lnR w="12700" cmpd="sng">
+                      <a:solidFill>
+                        <a:schemeClr val="accent2"/>
+                      </a:solidFill>
+                      <a:prstDash val="solid"/>
+                    </a:lnR>
+                    <a:lnT w="12700" cmpd="sng">
+                      <a:solidFill>
+                        <a:schemeClr val="tx1"/>
+                      </a:solidFill>
+                      <a:prstDash val="solid"/>
+                    </a:lnT>
+                    <a:lnB w="12700" cmpd="sng">
+                      <a:solidFill>
+                        <a:schemeClr val="accent2"/>
+                      </a:solidFill>
+                      <a:prstDash val="solid"/>
+                    </a:lnB>
+                    <a:solidFill>
+                      <a:schemeClr val="accent2"/>
+                    </a:solidFill>
+                  </a:tcPr>
+                </a:tc>
+                <a:tc>
+                  <a:txBody>
+                    <a:bodyPr/>
+                    <a:p>
+                      <a:pPr>
+                        <a:buNone/>
+                      </a:pPr>
+                      <a:endParaRPr lang="zh-CN" altLang="en-US"/>
+                    </a:p>
+                  </a:txBody>
+                  <a:tcPr>
+                    <a:lnL w="12700" cmpd="sng">
+                      <a:solidFill>
+                        <a:schemeClr val="accent2"/>
+                      </a:solidFill>
+                      <a:prstDash val="solid"/>
+                    </a:lnL>
+                    <a:lnR w="12700" cmpd="sng">
+                      <a:solidFill>
+                        <a:schemeClr val="tx1"/>
+                      </a:solidFill>
+                      <a:prstDash val="solid"/>
+                    </a:lnR>
+                    <a:lnT w="12700" cmpd="sng">
+                      <a:solidFill>
+                        <a:schemeClr val="tx1"/>
+                      </a:solidFill>
+                      <a:prstDash val="solid"/>
+                    </a:lnT>
+                    <a:lnB w="12700" cmpd="sng">
+                      <a:solidFill>
+                        <a:schemeClr val="accent2"/>
+                      </a:solidFill>
+                      <a:prstDash val="solid"/>
+                    </a:lnB>
+                    <a:solidFill>
+                      <a:schemeClr val="accent2"/>
+                    </a:solidFill>
+                  </a:tcPr>
+                </a:tc>
+                <a:tc>
+                  <a:txBody>
+                    <a:bodyPr/>
+                    <a:p>
+                      <a:pPr>
+                        <a:buNone/>
+                      </a:pPr>
+                      <a:endParaRPr lang="zh-CN" altLang="en-US"/>
+                    </a:p>
+                  </a:txBody>
+                  <a:tcPr>
+                    <a:lnL w="12700" cmpd="sng">
+                      <a:solidFill>
+                        <a:schemeClr val="tx1"/>
+                      </a:solidFill>
+                      <a:prstDash val="solid"/>
+                    </a:lnL>
+                    <a:lnR w="12700" cmpd="sng">
+                      <a:solidFill>
+                        <a:schemeClr val="accent2"/>
+                      </a:solidFill>
+                      <a:prstDash val="solid"/>
+                    </a:lnR>
+                    <a:lnT w="12700" cmpd="sng">
+                      <a:solidFill>
+                        <a:schemeClr val="accent2"/>
+                      </a:solidFill>
+                      <a:prstDash val="solid"/>
+                    </a:lnT>
+                    <a:lnB w="12700" cmpd="sng">
+                      <a:solidFill>
+                        <a:schemeClr val="accent2"/>
+                      </a:solidFill>
+                      <a:prstDash val="solid"/>
+                    </a:lnB>
+                    <a:solidFill>
+                      <a:schemeClr val="accent2"/>
+                    </a:solidFill>
+                  </a:tcPr>
+                </a:tc>
+                <a:tc>
+                  <a:txBody>
+                    <a:bodyPr/>
+                    <a:p>
+                      <a:pPr>
+                        <a:buNone/>
+                      </a:pPr>
+                      <a:endParaRPr lang="zh-CN" altLang="en-US"/>
+                    </a:p>
+                  </a:txBody>
+                  <a:tcPr>
+                    <a:lnL w="12700" cmpd="sng">
+                      <a:solidFill>
+                        <a:schemeClr val="accent2"/>
+                      </a:solidFill>
+                      <a:prstDash val="solid"/>
+                    </a:lnL>
+                    <a:lnR w="12700" cmpd="sng">
+                      <a:solidFill>
+                        <a:schemeClr val="accent2"/>
+                      </a:solidFill>
+                      <a:prstDash val="solid"/>
+                    </a:lnR>
+                    <a:lnT w="12700" cmpd="sng">
+                      <a:solidFill>
+                        <a:schemeClr val="accent2"/>
+                      </a:solidFill>
+                      <a:prstDash val="solid"/>
+                    </a:lnT>
+                    <a:lnB w="12700" cmpd="sng">
+                      <a:solidFill>
+                        <a:schemeClr val="accent2"/>
+                      </a:solidFill>
+                      <a:prstDash val="solid"/>
+                    </a:lnB>
+                    <a:solidFill>
+                      <a:schemeClr val="accent2"/>
+                    </a:solidFill>
+                  </a:tcPr>
+                </a:tc>
+                <a:tc>
+                  <a:txBody>
+                    <a:bodyPr/>
+                    <a:p>
+                      <a:pPr>
+                        <a:buNone/>
+                      </a:pPr>
+                      <a:endParaRPr lang="zh-CN" altLang="en-US"/>
+                    </a:p>
+                  </a:txBody>
+                  <a:tcPr>
+                    <a:lnL w="12700" cmpd="sng">
+                      <a:solidFill>
+                        <a:schemeClr val="accent2"/>
+                      </a:solidFill>
+                      <a:prstDash val="solid"/>
+                    </a:lnL>
+                    <a:lnR w="12700" cmpd="sng">
+                      <a:solidFill>
+                        <a:schemeClr val="accent2"/>
+                      </a:solidFill>
+                      <a:prstDash val="solid"/>
+                    </a:lnR>
+                    <a:lnT w="12700" cmpd="sng">
+                      <a:solidFill>
+                        <a:schemeClr val="accent2"/>
+                      </a:solidFill>
+                      <a:prstDash val="solid"/>
+                    </a:lnT>
+                    <a:lnB w="12700" cmpd="sng">
+                      <a:solidFill>
+                        <a:schemeClr val="accent2"/>
+                      </a:solidFill>
+                      <a:prstDash val="solid"/>
+                    </a:lnB>
+                    <a:solidFill>
+                      <a:schemeClr val="accent2"/>
+                    </a:solidFill>
+                  </a:tcPr>
+                </a:tc>
+                <a:tc>
+                  <a:txBody>
+                    <a:bodyPr/>
+                    <a:p>
+                      <a:pPr>
+                        <a:buNone/>
+                      </a:pPr>
+                      <a:endParaRPr lang="zh-CN" altLang="en-US"/>
+                    </a:p>
+                  </a:txBody>
+                  <a:tcPr>
+                    <a:lnL w="12700" cmpd="sng">
+                      <a:solidFill>
+                        <a:schemeClr val="accent2"/>
+                      </a:solidFill>
+                      <a:prstDash val="solid"/>
+                    </a:lnL>
+                    <a:lnR w="12700" cmpd="sng">
+                      <a:solidFill>
+                        <a:schemeClr val="tx1"/>
+                      </a:solidFill>
+                      <a:prstDash val="solid"/>
+                    </a:lnR>
+                    <a:lnT w="12700" cmpd="sng">
+                      <a:solidFill>
+                        <a:schemeClr val="accent2"/>
+                      </a:solidFill>
+                      <a:prstDash val="solid"/>
+                    </a:lnT>
+                    <a:lnB w="12700" cmpd="sng">
+                      <a:solidFill>
+                        <a:schemeClr val="accent2"/>
+                      </a:solidFill>
+                      <a:prstDash val="solid"/>
+                    </a:lnB>
+                    <a:solidFill>
+                      <a:schemeClr val="accent2"/>
+                    </a:solidFill>
+                  </a:tcPr>
+                </a:tc>
+              </a:tr>
+              <a:tr h="367200">
+                <a:tc>
+                  <a:txBody>
+                    <a:bodyPr/>
+                    <a:p>
+                      <a:pPr>
+                        <a:buNone/>
+                      </a:pPr>
+                      <a:endParaRPr lang="en-US" altLang="zh-CN"/>
+                    </a:p>
+                  </a:txBody>
+                  <a:tcPr>
+                    <a:solidFill>
+                      <a:schemeClr val="accent2"/>
+                    </a:solidFill>
+                  </a:tcPr>
+                </a:tc>
+                <a:tc>
+                  <a:txBody>
+                    <a:bodyPr/>
+                    <a:p>
+                      <a:pPr>
+                        <a:buNone/>
+                      </a:pPr>
+                      <a:endParaRPr lang="zh-CN" altLang="en-US"/>
+                    </a:p>
+                  </a:txBody>
+                  <a:tcPr>
+                    <a:lnR w="12700" cmpd="sng">
+                      <a:solidFill>
+                        <a:schemeClr val="tx1"/>
+                      </a:solidFill>
+                      <a:prstDash val="solid"/>
+                    </a:lnR>
+                    <a:solidFill>
+                      <a:schemeClr val="accent2"/>
+                    </a:solidFill>
+                  </a:tcPr>
+                </a:tc>
+                <a:tc>
+                  <a:txBody>
+                    <a:bodyPr/>
+                    <a:p>
+                      <a:pPr>
+                        <a:buNone/>
+                      </a:pPr>
+                      <a:endParaRPr lang="zh-CN" altLang="en-US"/>
+                    </a:p>
+                  </a:txBody>
+                  <a:tcPr>
+                    <a:lnL w="12700" cmpd="sng">
+                      <a:solidFill>
+                        <a:schemeClr val="tx1"/>
+                      </a:solidFill>
+                      <a:prstDash val="solid"/>
+                    </a:lnL>
+                    <a:lnR w="12700" cmpd="sng">
+                      <a:solidFill>
+                        <a:schemeClr val="accent2"/>
+                      </a:solidFill>
+                      <a:prstDash val="solid"/>
+                    </a:lnR>
+                    <a:lnT w="12700" cmpd="sng">
+                      <a:solidFill>
+                        <a:schemeClr val="accent2"/>
+                      </a:solidFill>
+                      <a:prstDash val="solid"/>
+                    </a:lnT>
+                    <a:lnB w="12700" cmpd="sng">
+                      <a:solidFill>
+                        <a:schemeClr val="tx1"/>
+                      </a:solidFill>
+                      <a:prstDash val="solid"/>
+                    </a:lnB>
+                    <a:solidFill>
+                      <a:schemeClr val="accent2"/>
+                    </a:solidFill>
+                  </a:tcPr>
+                </a:tc>
+                <a:tc>
+                  <a:txBody>
+                    <a:bodyPr/>
+                    <a:p>
+                      <a:pPr>
+                        <a:buNone/>
+                      </a:pPr>
+                      <a:endParaRPr lang="zh-CN" altLang="en-US"/>
+                    </a:p>
+                  </a:txBody>
+                  <a:tcPr>
+                    <a:lnL w="12700" cmpd="sng">
+                      <a:solidFill>
+                        <a:schemeClr val="accent2"/>
+                      </a:solidFill>
+                      <a:prstDash val="solid"/>
+                    </a:lnL>
+                    <a:lnR w="12700" cmpd="sng">
+                      <a:solidFill>
+                        <a:schemeClr val="tx1"/>
+                      </a:solidFill>
+                      <a:prstDash val="solid"/>
+                    </a:lnR>
+                    <a:lnT w="12700" cmpd="sng">
+                      <a:solidFill>
+                        <a:schemeClr val="accent2"/>
+                      </a:solidFill>
+                      <a:prstDash val="solid"/>
+                    </a:lnT>
+                    <a:lnB w="12700" cmpd="sng">
+                      <a:solidFill>
+                        <a:schemeClr val="tx1"/>
+                      </a:solidFill>
+                      <a:prstDash val="solid"/>
+                    </a:lnB>
+                    <a:solidFill>
+                      <a:schemeClr val="accent2"/>
+                    </a:solidFill>
+                  </a:tcPr>
+                </a:tc>
+                <a:tc>
+                  <a:txBody>
+                    <a:bodyPr/>
+                    <a:p>
+                      <a:pPr>
+                        <a:buNone/>
+                      </a:pPr>
+                      <a:endParaRPr lang="zh-CN" altLang="en-US"/>
+                    </a:p>
+                  </a:txBody>
+                  <a:tcPr>
+                    <a:lnL w="12700" cmpd="sng">
+                      <a:solidFill>
+                        <a:schemeClr val="tx1"/>
+                      </a:solidFill>
+                      <a:prstDash val="solid"/>
+                    </a:lnL>
+                    <a:lnR w="12700" cmpd="sng">
+                      <a:solidFill>
+                        <a:schemeClr val="accent2"/>
+                      </a:solidFill>
+                      <a:prstDash val="solid"/>
+                    </a:lnR>
+                    <a:lnT w="12700" cmpd="sng">
+                      <a:solidFill>
+                        <a:schemeClr val="accent2"/>
+                      </a:solidFill>
+                      <a:prstDash val="solid"/>
+                    </a:lnT>
+                    <a:lnB w="12700" cmpd="sng">
+                      <a:solidFill>
+                        <a:schemeClr val="tx1"/>
+                      </a:solidFill>
+                      <a:prstDash val="solid"/>
+                    </a:lnB>
+                    <a:solidFill>
+                      <a:schemeClr val="accent2"/>
+                    </a:solidFill>
+                  </a:tcPr>
+                </a:tc>
+                <a:tc>
+                  <a:txBody>
+                    <a:bodyPr/>
+                    <a:p>
+                      <a:pPr>
+                        <a:buNone/>
+                      </a:pPr>
+                      <a:endParaRPr lang="zh-CN" altLang="en-US"/>
+                    </a:p>
+                  </a:txBody>
+                  <a:tcPr>
+                    <a:lnL w="12700" cmpd="sng">
+                      <a:solidFill>
+                        <a:schemeClr val="accent2"/>
+                      </a:solidFill>
+                      <a:prstDash val="solid"/>
+                    </a:lnL>
+                    <a:lnR w="12700" cmpd="sng">
+                      <a:solidFill>
+                        <a:schemeClr val="accent2"/>
+                      </a:solidFill>
+                      <a:prstDash val="solid"/>
+                    </a:lnR>
+                    <a:lnT w="12700" cmpd="sng">
+                      <a:solidFill>
+                        <a:schemeClr val="accent2"/>
+                      </a:solidFill>
+                      <a:prstDash val="solid"/>
+                    </a:lnT>
+                    <a:lnB w="12700" cmpd="sng">
+                      <a:solidFill>
+                        <a:schemeClr val="tx1"/>
+                      </a:solidFill>
+                      <a:prstDash val="solid"/>
+                    </a:lnB>
+                    <a:solidFill>
+                      <a:schemeClr val="accent2"/>
+                    </a:solidFill>
+                  </a:tcPr>
+                </a:tc>
+                <a:tc>
+                  <a:txBody>
+                    <a:bodyPr/>
+                    <a:p>
+                      <a:pPr>
+                        <a:buNone/>
+                      </a:pPr>
+                      <a:endParaRPr lang="zh-CN" altLang="en-US"/>
+                    </a:p>
+                  </a:txBody>
+                  <a:tcPr>
+                    <a:lnL w="12700" cmpd="sng">
+                      <a:solidFill>
+                        <a:schemeClr val="accent2"/>
+                      </a:solidFill>
+                      <a:prstDash val="solid"/>
+                    </a:lnL>
+                    <a:lnR w="12700" cmpd="sng">
+                      <a:solidFill>
+                        <a:schemeClr val="accent2"/>
+                      </a:solidFill>
+                      <a:prstDash val="solid"/>
+                    </a:lnR>
+                    <a:lnT w="12700" cmpd="sng">
+                      <a:solidFill>
+                        <a:schemeClr val="accent2"/>
+                      </a:solidFill>
+                      <a:prstDash val="solid"/>
+                    </a:lnT>
+                    <a:lnB w="12700" cmpd="sng">
+                      <a:solidFill>
+                        <a:schemeClr val="tx1"/>
+                      </a:solidFill>
+                      <a:prstDash val="solid"/>
+                    </a:lnB>
+                    <a:solidFill>
+                      <a:schemeClr val="accent2"/>
+                    </a:solidFill>
+                  </a:tcPr>
+                </a:tc>
+                <a:tc>
+                  <a:txBody>
+                    <a:bodyPr/>
+                    <a:p>
+                      <a:pPr>
+                        <a:buNone/>
+                      </a:pPr>
+                      <a:endParaRPr lang="zh-CN" altLang="en-US"/>
+                    </a:p>
+                  </a:txBody>
+                  <a:tcPr>
+                    <a:lnL w="12700" cmpd="sng">
+                      <a:solidFill>
+                        <a:schemeClr val="accent2"/>
+                      </a:solidFill>
+                      <a:prstDash val="solid"/>
+                    </a:lnL>
+                    <a:lnR w="12700" cmpd="sng">
+                      <a:solidFill>
+                        <a:schemeClr val="tx1"/>
+                      </a:solidFill>
+                      <a:prstDash val="solid"/>
+                    </a:lnR>
+                    <a:lnT w="12700" cmpd="sng">
+                      <a:solidFill>
+                        <a:schemeClr val="accent2"/>
+                      </a:solidFill>
+                      <a:prstDash val="solid"/>
+                    </a:lnT>
+                    <a:lnB w="12700" cmpd="sng">
+                      <a:solidFill>
+                        <a:schemeClr val="tx1"/>
+                      </a:solidFill>
+                      <a:prstDash val="solid"/>
+                    </a:lnB>
+                    <a:solidFill>
+                      <a:schemeClr val="accent2"/>
+                    </a:solidFill>
+                  </a:tcPr>
+                </a:tc>
+              </a:tr>
+            </a:tbl>
+          </a:graphicData>
+        </a:graphic>
+      </p:graphicFrame>
+      <p:sp>
+        <p:nvSpPr>
+          <p:cNvPr id="67" name="饼形 66"/>
+          <p:cNvSpPr/>
+          <p:nvPr/>
+        </p:nvSpPr>
+        <p:spPr>
+          <a:xfrm>
+            <a:off x="614045" y="5083175"/>
+            <a:ext cx="1429385" cy="1465580"/>
+          </a:xfrm>
+          <a:prstGeom prst="pie">
+            <a:avLst>
+              <a:gd name="adj1" fmla="val 16192288"/>
+              <a:gd name="adj2" fmla="val 1210"/>
+            </a:avLst>
+          </a:prstGeom>
+          <a:noFill/>
+          <a:ln w="44450">
+            <a:solidFill>
+              <a:srgbClr val="0070C0"/>
+            </a:solidFill>
+          </a:ln>
+          <a:effectLst>
+            <a:outerShdw blurRad="63500" sx="102000" sy="102000" algn="ctr" rotWithShape="0">
+              <a:prstClr val="black">
+                <a:alpha val="40000"/>
+              </a:prstClr>
+            </a:outerShdw>
+          </a:effectLst>
+        </p:spPr>
+        <p:style>
+          <a:lnRef idx="2">
+            <a:schemeClr val="accent1">
+              <a:lumMod val="75000"/>
+            </a:schemeClr>
+          </a:lnRef>
+          <a:fillRef idx="1">
+            <a:schemeClr val="accent1"/>
+          </a:fillRef>
+          <a:effectRef idx="0">
+            <a:srgbClr val="FFFFFF"/>
+          </a:effectRef>
+          <a:fontRef idx="minor">
+            <a:schemeClr val="lt1"/>
+          </a:fontRef>
+        </p:style>
+        <p:txBody>
+          <a:bodyPr rtlCol="0" anchor="ctr"/>
+          <a:p>
+            <a:pPr algn="ctr"/>
+            <a:endParaRPr lang="zh-CN" altLang="en-US">
+              <a:solidFill>
+                <a:schemeClr val="tx1"/>
+              </a:solidFill>
+            </a:endParaRPr>
+          </a:p>
+        </p:txBody>
+      </p:sp>
+      <p:sp>
+        <p:nvSpPr>
+          <p:cNvPr id="68" name="文本框 67"/>
+          <p:cNvSpPr txBox="1"/>
+          <p:nvPr/>
+        </p:nvSpPr>
+        <p:spPr>
+          <a:xfrm>
+            <a:off x="1631950" y="3429000"/>
+            <a:ext cx="857250" cy="368300"/>
+          </a:xfrm>
+          <a:prstGeom prst="rect">
+            <a:avLst/>
+          </a:prstGeom>
+          <a:noFill/>
+        </p:spPr>
+        <p:txBody>
+          <a:bodyPr wrap="square" rtlCol="0">
+            <a:spAutoFit/>
+          </a:bodyPr>
+          <a:p>
+            <a:pPr algn="ctr"/>
+            <a:r>
+              <a:rPr lang="en-US" altLang="zh-CN">
+                <a:solidFill>
+                  <a:schemeClr val="bg1"/>
+                </a:solidFill>
+              </a:rPr>
+              <a:t>HLOD1</a:t>
+            </a:r>
+            <a:endParaRPr lang="en-US" altLang="zh-CN">
+              <a:solidFill>
+                <a:schemeClr val="bg1"/>
+              </a:solidFill>
+            </a:endParaRPr>
+          </a:p>
+        </p:txBody>
+      </p:sp>
+      <p:sp>
+        <p:nvSpPr>
+          <p:cNvPr id="69" name="文本框 68"/>
+          <p:cNvSpPr txBox="1"/>
+          <p:nvPr/>
+        </p:nvSpPr>
+        <p:spPr>
+          <a:xfrm>
+            <a:off x="3035300" y="3429000"/>
+            <a:ext cx="857250" cy="368300"/>
+          </a:xfrm>
+          <a:prstGeom prst="rect">
+            <a:avLst/>
+          </a:prstGeom>
+          <a:noFill/>
+        </p:spPr>
+        <p:txBody>
+          <a:bodyPr wrap="square" rtlCol="0">
+            <a:spAutoFit/>
+          </a:bodyPr>
+          <a:p>
+            <a:pPr algn="ctr"/>
+            <a:r>
+              <a:rPr lang="en-US" altLang="zh-CN">
+                <a:solidFill>
+                  <a:schemeClr val="bg1"/>
+                </a:solidFill>
+              </a:rPr>
+              <a:t>HLOD1</a:t>
+            </a:r>
+            <a:endParaRPr lang="en-US" altLang="zh-CN">
+              <a:solidFill>
+                <a:schemeClr val="bg1"/>
+              </a:solidFill>
+            </a:endParaRPr>
+          </a:p>
+        </p:txBody>
+      </p:sp>
+      <p:sp>
+        <p:nvSpPr>
+          <p:cNvPr id="70" name="文本框 69"/>
+          <p:cNvSpPr txBox="1"/>
+          <p:nvPr/>
+        </p:nvSpPr>
+        <p:spPr>
+          <a:xfrm>
+            <a:off x="3035300" y="4902200"/>
+            <a:ext cx="857250" cy="368300"/>
+          </a:xfrm>
+          <a:prstGeom prst="rect">
+            <a:avLst/>
+          </a:prstGeom>
+          <a:noFill/>
+        </p:spPr>
+        <p:txBody>
+          <a:bodyPr wrap="square" rtlCol="0">
+            <a:spAutoFit/>
+          </a:bodyPr>
+          <a:p>
+            <a:pPr algn="ctr"/>
+            <a:r>
+              <a:rPr lang="en-US" altLang="zh-CN">
+                <a:solidFill>
+                  <a:schemeClr val="bg1"/>
+                </a:solidFill>
+              </a:rPr>
+              <a:t>HLOD1</a:t>
+            </a:r>
+            <a:endParaRPr lang="en-US" altLang="zh-CN">
+              <a:solidFill>
+                <a:schemeClr val="bg1"/>
+              </a:solidFill>
+            </a:endParaRPr>
+          </a:p>
+        </p:txBody>
+      </p:sp>
+      <p:sp>
+        <p:nvSpPr>
+          <p:cNvPr id="71" name="文本框 70"/>
+          <p:cNvSpPr txBox="1"/>
+          <p:nvPr/>
+        </p:nvSpPr>
+        <p:spPr>
+          <a:xfrm>
+            <a:off x="1334135" y="4593590"/>
+            <a:ext cx="709295" cy="211455"/>
+          </a:xfrm>
+          <a:prstGeom prst="rect">
+            <a:avLst/>
+          </a:prstGeom>
+          <a:noFill/>
+        </p:spPr>
+        <p:txBody>
+          <a:bodyPr wrap="square" rtlCol="0">
+            <a:noAutofit/>
+          </a:bodyPr>
+          <a:p>
+            <a:pPr algn="ctr"/>
+            <a:r>
+              <a:rPr lang="en-US" altLang="zh-CN" sz="1400">
+                <a:solidFill>
+                  <a:schemeClr val="bg1"/>
+                </a:solidFill>
+              </a:rPr>
+              <a:t>HLOD0</a:t>
+            </a:r>
+            <a:endParaRPr lang="en-US" altLang="zh-CN" sz="1400">
+              <a:solidFill>
+                <a:schemeClr val="bg1"/>
+              </a:solidFill>
+            </a:endParaRPr>
+          </a:p>
+        </p:txBody>
+      </p:sp>
+      <p:sp>
+        <p:nvSpPr>
+          <p:cNvPr id="72" name="文本框 71"/>
+          <p:cNvSpPr txBox="1"/>
+          <p:nvPr/>
+        </p:nvSpPr>
+        <p:spPr>
+          <a:xfrm>
+            <a:off x="2043430" y="4593590"/>
+            <a:ext cx="709295" cy="211455"/>
+          </a:xfrm>
+          <a:prstGeom prst="rect">
+            <a:avLst/>
+          </a:prstGeom>
+          <a:noFill/>
+        </p:spPr>
+        <p:txBody>
+          <a:bodyPr wrap="square" rtlCol="0">
+            <a:noAutofit/>
+          </a:bodyPr>
+          <a:p>
+            <a:pPr algn="ctr"/>
+            <a:r>
+              <a:rPr lang="en-US" altLang="zh-CN" sz="1400">
+                <a:solidFill>
+                  <a:schemeClr val="bg1"/>
+                </a:solidFill>
+              </a:rPr>
+              <a:t>HLOD0</a:t>
+            </a:r>
+            <a:endParaRPr lang="en-US" altLang="zh-CN" sz="1400">
+              <a:solidFill>
+                <a:schemeClr val="bg1"/>
+              </a:solidFill>
+            </a:endParaRPr>
+          </a:p>
+        </p:txBody>
+      </p:sp>
+      <p:sp>
+        <p:nvSpPr>
+          <p:cNvPr id="73" name="文本框 72"/>
+          <p:cNvSpPr txBox="1"/>
+          <p:nvPr/>
+        </p:nvSpPr>
+        <p:spPr>
+          <a:xfrm>
+            <a:off x="2047875" y="5302250"/>
+            <a:ext cx="709295" cy="211455"/>
+          </a:xfrm>
+          <a:prstGeom prst="rect">
+            <a:avLst/>
+          </a:prstGeom>
+          <a:noFill/>
+        </p:spPr>
+        <p:txBody>
+          <a:bodyPr wrap="square" rtlCol="0">
+            <a:noAutofit/>
+          </a:bodyPr>
+          <a:p>
+            <a:pPr algn="ctr"/>
+            <a:r>
+              <a:rPr lang="en-US" altLang="zh-CN" sz="1400">
+                <a:solidFill>
+                  <a:schemeClr val="bg1"/>
+                </a:solidFill>
+              </a:rPr>
+              <a:t>HLOD0</a:t>
+            </a:r>
+            <a:endParaRPr lang="en-US" altLang="zh-CN" sz="1400">
+              <a:solidFill>
+                <a:schemeClr val="bg1"/>
+              </a:solidFill>
+            </a:endParaRPr>
+          </a:p>
+        </p:txBody>
+      </p:sp>
+      <p:pic>
+        <p:nvPicPr>
+          <p:cNvPr id="3" name="图片 2"/>
+          <p:cNvPicPr>
+            <a:picLocks noChangeAspect="1"/>
+          </p:cNvPicPr>
+          <p:nvPr/>
+        </p:nvPicPr>
+        <p:blipFill>
+          <a:blip r:embed="rId33"/>
+          <a:stretch>
+            <a:fillRect/>
+          </a:stretch>
+        </p:blipFill>
+        <p:spPr>
+          <a:xfrm>
+            <a:off x="246380" y="1957070"/>
+            <a:ext cx="12305665" cy="2590165"/>
+          </a:xfrm>
+          <a:prstGeom prst="rect">
+            <a:avLst/>
+          </a:prstGeom>
+        </p:spPr>
+      </p:pic>
+      <p:sp>
+        <p:nvSpPr>
+          <p:cNvPr id="5" name="文本框 4"/>
+          <p:cNvSpPr txBox="1"/>
+          <p:nvPr/>
+        </p:nvSpPr>
+        <p:spPr>
+          <a:xfrm>
+            <a:off x="923925" y="3961765"/>
+            <a:ext cx="4064000" cy="368300"/>
+          </a:xfrm>
+          <a:prstGeom prst="rect">
+            <a:avLst/>
+          </a:prstGeom>
+          <a:noFill/>
+        </p:spPr>
+        <p:txBody>
+          <a:bodyPr wrap="square" rtlCol="0">
+            <a:spAutoFit/>
+          </a:bodyPr>
+          <a:p>
+            <a:r>
+              <a:rPr lang="zh-CN" altLang="en-US"/>
+              <a:t>无</a:t>
+            </a:r>
+            <a:r>
+              <a:rPr lang="en-US" altLang="zh-CN"/>
+              <a:t>Mipmap</a:t>
+            </a:r>
+            <a:r>
+              <a:rPr lang="zh-CN" altLang="en-US"/>
+              <a:t>，存在锯齿边缘</a:t>
+            </a:r>
+            <a:endParaRPr lang="zh-CN" altLang="en-US"/>
           </a:p>
         </p:txBody>
       </p:sp>
@@ -21882,7 +26448,14 @@
 
 <file path=ppt/tags/tag5.xml><?xml version="1.0" encoding="utf-8"?>
 <p:tagLst xmlns:p="http://schemas.openxmlformats.org/presentationml/2006/main">
-  <p:tag name="commondata" val="eyJoZGlkIjoiY2M2M2MyZmNhYWM2NDMxODE0MjAzMGI2YTMzYWNhOGIifQ=="/>
+  <p:tag name="TABLE_ENDDRAG_ORIGIN_RECT" val="133*159"/>
+  <p:tag name="TABLE_ENDDRAG_RECT" val="83*292*133*159"/>
+</p:tagLst>
+</file>
+
+<file path=ppt/tags/tag6.xml><?xml version="1.0" encoding="utf-8"?>
+<p:tagLst xmlns:p="http://schemas.openxmlformats.org/presentationml/2006/main">
+  <p:tag name="commondata" val="eyJoZGlkIjoiYWQyZGY4YWFmODJjZGJkZjhiMWFmOTMxOGNkYmNjMGYifQ=="/>
 </p:tagLst>
 </file>
 

</xml_diff>